<commit_message>
State of the Art iteration1 & Concept
</commit_message>
<xml_diff>
--- a/02_Thesis/PARRHI_Thesis/Figures/FigureMaker.pptx
+++ b/02_Thesis/PARRHI_Thesis/Figures/FigureMaker.pptx
@@ -263,7 +263,7 @@
           <a:p>
             <a:fld id="{7CBA829E-0E5E-45A4-B6EB-8046F7F33EA6}" type="datetimeFigureOut">
               <a:rPr lang="en-GB" smtClean="0"/>
-              <a:t>14/04/2019</a:t>
+              <a:t>24/04/2019</a:t>
             </a:fld>
             <a:endParaRPr lang="en-GB"/>
           </a:p>
@@ -463,7 +463,7 @@
           <a:p>
             <a:fld id="{7CBA829E-0E5E-45A4-B6EB-8046F7F33EA6}" type="datetimeFigureOut">
               <a:rPr lang="en-GB" smtClean="0"/>
-              <a:t>14/04/2019</a:t>
+              <a:t>24/04/2019</a:t>
             </a:fld>
             <a:endParaRPr lang="en-GB"/>
           </a:p>
@@ -673,7 +673,7 @@
           <a:p>
             <a:fld id="{7CBA829E-0E5E-45A4-B6EB-8046F7F33EA6}" type="datetimeFigureOut">
               <a:rPr lang="en-GB" smtClean="0"/>
-              <a:t>14/04/2019</a:t>
+              <a:t>24/04/2019</a:t>
             </a:fld>
             <a:endParaRPr lang="en-GB"/>
           </a:p>
@@ -873,7 +873,7 @@
           <a:p>
             <a:fld id="{7CBA829E-0E5E-45A4-B6EB-8046F7F33EA6}" type="datetimeFigureOut">
               <a:rPr lang="en-GB" smtClean="0"/>
-              <a:t>14/04/2019</a:t>
+              <a:t>24/04/2019</a:t>
             </a:fld>
             <a:endParaRPr lang="en-GB"/>
           </a:p>
@@ -1149,7 +1149,7 @@
           <a:p>
             <a:fld id="{7CBA829E-0E5E-45A4-B6EB-8046F7F33EA6}" type="datetimeFigureOut">
               <a:rPr lang="en-GB" smtClean="0"/>
-              <a:t>14/04/2019</a:t>
+              <a:t>24/04/2019</a:t>
             </a:fld>
             <a:endParaRPr lang="en-GB"/>
           </a:p>
@@ -1417,7 +1417,7 @@
           <a:p>
             <a:fld id="{7CBA829E-0E5E-45A4-B6EB-8046F7F33EA6}" type="datetimeFigureOut">
               <a:rPr lang="en-GB" smtClean="0"/>
-              <a:t>14/04/2019</a:t>
+              <a:t>24/04/2019</a:t>
             </a:fld>
             <a:endParaRPr lang="en-GB"/>
           </a:p>
@@ -1832,7 +1832,7 @@
           <a:p>
             <a:fld id="{7CBA829E-0E5E-45A4-B6EB-8046F7F33EA6}" type="datetimeFigureOut">
               <a:rPr lang="en-GB" smtClean="0"/>
-              <a:t>14/04/2019</a:t>
+              <a:t>24/04/2019</a:t>
             </a:fld>
             <a:endParaRPr lang="en-GB"/>
           </a:p>
@@ -1974,7 +1974,7 @@
           <a:p>
             <a:fld id="{7CBA829E-0E5E-45A4-B6EB-8046F7F33EA6}" type="datetimeFigureOut">
               <a:rPr lang="en-GB" smtClean="0"/>
-              <a:t>14/04/2019</a:t>
+              <a:t>24/04/2019</a:t>
             </a:fld>
             <a:endParaRPr lang="en-GB"/>
           </a:p>
@@ -2087,7 +2087,7 @@
           <a:p>
             <a:fld id="{7CBA829E-0E5E-45A4-B6EB-8046F7F33EA6}" type="datetimeFigureOut">
               <a:rPr lang="en-GB" smtClean="0"/>
-              <a:t>14/04/2019</a:t>
+              <a:t>24/04/2019</a:t>
             </a:fld>
             <a:endParaRPr lang="en-GB"/>
           </a:p>
@@ -2400,7 +2400,7 @@
           <a:p>
             <a:fld id="{7CBA829E-0E5E-45A4-B6EB-8046F7F33EA6}" type="datetimeFigureOut">
               <a:rPr lang="en-GB" smtClean="0"/>
-              <a:t>14/04/2019</a:t>
+              <a:t>24/04/2019</a:t>
             </a:fld>
             <a:endParaRPr lang="en-GB"/>
           </a:p>
@@ -2689,7 +2689,7 @@
           <a:p>
             <a:fld id="{7CBA829E-0E5E-45A4-B6EB-8046F7F33EA6}" type="datetimeFigureOut">
               <a:rPr lang="en-GB" smtClean="0"/>
-              <a:t>14/04/2019</a:t>
+              <a:t>24/04/2019</a:t>
             </a:fld>
             <a:endParaRPr lang="en-GB"/>
           </a:p>
@@ -2932,7 +2932,7 @@
           <a:p>
             <a:fld id="{7CBA829E-0E5E-45A4-B6EB-8046F7F33EA6}" type="datetimeFigureOut">
               <a:rPr lang="en-GB" smtClean="0"/>
-              <a:t>14/04/2019</a:t>
+              <a:t>24/04/2019</a:t>
             </a:fld>
             <a:endParaRPr lang="en-GB"/>
           </a:p>
@@ -3398,7 +3398,7 @@
           <a:lstStyle/>
           <a:p>
             <a:pPr algn="ctr"/>
-            <a:endParaRPr lang="en-GB" dirty="0"/>
+            <a:endParaRPr lang="en-GB"/>
           </a:p>
         </p:txBody>
       </p:sp>
@@ -3452,21 +3452,21 @@
           <a:p>
             <a:pPr algn="ctr"/>
             <a:r>
-              <a:rPr lang="de-DE" dirty="0" err="1"/>
+              <a:rPr lang="de-DE" err="1"/>
               <a:t>User‘s</a:t>
             </a:r>
             <a:r>
-              <a:rPr lang="de-DE" dirty="0"/>
+              <a:rPr lang="de-DE"/>
               <a:t> Input Data</a:t>
             </a:r>
           </a:p>
           <a:p>
             <a:pPr algn="ctr"/>
             <a:r>
-              <a:rPr lang="de-DE" dirty="0"/>
+              <a:rPr lang="de-DE"/>
               <a:t>&lt;/&gt;</a:t>
             </a:r>
-            <a:endParaRPr lang="en-GB" dirty="0"/>
+            <a:endParaRPr lang="en-GB"/>
           </a:p>
         </p:txBody>
       </p:sp>
@@ -3595,10 +3595,10 @@
           <a:lstStyle/>
           <a:p>
             <a:r>
-              <a:rPr lang="de-DE" dirty="0"/>
+              <a:rPr lang="de-DE"/>
               <a:t>PARRHI</a:t>
             </a:r>
-            <a:endParaRPr lang="en-GB" dirty="0"/>
+            <a:endParaRPr lang="en-GB"/>
           </a:p>
         </p:txBody>
       </p:sp>
@@ -3652,10 +3652,10 @@
           <a:p>
             <a:pPr algn="ctr"/>
             <a:r>
-              <a:rPr lang="de-DE" dirty="0"/>
+              <a:rPr lang="de-DE"/>
               <a:t>Robot</a:t>
             </a:r>
-            <a:endParaRPr lang="en-GB" dirty="0"/>
+            <a:endParaRPr lang="en-GB"/>
           </a:p>
         </p:txBody>
       </p:sp>
@@ -3688,10 +3688,10 @@
           <a:lstStyle/>
           <a:p>
             <a:r>
-              <a:rPr lang="de-DE" dirty="0"/>
+              <a:rPr lang="de-DE"/>
               <a:t>3D Space</a:t>
             </a:r>
-            <a:endParaRPr lang="en-GB" dirty="0"/>
+            <a:endParaRPr lang="en-GB"/>
           </a:p>
         </p:txBody>
       </p:sp>
@@ -3745,10 +3745,10 @@
           <a:p>
             <a:pPr algn="ctr"/>
             <a:r>
-              <a:rPr lang="de-DE" dirty="0"/>
+              <a:rPr lang="de-DE"/>
               <a:t>Holograms</a:t>
             </a:r>
-            <a:endParaRPr lang="en-GB" dirty="0"/>
+            <a:endParaRPr lang="en-GB"/>
           </a:p>
         </p:txBody>
       </p:sp>
@@ -3802,10 +3802,10 @@
           <a:p>
             <a:pPr algn="ctr"/>
             <a:r>
-              <a:rPr lang="de-DE" dirty="0"/>
+              <a:rPr lang="de-DE"/>
               <a:t>Interpreter</a:t>
             </a:r>
-            <a:endParaRPr lang="en-GB" dirty="0"/>
+            <a:endParaRPr lang="en-GB"/>
           </a:p>
         </p:txBody>
       </p:sp>
@@ -3859,10 +3859,10 @@
           <a:p>
             <a:pPr algn="ctr"/>
             <a:r>
-              <a:rPr lang="de-DE" dirty="0"/>
+              <a:rPr lang="de-DE"/>
               <a:t>Cycle</a:t>
             </a:r>
-            <a:endParaRPr lang="en-GB" dirty="0"/>
+            <a:endParaRPr lang="en-GB"/>
           </a:p>
         </p:txBody>
       </p:sp>
@@ -4144,10 +4144,10 @@
           <a:lstStyle/>
           <a:p>
             <a:r>
-              <a:rPr lang="de-DE" dirty="0"/>
+              <a:rPr lang="de-DE"/>
               <a:t>Input Data</a:t>
             </a:r>
-            <a:endParaRPr lang="en-GB" dirty="0"/>
+            <a:endParaRPr lang="en-GB"/>
           </a:p>
         </p:txBody>
       </p:sp>
@@ -4201,10 +4201,10 @@
           <a:p>
             <a:pPr algn="ctr"/>
             <a:r>
-              <a:rPr lang="de-DE" dirty="0"/>
+              <a:rPr lang="de-DE"/>
               <a:t>Variables</a:t>
             </a:r>
-            <a:endParaRPr lang="en-GB" dirty="0"/>
+            <a:endParaRPr lang="en-GB"/>
           </a:p>
         </p:txBody>
       </p:sp>
@@ -4258,10 +4258,10 @@
           <a:p>
             <a:pPr algn="ctr"/>
             <a:r>
-              <a:rPr lang="de-DE" dirty="0"/>
+              <a:rPr lang="de-DE"/>
               <a:t>Points</a:t>
             </a:r>
-            <a:endParaRPr lang="en-GB" dirty="0"/>
+            <a:endParaRPr lang="en-GB"/>
           </a:p>
         </p:txBody>
       </p:sp>
@@ -4315,10 +4315,10 @@
           <a:p>
             <a:pPr algn="ctr"/>
             <a:r>
-              <a:rPr lang="de-DE" dirty="0"/>
+              <a:rPr lang="de-DE"/>
               <a:t>Holograms</a:t>
             </a:r>
-            <a:endParaRPr lang="en-GB" dirty="0"/>
+            <a:endParaRPr lang="en-GB"/>
           </a:p>
         </p:txBody>
       </p:sp>
@@ -4372,10 +4372,10 @@
           <a:p>
             <a:pPr algn="ctr"/>
             <a:r>
-              <a:rPr lang="de-DE" dirty="0"/>
+              <a:rPr lang="de-DE"/>
               <a:t>Events</a:t>
             </a:r>
-            <a:endParaRPr lang="en-GB" dirty="0"/>
+            <a:endParaRPr lang="en-GB"/>
           </a:p>
         </p:txBody>
       </p:sp>
@@ -4411,28 +4411,1645 @@
       </p:grpSpPr>
       <p:sp>
         <p:nvSpPr>
-          <p:cNvPr id="2" name="Titel 1">
-            <a:extLst>
-              <a:ext uri="{FF2B5EF4-FFF2-40B4-BE49-F238E27FC236}">
-                <a16:creationId xmlns:a16="http://schemas.microsoft.com/office/drawing/2014/main" id="{5ECF2026-48C3-4D9D-925F-5382C3379C2D}"/>
-              </a:ext>
-            </a:extLst>
-          </p:cNvPr>
-          <p:cNvSpPr>
-            <a:spLocks noGrp="1"/>
-          </p:cNvSpPr>
-          <p:nvPr>
-            <p:ph type="title"/>
-          </p:nvPr>
-        </p:nvSpPr>
-        <p:spPr/>
-        <p:txBody>
-          <a:bodyPr/>
-          <a:lstStyle/>
-          <a:p>
+          <p:cNvPr id="6" name="Rechteck: abgerundete Ecken 5">
+            <a:extLst>
+              <a:ext uri="{FF2B5EF4-FFF2-40B4-BE49-F238E27FC236}">
+                <a16:creationId xmlns:a16="http://schemas.microsoft.com/office/drawing/2014/main" id="{1EFBE1EE-B6B9-4699-B39C-194A2FFA5642}"/>
+              </a:ext>
+            </a:extLst>
+          </p:cNvPr>
+          <p:cNvSpPr/>
+          <p:nvPr/>
+        </p:nvSpPr>
+        <p:spPr>
+          <a:xfrm>
+            <a:off x="845197" y="969876"/>
+            <a:ext cx="3781421" cy="3430672"/>
+          </a:xfrm>
+          <a:prstGeom prst="roundRect">
+            <a:avLst>
+              <a:gd name="adj" fmla="val 2329"/>
+            </a:avLst>
+          </a:prstGeom>
+          <a:solidFill>
+            <a:schemeClr val="bg1">
+              <a:lumMod val="95000"/>
+            </a:schemeClr>
+          </a:solidFill>
+          <a:ln>
+            <a:solidFill>
+              <a:schemeClr val="accent1">
+                <a:lumMod val="50000"/>
+              </a:schemeClr>
+            </a:solidFill>
+          </a:ln>
+        </p:spPr>
+        <p:style>
+          <a:lnRef idx="2">
+            <a:schemeClr val="accent6"/>
+          </a:lnRef>
+          <a:fillRef idx="1">
+            <a:schemeClr val="lt1"/>
+          </a:fillRef>
+          <a:effectRef idx="0">
+            <a:schemeClr val="accent6"/>
+          </a:effectRef>
+          <a:fontRef idx="minor">
+            <a:schemeClr val="dk1"/>
+          </a:fontRef>
+        </p:style>
+        <p:txBody>
+          <a:bodyPr rtlCol="0" anchor="ctr"/>
+          <a:lstStyle/>
+          <a:p>
+            <a:pPr algn="ctr"/>
+            <a:endParaRPr lang="en-GB" dirty="0"/>
+          </a:p>
+        </p:txBody>
+      </p:sp>
+      <p:sp>
+        <p:nvSpPr>
+          <p:cNvPr id="84" name="Rechteck: abgerundete Ecken 83">
+            <a:extLst>
+              <a:ext uri="{FF2B5EF4-FFF2-40B4-BE49-F238E27FC236}">
+                <a16:creationId xmlns:a16="http://schemas.microsoft.com/office/drawing/2014/main" id="{9D995733-A6B3-47B0-BD0C-920340C64D0C}"/>
+              </a:ext>
+            </a:extLst>
+          </p:cNvPr>
+          <p:cNvSpPr/>
+          <p:nvPr/>
+        </p:nvSpPr>
+        <p:spPr>
+          <a:xfrm>
+            <a:off x="844004" y="2381158"/>
+            <a:ext cx="2284004" cy="851491"/>
+          </a:xfrm>
+          <a:prstGeom prst="roundRect">
+            <a:avLst>
+              <a:gd name="adj" fmla="val 2329"/>
+            </a:avLst>
+          </a:prstGeom>
+          <a:ln>
+            <a:solidFill>
+              <a:schemeClr val="accent1">
+                <a:lumMod val="50000"/>
+              </a:schemeClr>
+            </a:solidFill>
+          </a:ln>
+        </p:spPr>
+        <p:style>
+          <a:lnRef idx="2">
+            <a:schemeClr val="accent6"/>
+          </a:lnRef>
+          <a:fillRef idx="1">
+            <a:schemeClr val="lt1"/>
+          </a:fillRef>
+          <a:effectRef idx="0">
+            <a:schemeClr val="accent6"/>
+          </a:effectRef>
+          <a:fontRef idx="minor">
+            <a:schemeClr val="dk1"/>
+          </a:fontRef>
+        </p:style>
+        <p:txBody>
+          <a:bodyPr rtlCol="0" anchor="ctr"/>
+          <a:lstStyle/>
+          <a:p>
+            <a:pPr algn="ctr"/>
+            <a:endParaRPr lang="en-GB" dirty="0"/>
+          </a:p>
+        </p:txBody>
+      </p:sp>
+      <p:sp>
+        <p:nvSpPr>
+          <p:cNvPr id="7" name="Textfeld 6">
+            <a:extLst>
+              <a:ext uri="{FF2B5EF4-FFF2-40B4-BE49-F238E27FC236}">
+                <a16:creationId xmlns:a16="http://schemas.microsoft.com/office/drawing/2014/main" id="{A306641F-035E-4DDB-8579-EE779BAEC635}"/>
+              </a:ext>
+            </a:extLst>
+          </p:cNvPr>
+          <p:cNvSpPr txBox="1"/>
+          <p:nvPr/>
+        </p:nvSpPr>
+        <p:spPr>
+          <a:xfrm>
+            <a:off x="845197" y="974753"/>
+            <a:ext cx="1092200" cy="369332"/>
+          </a:xfrm>
+          <a:prstGeom prst="rect">
+            <a:avLst/>
+          </a:prstGeom>
+          <a:noFill/>
+        </p:spPr>
+        <p:txBody>
+          <a:bodyPr wrap="square" rtlCol="0">
+            <a:spAutoFit/>
+          </a:bodyPr>
+          <a:lstStyle/>
+          <a:p>
+            <a:r>
+              <a:rPr lang="de-DE"/>
+              <a:t>PARRHI</a:t>
+            </a:r>
+            <a:endParaRPr lang="en-GB"/>
+          </a:p>
+        </p:txBody>
+      </p:sp>
+      <p:sp>
+        <p:nvSpPr>
+          <p:cNvPr id="10" name="Rechteck: abgerundete Ecken 9">
+            <a:extLst>
+              <a:ext uri="{FF2B5EF4-FFF2-40B4-BE49-F238E27FC236}">
+                <a16:creationId xmlns:a16="http://schemas.microsoft.com/office/drawing/2014/main" id="{C3310D98-86EB-4C12-B7F9-E7D75ECDFA0D}"/>
+              </a:ext>
+            </a:extLst>
+          </p:cNvPr>
+          <p:cNvSpPr/>
+          <p:nvPr/>
+        </p:nvSpPr>
+        <p:spPr>
+          <a:xfrm>
+            <a:off x="6170056" y="4277045"/>
+            <a:ext cx="2686050" cy="774700"/>
+          </a:xfrm>
+          <a:prstGeom prst="roundRect">
+            <a:avLst>
+              <a:gd name="adj" fmla="val 2329"/>
+            </a:avLst>
+          </a:prstGeom>
+          <a:ln>
+            <a:solidFill>
+              <a:schemeClr val="accent1">
+                <a:lumMod val="50000"/>
+              </a:schemeClr>
+            </a:solidFill>
+          </a:ln>
+        </p:spPr>
+        <p:style>
+          <a:lnRef idx="2">
+            <a:schemeClr val="accent6"/>
+          </a:lnRef>
+          <a:fillRef idx="1">
+            <a:schemeClr val="lt1"/>
+          </a:fillRef>
+          <a:effectRef idx="0">
+            <a:schemeClr val="accent6"/>
+          </a:effectRef>
+          <a:fontRef idx="minor">
+            <a:schemeClr val="dk1"/>
+          </a:fontRef>
+        </p:style>
+        <p:txBody>
+          <a:bodyPr rtlCol="0" anchor="ctr"/>
+          <a:lstStyle/>
+          <a:p>
+            <a:pPr algn="ctr"/>
+            <a:r>
+              <a:rPr lang="de-DE"/>
+              <a:t>AR - Space</a:t>
+            </a:r>
+            <a:endParaRPr lang="en-GB"/>
+          </a:p>
+        </p:txBody>
+      </p:sp>
+      <p:sp>
+        <p:nvSpPr>
+          <p:cNvPr id="17" name="Rechteck: abgerundete Ecken 16">
+            <a:extLst>
+              <a:ext uri="{FF2B5EF4-FFF2-40B4-BE49-F238E27FC236}">
+                <a16:creationId xmlns:a16="http://schemas.microsoft.com/office/drawing/2014/main" id="{03AF250F-5B3C-4F50-ABB4-FD7EAD18DE2A}"/>
+              </a:ext>
+            </a:extLst>
+          </p:cNvPr>
+          <p:cNvSpPr/>
+          <p:nvPr/>
+        </p:nvSpPr>
+        <p:spPr>
+          <a:xfrm>
+            <a:off x="6170056" y="3348875"/>
+            <a:ext cx="2686050" cy="774700"/>
+          </a:xfrm>
+          <a:prstGeom prst="roundRect">
+            <a:avLst>
+              <a:gd name="adj" fmla="val 2329"/>
+            </a:avLst>
+          </a:prstGeom>
+          <a:ln>
+            <a:solidFill>
+              <a:schemeClr val="accent1">
+                <a:lumMod val="50000"/>
+              </a:schemeClr>
+            </a:solidFill>
+          </a:ln>
+        </p:spPr>
+        <p:style>
+          <a:lnRef idx="2">
+            <a:schemeClr val="accent6"/>
+          </a:lnRef>
+          <a:fillRef idx="1">
+            <a:schemeClr val="lt1"/>
+          </a:fillRef>
+          <a:effectRef idx="0">
+            <a:schemeClr val="accent6"/>
+          </a:effectRef>
+          <a:fontRef idx="minor">
+            <a:schemeClr val="dk1"/>
+          </a:fontRef>
+        </p:style>
+        <p:txBody>
+          <a:bodyPr rtlCol="0" anchor="ctr"/>
+          <a:lstStyle/>
+          <a:p>
+            <a:pPr algn="ctr"/>
             <a:r>
               <a:rPr lang="de-DE" dirty="0"/>
-              <a:t>Points</a:t>
+              <a:t>Real World</a:t>
+            </a:r>
+            <a:endParaRPr lang="en-GB" dirty="0"/>
+          </a:p>
+        </p:txBody>
+      </p:sp>
+      <p:sp>
+        <p:nvSpPr>
+          <p:cNvPr id="18" name="Rechteck: abgerundete Ecken 17">
+            <a:extLst>
+              <a:ext uri="{FF2B5EF4-FFF2-40B4-BE49-F238E27FC236}">
+                <a16:creationId xmlns:a16="http://schemas.microsoft.com/office/drawing/2014/main" id="{6584CEAC-5F6B-4D92-A39D-A47030D6BBD1}"/>
+              </a:ext>
+            </a:extLst>
+          </p:cNvPr>
+          <p:cNvSpPr/>
+          <p:nvPr/>
+        </p:nvSpPr>
+        <p:spPr>
+          <a:xfrm>
+            <a:off x="1166403" y="1616253"/>
+            <a:ext cx="1794125" cy="560513"/>
+          </a:xfrm>
+          <a:prstGeom prst="roundRect">
+            <a:avLst>
+              <a:gd name="adj" fmla="val 2329"/>
+            </a:avLst>
+          </a:prstGeom>
+          <a:ln>
+            <a:solidFill>
+              <a:schemeClr val="accent1">
+                <a:lumMod val="50000"/>
+              </a:schemeClr>
+            </a:solidFill>
+          </a:ln>
+        </p:spPr>
+        <p:style>
+          <a:lnRef idx="2">
+            <a:schemeClr val="accent6"/>
+          </a:lnRef>
+          <a:fillRef idx="1">
+            <a:schemeClr val="lt1"/>
+          </a:fillRef>
+          <a:effectRef idx="0">
+            <a:schemeClr val="accent6"/>
+          </a:effectRef>
+          <a:fontRef idx="minor">
+            <a:schemeClr val="dk1"/>
+          </a:fontRef>
+        </p:style>
+        <p:txBody>
+          <a:bodyPr rtlCol="0" anchor="ctr"/>
+          <a:lstStyle/>
+          <a:p>
+            <a:pPr algn="ctr"/>
+            <a:r>
+              <a:rPr lang="de-DE" dirty="0"/>
+              <a:t>Real </a:t>
+            </a:r>
+            <a:r>
+              <a:rPr lang="en-GB" dirty="0"/>
+              <a:t>World</a:t>
+            </a:r>
+            <a:r>
+              <a:rPr lang="de-DE" dirty="0"/>
+              <a:t> Model</a:t>
+            </a:r>
+            <a:endParaRPr lang="en-GB" dirty="0"/>
+          </a:p>
+        </p:txBody>
+      </p:sp>
+      <p:cxnSp>
+        <p:nvCxnSpPr>
+          <p:cNvPr id="20" name="Gerade Verbindung mit Pfeil 19">
+            <a:extLst>
+              <a:ext uri="{FF2B5EF4-FFF2-40B4-BE49-F238E27FC236}">
+                <a16:creationId xmlns:a16="http://schemas.microsoft.com/office/drawing/2014/main" id="{A1C0F26C-FA4E-4346-93DC-CDF6EE3108C2}"/>
+              </a:ext>
+            </a:extLst>
+          </p:cNvPr>
+          <p:cNvCxnSpPr>
+            <a:cxnSpLocks/>
+            <a:stCxn id="18" idx="2"/>
+            <a:endCxn id="23" idx="0"/>
+          </p:cNvCxnSpPr>
+          <p:nvPr/>
+        </p:nvCxnSpPr>
+        <p:spPr>
+          <a:xfrm flipH="1">
+            <a:off x="2063465" y="2176766"/>
+            <a:ext cx="1" cy="360013"/>
+          </a:xfrm>
+          <a:prstGeom prst="straightConnector1">
+            <a:avLst/>
+          </a:prstGeom>
+          <a:ln>
+            <a:tailEnd type="triangle"/>
+          </a:ln>
+        </p:spPr>
+        <p:style>
+          <a:lnRef idx="1">
+            <a:schemeClr val="accent1"/>
+          </a:lnRef>
+          <a:fillRef idx="0">
+            <a:schemeClr val="accent1"/>
+          </a:fillRef>
+          <a:effectRef idx="0">
+            <a:schemeClr val="accent1"/>
+          </a:effectRef>
+          <a:fontRef idx="minor">
+            <a:schemeClr val="tx1"/>
+          </a:fontRef>
+        </p:style>
+      </p:cxnSp>
+      <p:sp>
+        <p:nvSpPr>
+          <p:cNvPr id="23" name="Rechteck: abgerundete Ecken 22">
+            <a:extLst>
+              <a:ext uri="{FF2B5EF4-FFF2-40B4-BE49-F238E27FC236}">
+                <a16:creationId xmlns:a16="http://schemas.microsoft.com/office/drawing/2014/main" id="{DABC6553-CEE3-4320-8683-FE14BA91697F}"/>
+              </a:ext>
+            </a:extLst>
+          </p:cNvPr>
+          <p:cNvSpPr/>
+          <p:nvPr/>
+        </p:nvSpPr>
+        <p:spPr>
+          <a:xfrm>
+            <a:off x="1166402" y="2536779"/>
+            <a:ext cx="1794125" cy="560513"/>
+          </a:xfrm>
+          <a:prstGeom prst="roundRect">
+            <a:avLst>
+              <a:gd name="adj" fmla="val 2329"/>
+            </a:avLst>
+          </a:prstGeom>
+          <a:ln>
+            <a:solidFill>
+              <a:schemeClr val="accent1">
+                <a:lumMod val="50000"/>
+              </a:schemeClr>
+            </a:solidFill>
+          </a:ln>
+        </p:spPr>
+        <p:style>
+          <a:lnRef idx="2">
+            <a:schemeClr val="accent6"/>
+          </a:lnRef>
+          <a:fillRef idx="1">
+            <a:schemeClr val="lt1"/>
+          </a:fillRef>
+          <a:effectRef idx="0">
+            <a:schemeClr val="accent6"/>
+          </a:effectRef>
+          <a:fontRef idx="minor">
+            <a:schemeClr val="dk1"/>
+          </a:fontRef>
+        </p:style>
+        <p:txBody>
+          <a:bodyPr rtlCol="0" anchor="ctr"/>
+          <a:lstStyle/>
+          <a:p>
+            <a:pPr algn="ctr"/>
+            <a:r>
+              <a:rPr lang="de-DE" dirty="0"/>
+              <a:t>Parametrised Program</a:t>
+            </a:r>
+            <a:endParaRPr lang="en-GB" dirty="0"/>
+          </a:p>
+        </p:txBody>
+      </p:sp>
+      <p:sp>
+        <p:nvSpPr>
+          <p:cNvPr id="27" name="Rechteck: abgerundete Ecken 26">
+            <a:extLst>
+              <a:ext uri="{FF2B5EF4-FFF2-40B4-BE49-F238E27FC236}">
+                <a16:creationId xmlns:a16="http://schemas.microsoft.com/office/drawing/2014/main" id="{1586ECF8-8B97-47DD-92AA-60700AD8D881}"/>
+              </a:ext>
+            </a:extLst>
+          </p:cNvPr>
+          <p:cNvSpPr/>
+          <p:nvPr/>
+        </p:nvSpPr>
+        <p:spPr>
+          <a:xfrm>
+            <a:off x="3786008" y="1653283"/>
+            <a:ext cx="1681219" cy="486452"/>
+          </a:xfrm>
+          <a:prstGeom prst="roundRect">
+            <a:avLst>
+              <a:gd name="adj" fmla="val 2329"/>
+            </a:avLst>
+          </a:prstGeom>
+          <a:ln>
+            <a:solidFill>
+              <a:schemeClr val="accent1">
+                <a:lumMod val="50000"/>
+              </a:schemeClr>
+            </a:solidFill>
+          </a:ln>
+        </p:spPr>
+        <p:style>
+          <a:lnRef idx="2">
+            <a:schemeClr val="accent6"/>
+          </a:lnRef>
+          <a:fillRef idx="1">
+            <a:schemeClr val="lt1"/>
+          </a:fillRef>
+          <a:effectRef idx="0">
+            <a:schemeClr val="accent6"/>
+          </a:effectRef>
+          <a:fontRef idx="minor">
+            <a:schemeClr val="dk1"/>
+          </a:fontRef>
+        </p:style>
+        <p:txBody>
+          <a:bodyPr rtlCol="0" anchor="ctr"/>
+          <a:lstStyle/>
+          <a:p>
+            <a:pPr algn="ctr"/>
+            <a:r>
+              <a:rPr lang="de-DE" dirty="0"/>
+              <a:t>Input Module</a:t>
+            </a:r>
+            <a:endParaRPr lang="en-GB" dirty="0"/>
+          </a:p>
+        </p:txBody>
+      </p:sp>
+      <p:cxnSp>
+        <p:nvCxnSpPr>
+          <p:cNvPr id="28" name="Gerade Verbindung mit Pfeil 27">
+            <a:extLst>
+              <a:ext uri="{FF2B5EF4-FFF2-40B4-BE49-F238E27FC236}">
+                <a16:creationId xmlns:a16="http://schemas.microsoft.com/office/drawing/2014/main" id="{B182AF0E-464F-4D4B-8D69-678935DBA018}"/>
+              </a:ext>
+            </a:extLst>
+          </p:cNvPr>
+          <p:cNvCxnSpPr>
+            <a:cxnSpLocks/>
+            <a:stCxn id="27" idx="1"/>
+          </p:cNvCxnSpPr>
+          <p:nvPr/>
+        </p:nvCxnSpPr>
+        <p:spPr>
+          <a:xfrm flipH="1">
+            <a:off x="2960528" y="1896509"/>
+            <a:ext cx="825480" cy="0"/>
+          </a:xfrm>
+          <a:prstGeom prst="straightConnector1">
+            <a:avLst/>
+          </a:prstGeom>
+          <a:ln>
+            <a:tailEnd type="triangle"/>
+          </a:ln>
+        </p:spPr>
+        <p:style>
+          <a:lnRef idx="1">
+            <a:schemeClr val="accent1"/>
+          </a:lnRef>
+          <a:fillRef idx="0">
+            <a:schemeClr val="accent1"/>
+          </a:fillRef>
+          <a:effectRef idx="0">
+            <a:schemeClr val="accent1"/>
+          </a:effectRef>
+          <a:fontRef idx="minor">
+            <a:schemeClr val="tx1"/>
+          </a:fontRef>
+        </p:style>
+      </p:cxnSp>
+      <p:cxnSp>
+        <p:nvCxnSpPr>
+          <p:cNvPr id="31" name="Gerade Verbindung mit Pfeil 30">
+            <a:extLst>
+              <a:ext uri="{FF2B5EF4-FFF2-40B4-BE49-F238E27FC236}">
+                <a16:creationId xmlns:a16="http://schemas.microsoft.com/office/drawing/2014/main" id="{C4243D25-332E-4E81-8693-6A080D6E24CD}"/>
+              </a:ext>
+            </a:extLst>
+          </p:cNvPr>
+          <p:cNvCxnSpPr>
+            <a:cxnSpLocks/>
+          </p:cNvCxnSpPr>
+          <p:nvPr/>
+        </p:nvCxnSpPr>
+        <p:spPr>
+          <a:xfrm flipV="1">
+            <a:off x="6412636" y="1896509"/>
+            <a:ext cx="0" cy="1452367"/>
+          </a:xfrm>
+          <a:prstGeom prst="straightConnector1">
+            <a:avLst/>
+          </a:prstGeom>
+          <a:ln>
+            <a:tailEnd type="none"/>
+          </a:ln>
+        </p:spPr>
+        <p:style>
+          <a:lnRef idx="1">
+            <a:schemeClr val="accent1"/>
+          </a:lnRef>
+          <a:fillRef idx="0">
+            <a:schemeClr val="accent1"/>
+          </a:fillRef>
+          <a:effectRef idx="0">
+            <a:schemeClr val="accent1"/>
+          </a:effectRef>
+          <a:fontRef idx="minor">
+            <a:schemeClr val="tx1"/>
+          </a:fontRef>
+        </p:style>
+      </p:cxnSp>
+      <p:cxnSp>
+        <p:nvCxnSpPr>
+          <p:cNvPr id="39" name="Gerade Verbindung mit Pfeil 38">
+            <a:extLst>
+              <a:ext uri="{FF2B5EF4-FFF2-40B4-BE49-F238E27FC236}">
+                <a16:creationId xmlns:a16="http://schemas.microsoft.com/office/drawing/2014/main" id="{94461C56-FE09-47F6-92B0-D9C7B7B9E494}"/>
+              </a:ext>
+            </a:extLst>
+          </p:cNvPr>
+          <p:cNvCxnSpPr>
+            <a:cxnSpLocks/>
+          </p:cNvCxnSpPr>
+          <p:nvPr/>
+        </p:nvCxnSpPr>
+        <p:spPr>
+          <a:xfrm flipV="1">
+            <a:off x="6549796" y="1896509"/>
+            <a:ext cx="0" cy="524195"/>
+          </a:xfrm>
+          <a:prstGeom prst="straightConnector1">
+            <a:avLst/>
+          </a:prstGeom>
+          <a:ln>
+            <a:tailEnd type="none"/>
+          </a:ln>
+        </p:spPr>
+        <p:style>
+          <a:lnRef idx="1">
+            <a:schemeClr val="accent1"/>
+          </a:lnRef>
+          <a:fillRef idx="0">
+            <a:schemeClr val="accent1"/>
+          </a:fillRef>
+          <a:effectRef idx="0">
+            <a:schemeClr val="accent1"/>
+          </a:effectRef>
+          <a:fontRef idx="minor">
+            <a:schemeClr val="tx1"/>
+          </a:fontRef>
+        </p:style>
+      </p:cxnSp>
+      <p:sp>
+        <p:nvSpPr>
+          <p:cNvPr id="8" name="Rechteck: abgerundete Ecken 7">
+            <a:extLst>
+              <a:ext uri="{FF2B5EF4-FFF2-40B4-BE49-F238E27FC236}">
+                <a16:creationId xmlns:a16="http://schemas.microsoft.com/office/drawing/2014/main" id="{0EE1C85E-0D9C-4A76-AC05-495EDA69F8E9}"/>
+              </a:ext>
+            </a:extLst>
+          </p:cNvPr>
+          <p:cNvSpPr/>
+          <p:nvPr/>
+        </p:nvSpPr>
+        <p:spPr>
+          <a:xfrm>
+            <a:off x="6170056" y="2420705"/>
+            <a:ext cx="2686050" cy="774700"/>
+          </a:xfrm>
+          <a:prstGeom prst="roundRect">
+            <a:avLst>
+              <a:gd name="adj" fmla="val 2329"/>
+            </a:avLst>
+          </a:prstGeom>
+          <a:ln>
+            <a:solidFill>
+              <a:schemeClr val="accent1">
+                <a:lumMod val="50000"/>
+              </a:schemeClr>
+            </a:solidFill>
+          </a:ln>
+        </p:spPr>
+        <p:style>
+          <a:lnRef idx="2">
+            <a:schemeClr val="accent6"/>
+          </a:lnRef>
+          <a:fillRef idx="1">
+            <a:schemeClr val="lt1"/>
+          </a:fillRef>
+          <a:effectRef idx="0">
+            <a:schemeClr val="accent6"/>
+          </a:effectRef>
+          <a:fontRef idx="minor">
+            <a:schemeClr val="dk1"/>
+          </a:fontRef>
+        </p:style>
+        <p:txBody>
+          <a:bodyPr rtlCol="0" anchor="ctr"/>
+          <a:lstStyle/>
+          <a:p>
+            <a:pPr algn="ctr"/>
+            <a:r>
+              <a:rPr lang="de-DE"/>
+              <a:t>Robot</a:t>
+            </a:r>
+            <a:endParaRPr lang="en-GB"/>
+          </a:p>
+        </p:txBody>
+      </p:sp>
+      <p:cxnSp>
+        <p:nvCxnSpPr>
+          <p:cNvPr id="41" name="Gerade Verbindung mit Pfeil 40">
+            <a:extLst>
+              <a:ext uri="{FF2B5EF4-FFF2-40B4-BE49-F238E27FC236}">
+                <a16:creationId xmlns:a16="http://schemas.microsoft.com/office/drawing/2014/main" id="{0CF69183-DCB1-40BC-B1B5-EBA0CDEAD6FA}"/>
+              </a:ext>
+            </a:extLst>
+          </p:cNvPr>
+          <p:cNvCxnSpPr>
+            <a:cxnSpLocks/>
+            <a:stCxn id="27" idx="3"/>
+          </p:cNvCxnSpPr>
+          <p:nvPr/>
+        </p:nvCxnSpPr>
+        <p:spPr>
+          <a:xfrm>
+            <a:off x="5467227" y="1896509"/>
+            <a:ext cx="1082569" cy="0"/>
+          </a:xfrm>
+          <a:prstGeom prst="straightConnector1">
+            <a:avLst/>
+          </a:prstGeom>
+          <a:ln>
+            <a:headEnd type="triangle"/>
+            <a:tailEnd type="none" w="sm" len="med"/>
+          </a:ln>
+        </p:spPr>
+        <p:style>
+          <a:lnRef idx="1">
+            <a:schemeClr val="accent1"/>
+          </a:lnRef>
+          <a:fillRef idx="0">
+            <a:schemeClr val="accent1"/>
+          </a:fillRef>
+          <a:effectRef idx="0">
+            <a:schemeClr val="accent1"/>
+          </a:effectRef>
+          <a:fontRef idx="minor">
+            <a:schemeClr val="tx1"/>
+          </a:fontRef>
+        </p:style>
+      </p:cxnSp>
+      <p:sp>
+        <p:nvSpPr>
+          <p:cNvPr id="44" name="Rechteck: abgerundete Ecken 43">
+            <a:extLst>
+              <a:ext uri="{FF2B5EF4-FFF2-40B4-BE49-F238E27FC236}">
+                <a16:creationId xmlns:a16="http://schemas.microsoft.com/office/drawing/2014/main" id="{42285917-BC21-4C24-8318-EEEAF4673BF2}"/>
+              </a:ext>
+            </a:extLst>
+          </p:cNvPr>
+          <p:cNvSpPr/>
+          <p:nvPr/>
+        </p:nvSpPr>
+        <p:spPr>
+          <a:xfrm>
+            <a:off x="1166403" y="3457306"/>
+            <a:ext cx="1794125" cy="560513"/>
+          </a:xfrm>
+          <a:prstGeom prst="roundRect">
+            <a:avLst>
+              <a:gd name="adj" fmla="val 2329"/>
+            </a:avLst>
+          </a:prstGeom>
+          <a:ln>
+            <a:solidFill>
+              <a:schemeClr val="accent1">
+                <a:lumMod val="50000"/>
+              </a:schemeClr>
+            </a:solidFill>
+          </a:ln>
+        </p:spPr>
+        <p:style>
+          <a:lnRef idx="2">
+            <a:schemeClr val="accent6"/>
+          </a:lnRef>
+          <a:fillRef idx="1">
+            <a:schemeClr val="lt1"/>
+          </a:fillRef>
+          <a:effectRef idx="0">
+            <a:schemeClr val="accent6"/>
+          </a:effectRef>
+          <a:fontRef idx="minor">
+            <a:schemeClr val="dk1"/>
+          </a:fontRef>
+        </p:style>
+        <p:txBody>
+          <a:bodyPr rtlCol="0" anchor="ctr"/>
+          <a:lstStyle/>
+          <a:p>
+            <a:pPr algn="ctr"/>
+            <a:r>
+              <a:rPr lang="de-DE" dirty="0"/>
+              <a:t>Core Routine</a:t>
+            </a:r>
+            <a:endParaRPr lang="en-GB" dirty="0"/>
+          </a:p>
+        </p:txBody>
+      </p:sp>
+      <p:cxnSp>
+        <p:nvCxnSpPr>
+          <p:cNvPr id="45" name="Gerade Verbindung mit Pfeil 44">
+            <a:extLst>
+              <a:ext uri="{FF2B5EF4-FFF2-40B4-BE49-F238E27FC236}">
+                <a16:creationId xmlns:a16="http://schemas.microsoft.com/office/drawing/2014/main" id="{2C4A70B6-5D99-403D-966B-0EBA4A79722D}"/>
+              </a:ext>
+            </a:extLst>
+          </p:cNvPr>
+          <p:cNvCxnSpPr>
+            <a:cxnSpLocks/>
+            <a:stCxn id="23" idx="2"/>
+            <a:endCxn id="44" idx="0"/>
+          </p:cNvCxnSpPr>
+          <p:nvPr/>
+        </p:nvCxnSpPr>
+        <p:spPr>
+          <a:xfrm>
+            <a:off x="2063465" y="3097292"/>
+            <a:ext cx="1" cy="360014"/>
+          </a:xfrm>
+          <a:prstGeom prst="straightConnector1">
+            <a:avLst/>
+          </a:prstGeom>
+          <a:ln>
+            <a:tailEnd type="triangle"/>
+          </a:ln>
+        </p:spPr>
+        <p:style>
+          <a:lnRef idx="1">
+            <a:schemeClr val="accent1"/>
+          </a:lnRef>
+          <a:fillRef idx="0">
+            <a:schemeClr val="accent1"/>
+          </a:fillRef>
+          <a:effectRef idx="0">
+            <a:schemeClr val="accent1"/>
+          </a:effectRef>
+          <a:fontRef idx="minor">
+            <a:schemeClr val="tx1"/>
+          </a:fontRef>
+        </p:style>
+      </p:cxnSp>
+      <p:sp>
+        <p:nvSpPr>
+          <p:cNvPr id="48" name="Rechteck: abgerundete Ecken 47">
+            <a:extLst>
+              <a:ext uri="{FF2B5EF4-FFF2-40B4-BE49-F238E27FC236}">
+                <a16:creationId xmlns:a16="http://schemas.microsoft.com/office/drawing/2014/main" id="{99C8273D-4EAB-4804-983D-20448A5965A8}"/>
+              </a:ext>
+            </a:extLst>
+          </p:cNvPr>
+          <p:cNvSpPr/>
+          <p:nvPr/>
+        </p:nvSpPr>
+        <p:spPr>
+          <a:xfrm>
+            <a:off x="3786008" y="3492999"/>
+            <a:ext cx="1681219" cy="486452"/>
+          </a:xfrm>
+          <a:prstGeom prst="roundRect">
+            <a:avLst>
+              <a:gd name="adj" fmla="val 2329"/>
+            </a:avLst>
+          </a:prstGeom>
+          <a:ln>
+            <a:solidFill>
+              <a:schemeClr val="accent1">
+                <a:lumMod val="50000"/>
+              </a:schemeClr>
+            </a:solidFill>
+          </a:ln>
+        </p:spPr>
+        <p:style>
+          <a:lnRef idx="2">
+            <a:schemeClr val="accent6"/>
+          </a:lnRef>
+          <a:fillRef idx="1">
+            <a:schemeClr val="lt1"/>
+          </a:fillRef>
+          <a:effectRef idx="0">
+            <a:schemeClr val="accent6"/>
+          </a:effectRef>
+          <a:fontRef idx="minor">
+            <a:schemeClr val="dk1"/>
+          </a:fontRef>
+        </p:style>
+        <p:txBody>
+          <a:bodyPr rtlCol="0" anchor="ctr"/>
+          <a:lstStyle/>
+          <a:p>
+            <a:pPr algn="ctr"/>
+            <a:r>
+              <a:rPr lang="de-DE" dirty="0"/>
+              <a:t>Output Module</a:t>
+            </a:r>
+            <a:endParaRPr lang="en-GB" dirty="0"/>
+          </a:p>
+        </p:txBody>
+      </p:sp>
+      <p:cxnSp>
+        <p:nvCxnSpPr>
+          <p:cNvPr id="49" name="Gerade Verbindung mit Pfeil 48">
+            <a:extLst>
+              <a:ext uri="{FF2B5EF4-FFF2-40B4-BE49-F238E27FC236}">
+                <a16:creationId xmlns:a16="http://schemas.microsoft.com/office/drawing/2014/main" id="{59BA4E27-F1D3-4071-9B6E-C5810697322C}"/>
+              </a:ext>
+            </a:extLst>
+          </p:cNvPr>
+          <p:cNvCxnSpPr>
+            <a:cxnSpLocks/>
+            <a:stCxn id="44" idx="3"/>
+            <a:endCxn id="48" idx="1"/>
+          </p:cNvCxnSpPr>
+          <p:nvPr/>
+        </p:nvCxnSpPr>
+        <p:spPr>
+          <a:xfrm flipV="1">
+            <a:off x="2960528" y="3736225"/>
+            <a:ext cx="825480" cy="1338"/>
+          </a:xfrm>
+          <a:prstGeom prst="straightConnector1">
+            <a:avLst/>
+          </a:prstGeom>
+          <a:ln>
+            <a:tailEnd type="triangle"/>
+          </a:ln>
+        </p:spPr>
+        <p:style>
+          <a:lnRef idx="1">
+            <a:schemeClr val="accent1"/>
+          </a:lnRef>
+          <a:fillRef idx="0">
+            <a:schemeClr val="accent1"/>
+          </a:fillRef>
+          <a:effectRef idx="0">
+            <a:schemeClr val="accent1"/>
+          </a:effectRef>
+          <a:fontRef idx="minor">
+            <a:schemeClr val="tx1"/>
+          </a:fontRef>
+        </p:style>
+      </p:cxnSp>
+      <p:cxnSp>
+        <p:nvCxnSpPr>
+          <p:cNvPr id="56" name="Gerade Verbindung mit Pfeil 55">
+            <a:extLst>
+              <a:ext uri="{FF2B5EF4-FFF2-40B4-BE49-F238E27FC236}">
+                <a16:creationId xmlns:a16="http://schemas.microsoft.com/office/drawing/2014/main" id="{B8870C48-B767-445B-882B-002998E960CA}"/>
+              </a:ext>
+            </a:extLst>
+          </p:cNvPr>
+          <p:cNvCxnSpPr>
+            <a:cxnSpLocks/>
+            <a:endCxn id="48" idx="3"/>
+          </p:cNvCxnSpPr>
+          <p:nvPr/>
+        </p:nvCxnSpPr>
+        <p:spPr>
+          <a:xfrm flipH="1">
+            <a:off x="5467227" y="3736225"/>
+            <a:ext cx="133473" cy="0"/>
+          </a:xfrm>
+          <a:prstGeom prst="straightConnector1">
+            <a:avLst/>
+          </a:prstGeom>
+          <a:ln>
+            <a:tailEnd type="none"/>
+          </a:ln>
+        </p:spPr>
+        <p:style>
+          <a:lnRef idx="1">
+            <a:schemeClr val="accent1"/>
+          </a:lnRef>
+          <a:fillRef idx="0">
+            <a:schemeClr val="accent1"/>
+          </a:fillRef>
+          <a:effectRef idx="0">
+            <a:schemeClr val="accent1"/>
+          </a:effectRef>
+          <a:fontRef idx="minor">
+            <a:schemeClr val="tx1"/>
+          </a:fontRef>
+        </p:style>
+      </p:cxnSp>
+      <p:cxnSp>
+        <p:nvCxnSpPr>
+          <p:cNvPr id="59" name="Gerade Verbindung mit Pfeil 58">
+            <a:extLst>
+              <a:ext uri="{FF2B5EF4-FFF2-40B4-BE49-F238E27FC236}">
+                <a16:creationId xmlns:a16="http://schemas.microsoft.com/office/drawing/2014/main" id="{ABF5093D-A0B5-4F06-8196-FDEF314BA61F}"/>
+              </a:ext>
+            </a:extLst>
+          </p:cNvPr>
+          <p:cNvCxnSpPr>
+            <a:cxnSpLocks/>
+          </p:cNvCxnSpPr>
+          <p:nvPr/>
+        </p:nvCxnSpPr>
+        <p:spPr>
+          <a:xfrm flipV="1">
+            <a:off x="5600700" y="2808055"/>
+            <a:ext cx="0" cy="1856340"/>
+          </a:xfrm>
+          <a:prstGeom prst="straightConnector1">
+            <a:avLst/>
+          </a:prstGeom>
+          <a:ln>
+            <a:tailEnd type="none"/>
+          </a:ln>
+        </p:spPr>
+        <p:style>
+          <a:lnRef idx="1">
+            <a:schemeClr val="accent1"/>
+          </a:lnRef>
+          <a:fillRef idx="0">
+            <a:schemeClr val="accent1"/>
+          </a:fillRef>
+          <a:effectRef idx="0">
+            <a:schemeClr val="accent1"/>
+          </a:effectRef>
+          <a:fontRef idx="minor">
+            <a:schemeClr val="tx1"/>
+          </a:fontRef>
+        </p:style>
+      </p:cxnSp>
+      <p:cxnSp>
+        <p:nvCxnSpPr>
+          <p:cNvPr id="62" name="Gerade Verbindung mit Pfeil 61">
+            <a:extLst>
+              <a:ext uri="{FF2B5EF4-FFF2-40B4-BE49-F238E27FC236}">
+                <a16:creationId xmlns:a16="http://schemas.microsoft.com/office/drawing/2014/main" id="{73ECA085-1E65-4152-AD1C-036817D1C76A}"/>
+              </a:ext>
+            </a:extLst>
+          </p:cNvPr>
+          <p:cNvCxnSpPr>
+            <a:cxnSpLocks/>
+            <a:endCxn id="8" idx="1"/>
+          </p:cNvCxnSpPr>
+          <p:nvPr/>
+        </p:nvCxnSpPr>
+        <p:spPr>
+          <a:xfrm>
+            <a:off x="5600700" y="2808055"/>
+            <a:ext cx="569356" cy="0"/>
+          </a:xfrm>
+          <a:prstGeom prst="straightConnector1">
+            <a:avLst/>
+          </a:prstGeom>
+          <a:ln>
+            <a:tailEnd type="triangle"/>
+          </a:ln>
+        </p:spPr>
+        <p:style>
+          <a:lnRef idx="1">
+            <a:schemeClr val="accent1"/>
+          </a:lnRef>
+          <a:fillRef idx="0">
+            <a:schemeClr val="accent1"/>
+          </a:fillRef>
+          <a:effectRef idx="0">
+            <a:schemeClr val="accent1"/>
+          </a:effectRef>
+          <a:fontRef idx="minor">
+            <a:schemeClr val="tx1"/>
+          </a:fontRef>
+        </p:style>
+      </p:cxnSp>
+      <p:cxnSp>
+        <p:nvCxnSpPr>
+          <p:cNvPr id="65" name="Gerade Verbindung mit Pfeil 64">
+            <a:extLst>
+              <a:ext uri="{FF2B5EF4-FFF2-40B4-BE49-F238E27FC236}">
+                <a16:creationId xmlns:a16="http://schemas.microsoft.com/office/drawing/2014/main" id="{073FFB52-F35E-43EC-B25B-4E4DB56FE475}"/>
+              </a:ext>
+            </a:extLst>
+          </p:cNvPr>
+          <p:cNvCxnSpPr>
+            <a:cxnSpLocks/>
+            <a:endCxn id="17" idx="1"/>
+          </p:cNvCxnSpPr>
+          <p:nvPr/>
+        </p:nvCxnSpPr>
+        <p:spPr>
+          <a:xfrm>
+            <a:off x="5600700" y="3736225"/>
+            <a:ext cx="569356" cy="0"/>
+          </a:xfrm>
+          <a:prstGeom prst="straightConnector1">
+            <a:avLst/>
+          </a:prstGeom>
+          <a:ln>
+            <a:tailEnd type="triangle"/>
+          </a:ln>
+        </p:spPr>
+        <p:style>
+          <a:lnRef idx="1">
+            <a:schemeClr val="accent1"/>
+          </a:lnRef>
+          <a:fillRef idx="0">
+            <a:schemeClr val="accent1"/>
+          </a:fillRef>
+          <a:effectRef idx="0">
+            <a:schemeClr val="accent1"/>
+          </a:effectRef>
+          <a:fontRef idx="minor">
+            <a:schemeClr val="tx1"/>
+          </a:fontRef>
+        </p:style>
+      </p:cxnSp>
+      <p:cxnSp>
+        <p:nvCxnSpPr>
+          <p:cNvPr id="68" name="Gerade Verbindung mit Pfeil 67">
+            <a:extLst>
+              <a:ext uri="{FF2B5EF4-FFF2-40B4-BE49-F238E27FC236}">
+                <a16:creationId xmlns:a16="http://schemas.microsoft.com/office/drawing/2014/main" id="{E64F7B0B-0AB9-4A52-A764-36FAF10EBE75}"/>
+              </a:ext>
+            </a:extLst>
+          </p:cNvPr>
+          <p:cNvCxnSpPr>
+            <a:cxnSpLocks/>
+            <a:endCxn id="10" idx="1"/>
+          </p:cNvCxnSpPr>
+          <p:nvPr/>
+        </p:nvCxnSpPr>
+        <p:spPr>
+          <a:xfrm>
+            <a:off x="5600700" y="4664395"/>
+            <a:ext cx="569356" cy="0"/>
+          </a:xfrm>
+          <a:prstGeom prst="straightConnector1">
+            <a:avLst/>
+          </a:prstGeom>
+          <a:ln>
+            <a:tailEnd type="triangle"/>
+          </a:ln>
+        </p:spPr>
+        <p:style>
+          <a:lnRef idx="1">
+            <a:schemeClr val="accent1"/>
+          </a:lnRef>
+          <a:fillRef idx="0">
+            <a:schemeClr val="accent1"/>
+          </a:fillRef>
+          <a:effectRef idx="0">
+            <a:schemeClr val="accent1"/>
+          </a:effectRef>
+          <a:fontRef idx="minor">
+            <a:schemeClr val="tx1"/>
+          </a:fontRef>
+        </p:style>
+      </p:cxnSp>
+      <p:sp>
+        <p:nvSpPr>
+          <p:cNvPr id="85" name="Rechteck 84">
+            <a:extLst>
+              <a:ext uri="{FF2B5EF4-FFF2-40B4-BE49-F238E27FC236}">
+                <a16:creationId xmlns:a16="http://schemas.microsoft.com/office/drawing/2014/main" id="{30E04E0C-301E-4FB0-B0C1-D2D1CA5A00DE}"/>
+              </a:ext>
+            </a:extLst>
+          </p:cNvPr>
+          <p:cNvSpPr/>
+          <p:nvPr/>
+        </p:nvSpPr>
+        <p:spPr>
+          <a:xfrm>
+            <a:off x="838896" y="2358628"/>
+            <a:ext cx="84926" cy="881269"/>
+          </a:xfrm>
+          <a:prstGeom prst="rect">
+            <a:avLst/>
+          </a:prstGeom>
+          <a:ln>
+            <a:noFill/>
+          </a:ln>
+        </p:spPr>
+        <p:style>
+          <a:lnRef idx="2">
+            <a:schemeClr val="accent6"/>
+          </a:lnRef>
+          <a:fillRef idx="1">
+            <a:schemeClr val="lt1"/>
+          </a:fillRef>
+          <a:effectRef idx="0">
+            <a:schemeClr val="accent6"/>
+          </a:effectRef>
+          <a:fontRef idx="minor">
+            <a:schemeClr val="dk1"/>
+          </a:fontRef>
+        </p:style>
+        <p:txBody>
+          <a:bodyPr rtlCol="0" anchor="ctr"/>
+          <a:lstStyle/>
+          <a:p>
+            <a:pPr algn="ctr"/>
+            <a:endParaRPr lang="en-GB"/>
+          </a:p>
+        </p:txBody>
+      </p:sp>
+      <p:sp>
+        <p:nvSpPr>
+          <p:cNvPr id="94" name="Rechteck: abgerundete Ecken 93">
+            <a:extLst>
+              <a:ext uri="{FF2B5EF4-FFF2-40B4-BE49-F238E27FC236}">
+                <a16:creationId xmlns:a16="http://schemas.microsoft.com/office/drawing/2014/main" id="{0F7EF4E0-08AD-4ACD-8595-C5DF43BC649C}"/>
+              </a:ext>
+            </a:extLst>
+          </p:cNvPr>
+          <p:cNvSpPr/>
+          <p:nvPr/>
+        </p:nvSpPr>
+        <p:spPr>
+          <a:xfrm>
+            <a:off x="845195" y="2012764"/>
+            <a:ext cx="248061" cy="368394"/>
+          </a:xfrm>
+          <a:prstGeom prst="roundRect">
+            <a:avLst>
+              <a:gd name="adj" fmla="val 2329"/>
+            </a:avLst>
+          </a:prstGeom>
+          <a:solidFill>
+            <a:schemeClr val="bg1">
+              <a:lumMod val="95000"/>
+            </a:schemeClr>
+          </a:solidFill>
+          <a:ln>
+            <a:solidFill>
+              <a:schemeClr val="accent1">
+                <a:lumMod val="50000"/>
+              </a:schemeClr>
+            </a:solidFill>
+          </a:ln>
+        </p:spPr>
+        <p:style>
+          <a:lnRef idx="2">
+            <a:schemeClr val="accent6"/>
+          </a:lnRef>
+          <a:fillRef idx="1">
+            <a:schemeClr val="lt1"/>
+          </a:fillRef>
+          <a:effectRef idx="0">
+            <a:schemeClr val="accent6"/>
+          </a:effectRef>
+          <a:fontRef idx="minor">
+            <a:schemeClr val="dk1"/>
+          </a:fontRef>
+        </p:style>
+        <p:txBody>
+          <a:bodyPr rtlCol="0" anchor="ctr"/>
+          <a:lstStyle/>
+          <a:p>
+            <a:pPr algn="ctr"/>
+            <a:endParaRPr lang="en-GB" dirty="0"/>
+          </a:p>
+        </p:txBody>
+      </p:sp>
+      <p:sp>
+        <p:nvSpPr>
+          <p:cNvPr id="95" name="Rechteck 94">
+            <a:extLst>
+              <a:ext uri="{FF2B5EF4-FFF2-40B4-BE49-F238E27FC236}">
+                <a16:creationId xmlns:a16="http://schemas.microsoft.com/office/drawing/2014/main" id="{51FA1973-38F4-43BF-8FC3-B8A3F5F80F04}"/>
+              </a:ext>
+            </a:extLst>
+          </p:cNvPr>
+          <p:cNvSpPr/>
+          <p:nvPr/>
+        </p:nvSpPr>
+        <p:spPr>
+          <a:xfrm>
+            <a:off x="852764" y="1984773"/>
+            <a:ext cx="264102" cy="214523"/>
+          </a:xfrm>
+          <a:prstGeom prst="rect">
+            <a:avLst/>
+          </a:prstGeom>
+          <a:solidFill>
+            <a:schemeClr val="bg1">
+              <a:lumMod val="95000"/>
+            </a:schemeClr>
+          </a:solidFill>
+          <a:ln>
+            <a:noFill/>
+          </a:ln>
+        </p:spPr>
+        <p:style>
+          <a:lnRef idx="2">
+            <a:schemeClr val="accent6"/>
+          </a:lnRef>
+          <a:fillRef idx="1">
+            <a:schemeClr val="lt1"/>
+          </a:fillRef>
+          <a:effectRef idx="0">
+            <a:schemeClr val="accent6"/>
+          </a:effectRef>
+          <a:fontRef idx="minor">
+            <a:schemeClr val="dk1"/>
+          </a:fontRef>
+        </p:style>
+        <p:txBody>
+          <a:bodyPr rtlCol="0" anchor="ctr"/>
+          <a:lstStyle/>
+          <a:p>
+            <a:pPr algn="ctr"/>
+            <a:endParaRPr lang="en-GB"/>
+          </a:p>
+        </p:txBody>
+      </p:sp>
+      <p:sp>
+        <p:nvSpPr>
+          <p:cNvPr id="96" name="Rechteck 95">
+            <a:extLst>
+              <a:ext uri="{FF2B5EF4-FFF2-40B4-BE49-F238E27FC236}">
+                <a16:creationId xmlns:a16="http://schemas.microsoft.com/office/drawing/2014/main" id="{A940C4EE-8AF7-435D-8F5F-0CDCF408E4A5}"/>
+              </a:ext>
+            </a:extLst>
+          </p:cNvPr>
+          <p:cNvSpPr/>
+          <p:nvPr/>
+        </p:nvSpPr>
+        <p:spPr>
+          <a:xfrm>
+            <a:off x="897193" y="2160682"/>
+            <a:ext cx="264102" cy="214523"/>
+          </a:xfrm>
+          <a:prstGeom prst="rect">
+            <a:avLst/>
+          </a:prstGeom>
+          <a:solidFill>
+            <a:schemeClr val="bg1">
+              <a:lumMod val="95000"/>
+            </a:schemeClr>
+          </a:solidFill>
+          <a:ln>
+            <a:noFill/>
+          </a:ln>
+        </p:spPr>
+        <p:style>
+          <a:lnRef idx="2">
+            <a:schemeClr val="accent6"/>
+          </a:lnRef>
+          <a:fillRef idx="1">
+            <a:schemeClr val="lt1"/>
+          </a:fillRef>
+          <a:effectRef idx="0">
+            <a:schemeClr val="accent6"/>
+          </a:effectRef>
+          <a:fontRef idx="minor">
+            <a:schemeClr val="dk1"/>
+          </a:fontRef>
+        </p:style>
+        <p:txBody>
+          <a:bodyPr rtlCol="0" anchor="ctr"/>
+          <a:lstStyle/>
+          <a:p>
+            <a:pPr algn="ctr"/>
+            <a:endParaRPr lang="en-GB"/>
+          </a:p>
+        </p:txBody>
+      </p:sp>
+      <p:sp>
+        <p:nvSpPr>
+          <p:cNvPr id="97" name="Rechteck: abgerundete Ecken 96">
+            <a:extLst>
+              <a:ext uri="{FF2B5EF4-FFF2-40B4-BE49-F238E27FC236}">
+                <a16:creationId xmlns:a16="http://schemas.microsoft.com/office/drawing/2014/main" id="{BB966240-A434-4C97-BB5E-0158513EBE5A}"/>
+              </a:ext>
+            </a:extLst>
+          </p:cNvPr>
+          <p:cNvSpPr/>
+          <p:nvPr/>
+        </p:nvSpPr>
+        <p:spPr>
+          <a:xfrm>
+            <a:off x="845195" y="3229035"/>
+            <a:ext cx="248061" cy="368394"/>
+          </a:xfrm>
+          <a:prstGeom prst="roundRect">
+            <a:avLst>
+              <a:gd name="adj" fmla="val 2329"/>
+            </a:avLst>
+          </a:prstGeom>
+          <a:solidFill>
+            <a:schemeClr val="bg1">
+              <a:lumMod val="95000"/>
+            </a:schemeClr>
+          </a:solidFill>
+          <a:ln>
+            <a:solidFill>
+              <a:schemeClr val="accent1">
+                <a:lumMod val="50000"/>
+              </a:schemeClr>
+            </a:solidFill>
+          </a:ln>
+        </p:spPr>
+        <p:style>
+          <a:lnRef idx="2">
+            <a:schemeClr val="accent6"/>
+          </a:lnRef>
+          <a:fillRef idx="1">
+            <a:schemeClr val="lt1"/>
+          </a:fillRef>
+          <a:effectRef idx="0">
+            <a:schemeClr val="accent6"/>
+          </a:effectRef>
+          <a:fontRef idx="minor">
+            <a:schemeClr val="dk1"/>
+          </a:fontRef>
+        </p:style>
+        <p:txBody>
+          <a:bodyPr rtlCol="0" anchor="ctr"/>
+          <a:lstStyle/>
+          <a:p>
+            <a:pPr algn="ctr"/>
+            <a:endParaRPr lang="en-GB" dirty="0"/>
+          </a:p>
+        </p:txBody>
+      </p:sp>
+      <p:sp>
+        <p:nvSpPr>
+          <p:cNvPr id="98" name="Rechteck 97">
+            <a:extLst>
+              <a:ext uri="{FF2B5EF4-FFF2-40B4-BE49-F238E27FC236}">
+                <a16:creationId xmlns:a16="http://schemas.microsoft.com/office/drawing/2014/main" id="{AC38A12A-EBE5-410A-9BCC-CE2159756E55}"/>
+              </a:ext>
+            </a:extLst>
+          </p:cNvPr>
+          <p:cNvSpPr/>
+          <p:nvPr/>
+        </p:nvSpPr>
+        <p:spPr>
+          <a:xfrm>
+            <a:off x="904363" y="3238308"/>
+            <a:ext cx="264102" cy="214523"/>
+          </a:xfrm>
+          <a:prstGeom prst="rect">
+            <a:avLst/>
+          </a:prstGeom>
+          <a:solidFill>
+            <a:schemeClr val="bg1">
+              <a:lumMod val="95000"/>
+            </a:schemeClr>
+          </a:solidFill>
+          <a:ln>
+            <a:noFill/>
+          </a:ln>
+        </p:spPr>
+        <p:style>
+          <a:lnRef idx="2">
+            <a:schemeClr val="accent6"/>
+          </a:lnRef>
+          <a:fillRef idx="1">
+            <a:schemeClr val="lt1"/>
+          </a:fillRef>
+          <a:effectRef idx="0">
+            <a:schemeClr val="accent6"/>
+          </a:effectRef>
+          <a:fontRef idx="minor">
+            <a:schemeClr val="dk1"/>
+          </a:fontRef>
+        </p:style>
+        <p:txBody>
+          <a:bodyPr rtlCol="0" anchor="ctr"/>
+          <a:lstStyle/>
+          <a:p>
+            <a:pPr algn="ctr"/>
+            <a:endParaRPr lang="en-GB"/>
+          </a:p>
+        </p:txBody>
+      </p:sp>
+      <p:sp>
+        <p:nvSpPr>
+          <p:cNvPr id="99" name="Rechteck 98">
+            <a:extLst>
+              <a:ext uri="{FF2B5EF4-FFF2-40B4-BE49-F238E27FC236}">
+                <a16:creationId xmlns:a16="http://schemas.microsoft.com/office/drawing/2014/main" id="{4DFB57E4-F5F5-49CA-BC75-46DBC7AB2800}"/>
+              </a:ext>
+            </a:extLst>
+          </p:cNvPr>
+          <p:cNvSpPr/>
+          <p:nvPr/>
+        </p:nvSpPr>
+        <p:spPr>
+          <a:xfrm>
+            <a:off x="852764" y="3437042"/>
+            <a:ext cx="264102" cy="245166"/>
+          </a:xfrm>
+          <a:prstGeom prst="rect">
+            <a:avLst/>
+          </a:prstGeom>
+          <a:solidFill>
+            <a:schemeClr val="bg1">
+              <a:lumMod val="95000"/>
+            </a:schemeClr>
+          </a:solidFill>
+          <a:ln>
+            <a:noFill/>
+          </a:ln>
+        </p:spPr>
+        <p:style>
+          <a:lnRef idx="2">
+            <a:schemeClr val="accent6"/>
+          </a:lnRef>
+          <a:fillRef idx="1">
+            <a:schemeClr val="lt1"/>
+          </a:fillRef>
+          <a:effectRef idx="0">
+            <a:schemeClr val="accent6"/>
+          </a:effectRef>
+          <a:fontRef idx="minor">
+            <a:schemeClr val="dk1"/>
+          </a:fontRef>
+        </p:style>
+        <p:txBody>
+          <a:bodyPr rtlCol="0" anchor="ctr"/>
+          <a:lstStyle/>
+          <a:p>
+            <a:pPr algn="ctr"/>
+            <a:endParaRPr lang="en-GB"/>
+          </a:p>
+        </p:txBody>
+      </p:sp>
+      <p:sp>
+        <p:nvSpPr>
+          <p:cNvPr id="100" name="Ellipse 99">
+            <a:extLst>
+              <a:ext uri="{FF2B5EF4-FFF2-40B4-BE49-F238E27FC236}">
+                <a16:creationId xmlns:a16="http://schemas.microsoft.com/office/drawing/2014/main" id="{459A01C4-F8CB-4BD3-832A-DE3A51527352}"/>
+              </a:ext>
+            </a:extLst>
+          </p:cNvPr>
+          <p:cNvSpPr/>
+          <p:nvPr/>
+        </p:nvSpPr>
+        <p:spPr>
+          <a:xfrm>
+            <a:off x="987990" y="1447347"/>
+            <a:ext cx="348008" cy="342604"/>
+          </a:xfrm>
+          <a:prstGeom prst="ellipse">
+            <a:avLst/>
+          </a:prstGeom>
+          <a:ln>
+            <a:solidFill>
+              <a:schemeClr val="tx1"/>
+            </a:solidFill>
+          </a:ln>
+        </p:spPr>
+        <p:style>
+          <a:lnRef idx="2">
+            <a:schemeClr val="accent6"/>
+          </a:lnRef>
+          <a:fillRef idx="1">
+            <a:schemeClr val="lt1"/>
+          </a:fillRef>
+          <a:effectRef idx="0">
+            <a:schemeClr val="accent6"/>
+          </a:effectRef>
+          <a:fontRef idx="minor">
+            <a:schemeClr val="dk1"/>
+          </a:fontRef>
+        </p:style>
+        <p:txBody>
+          <a:bodyPr rtlCol="0" anchor="ctr"/>
+          <a:lstStyle/>
+          <a:p>
+            <a:pPr algn="ctr"/>
+            <a:r>
+              <a:rPr lang="de-DE" dirty="0"/>
+              <a:t>1</a:t>
+            </a:r>
+            <a:endParaRPr lang="en-GB" dirty="0"/>
+          </a:p>
+        </p:txBody>
+      </p:sp>
+      <p:sp>
+        <p:nvSpPr>
+          <p:cNvPr id="101" name="Ellipse 100">
+            <a:extLst>
+              <a:ext uri="{FF2B5EF4-FFF2-40B4-BE49-F238E27FC236}">
+                <a16:creationId xmlns:a16="http://schemas.microsoft.com/office/drawing/2014/main" id="{23B5BB1B-296B-481E-BE77-FE9C5AF5B479}"/>
+              </a:ext>
+            </a:extLst>
+          </p:cNvPr>
+          <p:cNvSpPr/>
+          <p:nvPr/>
+        </p:nvSpPr>
+        <p:spPr>
+          <a:xfrm>
+            <a:off x="981781" y="2645479"/>
+            <a:ext cx="348008" cy="342604"/>
+          </a:xfrm>
+          <a:prstGeom prst="ellipse">
+            <a:avLst/>
+          </a:prstGeom>
+          <a:ln>
+            <a:solidFill>
+              <a:schemeClr val="tx1"/>
+            </a:solidFill>
+          </a:ln>
+        </p:spPr>
+        <p:style>
+          <a:lnRef idx="2">
+            <a:schemeClr val="accent6"/>
+          </a:lnRef>
+          <a:fillRef idx="1">
+            <a:schemeClr val="lt1"/>
+          </a:fillRef>
+          <a:effectRef idx="0">
+            <a:schemeClr val="accent6"/>
+          </a:effectRef>
+          <a:fontRef idx="minor">
+            <a:schemeClr val="dk1"/>
+          </a:fontRef>
+        </p:style>
+        <p:txBody>
+          <a:bodyPr rtlCol="0" anchor="ctr"/>
+          <a:lstStyle/>
+          <a:p>
+            <a:pPr algn="ctr"/>
+            <a:r>
+              <a:rPr lang="de-DE" dirty="0"/>
+              <a:t>2</a:t>
+            </a:r>
+            <a:endParaRPr lang="en-GB" dirty="0"/>
+          </a:p>
+        </p:txBody>
+      </p:sp>
+      <p:sp>
+        <p:nvSpPr>
+          <p:cNvPr id="102" name="Ellipse 101">
+            <a:extLst>
+              <a:ext uri="{FF2B5EF4-FFF2-40B4-BE49-F238E27FC236}">
+                <a16:creationId xmlns:a16="http://schemas.microsoft.com/office/drawing/2014/main" id="{47ECDE48-981A-4FA1-9D62-94A52F32ABC5}"/>
+              </a:ext>
+            </a:extLst>
+          </p:cNvPr>
+          <p:cNvSpPr/>
+          <p:nvPr/>
+        </p:nvSpPr>
+        <p:spPr>
+          <a:xfrm>
+            <a:off x="986681" y="3842310"/>
+            <a:ext cx="348008" cy="342604"/>
+          </a:xfrm>
+          <a:prstGeom prst="ellipse">
+            <a:avLst/>
+          </a:prstGeom>
+          <a:ln>
+            <a:solidFill>
+              <a:schemeClr val="tx1"/>
+            </a:solidFill>
+          </a:ln>
+        </p:spPr>
+        <p:style>
+          <a:lnRef idx="2">
+            <a:schemeClr val="accent6"/>
+          </a:lnRef>
+          <a:fillRef idx="1">
+            <a:schemeClr val="lt1"/>
+          </a:fillRef>
+          <a:effectRef idx="0">
+            <a:schemeClr val="accent6"/>
+          </a:effectRef>
+          <a:fontRef idx="minor">
+            <a:schemeClr val="dk1"/>
+          </a:fontRef>
+        </p:style>
+        <p:txBody>
+          <a:bodyPr rtlCol="0" anchor="ctr"/>
+          <a:lstStyle/>
+          <a:p>
+            <a:pPr algn="ctr"/>
+            <a:r>
+              <a:rPr lang="de-DE" dirty="0"/>
+              <a:t>3</a:t>
             </a:r>
             <a:endParaRPr lang="en-GB" dirty="0"/>
           </a:p>

</xml_diff>

<commit_message>
Concept (focusing on parametrising) and sources for State of the Art
</commit_message>
<xml_diff>
--- a/02_Thesis/PARRHI_Thesis/Figures/FigureMaker.pptx
+++ b/02_Thesis/PARRHI_Thesis/Figures/FigureMaker.pptx
@@ -263,7 +263,7 @@
           <a:p>
             <a:fld id="{7CBA829E-0E5E-45A4-B6EB-8046F7F33EA6}" type="datetimeFigureOut">
               <a:rPr lang="en-GB" smtClean="0"/>
-              <a:t>24/04/2019</a:t>
+              <a:t>29/04/2019</a:t>
             </a:fld>
             <a:endParaRPr lang="en-GB"/>
           </a:p>
@@ -463,7 +463,7 @@
           <a:p>
             <a:fld id="{7CBA829E-0E5E-45A4-B6EB-8046F7F33EA6}" type="datetimeFigureOut">
               <a:rPr lang="en-GB" smtClean="0"/>
-              <a:t>24/04/2019</a:t>
+              <a:t>29/04/2019</a:t>
             </a:fld>
             <a:endParaRPr lang="en-GB"/>
           </a:p>
@@ -673,7 +673,7 @@
           <a:p>
             <a:fld id="{7CBA829E-0E5E-45A4-B6EB-8046F7F33EA6}" type="datetimeFigureOut">
               <a:rPr lang="en-GB" smtClean="0"/>
-              <a:t>24/04/2019</a:t>
+              <a:t>29/04/2019</a:t>
             </a:fld>
             <a:endParaRPr lang="en-GB"/>
           </a:p>
@@ -873,7 +873,7 @@
           <a:p>
             <a:fld id="{7CBA829E-0E5E-45A4-B6EB-8046F7F33EA6}" type="datetimeFigureOut">
               <a:rPr lang="en-GB" smtClean="0"/>
-              <a:t>24/04/2019</a:t>
+              <a:t>29/04/2019</a:t>
             </a:fld>
             <a:endParaRPr lang="en-GB"/>
           </a:p>
@@ -1149,7 +1149,7 @@
           <a:p>
             <a:fld id="{7CBA829E-0E5E-45A4-B6EB-8046F7F33EA6}" type="datetimeFigureOut">
               <a:rPr lang="en-GB" smtClean="0"/>
-              <a:t>24/04/2019</a:t>
+              <a:t>29/04/2019</a:t>
             </a:fld>
             <a:endParaRPr lang="en-GB"/>
           </a:p>
@@ -1417,7 +1417,7 @@
           <a:p>
             <a:fld id="{7CBA829E-0E5E-45A4-B6EB-8046F7F33EA6}" type="datetimeFigureOut">
               <a:rPr lang="en-GB" smtClean="0"/>
-              <a:t>24/04/2019</a:t>
+              <a:t>29/04/2019</a:t>
             </a:fld>
             <a:endParaRPr lang="en-GB"/>
           </a:p>
@@ -1832,7 +1832,7 @@
           <a:p>
             <a:fld id="{7CBA829E-0E5E-45A4-B6EB-8046F7F33EA6}" type="datetimeFigureOut">
               <a:rPr lang="en-GB" smtClean="0"/>
-              <a:t>24/04/2019</a:t>
+              <a:t>29/04/2019</a:t>
             </a:fld>
             <a:endParaRPr lang="en-GB"/>
           </a:p>
@@ -1974,7 +1974,7 @@
           <a:p>
             <a:fld id="{7CBA829E-0E5E-45A4-B6EB-8046F7F33EA6}" type="datetimeFigureOut">
               <a:rPr lang="en-GB" smtClean="0"/>
-              <a:t>24/04/2019</a:t>
+              <a:t>29/04/2019</a:t>
             </a:fld>
             <a:endParaRPr lang="en-GB"/>
           </a:p>
@@ -2087,7 +2087,7 @@
           <a:p>
             <a:fld id="{7CBA829E-0E5E-45A4-B6EB-8046F7F33EA6}" type="datetimeFigureOut">
               <a:rPr lang="en-GB" smtClean="0"/>
-              <a:t>24/04/2019</a:t>
+              <a:t>29/04/2019</a:t>
             </a:fld>
             <a:endParaRPr lang="en-GB"/>
           </a:p>
@@ -2400,7 +2400,7 @@
           <a:p>
             <a:fld id="{7CBA829E-0E5E-45A4-B6EB-8046F7F33EA6}" type="datetimeFigureOut">
               <a:rPr lang="en-GB" smtClean="0"/>
-              <a:t>24/04/2019</a:t>
+              <a:t>29/04/2019</a:t>
             </a:fld>
             <a:endParaRPr lang="en-GB"/>
           </a:p>
@@ -2689,7 +2689,7 @@
           <a:p>
             <a:fld id="{7CBA829E-0E5E-45A4-B6EB-8046F7F33EA6}" type="datetimeFigureOut">
               <a:rPr lang="en-GB" smtClean="0"/>
-              <a:t>24/04/2019</a:t>
+              <a:t>29/04/2019</a:t>
             </a:fld>
             <a:endParaRPr lang="en-GB"/>
           </a:p>
@@ -2932,7 +2932,7 @@
           <a:p>
             <a:fld id="{7CBA829E-0E5E-45A4-B6EB-8046F7F33EA6}" type="datetimeFigureOut">
               <a:rPr lang="en-GB" smtClean="0"/>
-              <a:t>24/04/2019</a:t>
+              <a:t>29/04/2019</a:t>
             </a:fld>
             <a:endParaRPr lang="en-GB"/>
           </a:p>
@@ -6055,6 +6055,112 @@
           </a:p>
         </p:txBody>
       </p:sp>
+      <p:sp>
+        <p:nvSpPr>
+          <p:cNvPr id="35" name="Ellipse 34">
+            <a:extLst>
+              <a:ext uri="{FF2B5EF4-FFF2-40B4-BE49-F238E27FC236}">
+                <a16:creationId xmlns:a16="http://schemas.microsoft.com/office/drawing/2014/main" id="{905E42BA-24CC-4E17-9761-83A74DA4C5C6}"/>
+              </a:ext>
+            </a:extLst>
+          </p:cNvPr>
+          <p:cNvSpPr/>
+          <p:nvPr/>
+        </p:nvSpPr>
+        <p:spPr>
+          <a:xfrm>
+            <a:off x="3612004" y="1488374"/>
+            <a:ext cx="348008" cy="342604"/>
+          </a:xfrm>
+          <a:prstGeom prst="ellipse">
+            <a:avLst/>
+          </a:prstGeom>
+          <a:ln>
+            <a:solidFill>
+              <a:schemeClr val="tx1"/>
+            </a:solidFill>
+          </a:ln>
+        </p:spPr>
+        <p:style>
+          <a:lnRef idx="2">
+            <a:schemeClr val="accent6"/>
+          </a:lnRef>
+          <a:fillRef idx="1">
+            <a:schemeClr val="lt1"/>
+          </a:fillRef>
+          <a:effectRef idx="0">
+            <a:schemeClr val="accent6"/>
+          </a:effectRef>
+          <a:fontRef idx="minor">
+            <a:schemeClr val="dk1"/>
+          </a:fontRef>
+        </p:style>
+        <p:txBody>
+          <a:bodyPr rtlCol="0" anchor="ctr"/>
+          <a:lstStyle/>
+          <a:p>
+            <a:pPr algn="ctr"/>
+            <a:r>
+              <a:rPr lang="de-DE" dirty="0"/>
+              <a:t>5</a:t>
+            </a:r>
+            <a:endParaRPr lang="en-GB" dirty="0"/>
+          </a:p>
+        </p:txBody>
+      </p:sp>
+      <p:sp>
+        <p:nvSpPr>
+          <p:cNvPr id="36" name="Ellipse 35">
+            <a:extLst>
+              <a:ext uri="{FF2B5EF4-FFF2-40B4-BE49-F238E27FC236}">
+                <a16:creationId xmlns:a16="http://schemas.microsoft.com/office/drawing/2014/main" id="{67546732-CB01-4B5F-9F01-BF64C80C672D}"/>
+              </a:ext>
+            </a:extLst>
+          </p:cNvPr>
+          <p:cNvSpPr/>
+          <p:nvPr/>
+        </p:nvSpPr>
+        <p:spPr>
+          <a:xfrm>
+            <a:off x="3613539" y="3320755"/>
+            <a:ext cx="348008" cy="342604"/>
+          </a:xfrm>
+          <a:prstGeom prst="ellipse">
+            <a:avLst/>
+          </a:prstGeom>
+          <a:ln>
+            <a:solidFill>
+              <a:schemeClr val="tx1"/>
+            </a:solidFill>
+          </a:ln>
+        </p:spPr>
+        <p:style>
+          <a:lnRef idx="2">
+            <a:schemeClr val="accent6"/>
+          </a:lnRef>
+          <a:fillRef idx="1">
+            <a:schemeClr val="lt1"/>
+          </a:fillRef>
+          <a:effectRef idx="0">
+            <a:schemeClr val="accent6"/>
+          </a:effectRef>
+          <a:fontRef idx="minor">
+            <a:schemeClr val="dk1"/>
+          </a:fontRef>
+        </p:style>
+        <p:txBody>
+          <a:bodyPr rtlCol="0" anchor="ctr"/>
+          <a:lstStyle/>
+          <a:p>
+            <a:pPr algn="ctr"/>
+            <a:r>
+              <a:rPr lang="de-DE" dirty="0"/>
+              <a:t>4</a:t>
+            </a:r>
+            <a:endParaRPr lang="en-GB" dirty="0"/>
+          </a:p>
+        </p:txBody>
+      </p:sp>
     </p:spTree>
     <p:extLst>
       <p:ext uri="{BB962C8B-B14F-4D97-AF65-F5344CB8AC3E}">

</xml_diff>

<commit_message>
Concept Main part rewrite, fix some parts from parametrised program part
</commit_message>
<xml_diff>
--- a/02_Thesis/PARRHI_Thesis/Figures/FigureMaker.pptx
+++ b/02_Thesis/PARRHI_Thesis/Figures/FigureMaker.pptx
@@ -264,7 +264,7 @@
           <a:p>
             <a:fld id="{7CBA829E-0E5E-45A4-B6EB-8046F7F33EA6}" type="datetimeFigureOut">
               <a:rPr lang="en-GB" smtClean="0"/>
-              <a:t>06/05/2019</a:t>
+              <a:t>07/05/2019</a:t>
             </a:fld>
             <a:endParaRPr lang="en-GB"/>
           </a:p>
@@ -464,7 +464,7 @@
           <a:p>
             <a:fld id="{7CBA829E-0E5E-45A4-B6EB-8046F7F33EA6}" type="datetimeFigureOut">
               <a:rPr lang="en-GB" smtClean="0"/>
-              <a:t>06/05/2019</a:t>
+              <a:t>07/05/2019</a:t>
             </a:fld>
             <a:endParaRPr lang="en-GB"/>
           </a:p>
@@ -674,7 +674,7 @@
           <a:p>
             <a:fld id="{7CBA829E-0E5E-45A4-B6EB-8046F7F33EA6}" type="datetimeFigureOut">
               <a:rPr lang="en-GB" smtClean="0"/>
-              <a:t>06/05/2019</a:t>
+              <a:t>07/05/2019</a:t>
             </a:fld>
             <a:endParaRPr lang="en-GB"/>
           </a:p>
@@ -874,7 +874,7 @@
           <a:p>
             <a:fld id="{7CBA829E-0E5E-45A4-B6EB-8046F7F33EA6}" type="datetimeFigureOut">
               <a:rPr lang="en-GB" smtClean="0"/>
-              <a:t>06/05/2019</a:t>
+              <a:t>07/05/2019</a:t>
             </a:fld>
             <a:endParaRPr lang="en-GB"/>
           </a:p>
@@ -1150,7 +1150,7 @@
           <a:p>
             <a:fld id="{7CBA829E-0E5E-45A4-B6EB-8046F7F33EA6}" type="datetimeFigureOut">
               <a:rPr lang="en-GB" smtClean="0"/>
-              <a:t>06/05/2019</a:t>
+              <a:t>07/05/2019</a:t>
             </a:fld>
             <a:endParaRPr lang="en-GB"/>
           </a:p>
@@ -1418,7 +1418,7 @@
           <a:p>
             <a:fld id="{7CBA829E-0E5E-45A4-B6EB-8046F7F33EA6}" type="datetimeFigureOut">
               <a:rPr lang="en-GB" smtClean="0"/>
-              <a:t>06/05/2019</a:t>
+              <a:t>07/05/2019</a:t>
             </a:fld>
             <a:endParaRPr lang="en-GB"/>
           </a:p>
@@ -1833,7 +1833,7 @@
           <a:p>
             <a:fld id="{7CBA829E-0E5E-45A4-B6EB-8046F7F33EA6}" type="datetimeFigureOut">
               <a:rPr lang="en-GB" smtClean="0"/>
-              <a:t>06/05/2019</a:t>
+              <a:t>07/05/2019</a:t>
             </a:fld>
             <a:endParaRPr lang="en-GB"/>
           </a:p>
@@ -1975,7 +1975,7 @@
           <a:p>
             <a:fld id="{7CBA829E-0E5E-45A4-B6EB-8046F7F33EA6}" type="datetimeFigureOut">
               <a:rPr lang="en-GB" smtClean="0"/>
-              <a:t>06/05/2019</a:t>
+              <a:t>07/05/2019</a:t>
             </a:fld>
             <a:endParaRPr lang="en-GB"/>
           </a:p>
@@ -2088,7 +2088,7 @@
           <a:p>
             <a:fld id="{7CBA829E-0E5E-45A4-B6EB-8046F7F33EA6}" type="datetimeFigureOut">
               <a:rPr lang="en-GB" smtClean="0"/>
-              <a:t>06/05/2019</a:t>
+              <a:t>07/05/2019</a:t>
             </a:fld>
             <a:endParaRPr lang="en-GB"/>
           </a:p>
@@ -2401,7 +2401,7 @@
           <a:p>
             <a:fld id="{7CBA829E-0E5E-45A4-B6EB-8046F7F33EA6}" type="datetimeFigureOut">
               <a:rPr lang="en-GB" smtClean="0"/>
-              <a:t>06/05/2019</a:t>
+              <a:t>07/05/2019</a:t>
             </a:fld>
             <a:endParaRPr lang="en-GB"/>
           </a:p>
@@ -2690,7 +2690,7 @@
           <a:p>
             <a:fld id="{7CBA829E-0E5E-45A4-B6EB-8046F7F33EA6}" type="datetimeFigureOut">
               <a:rPr lang="en-GB" smtClean="0"/>
-              <a:t>06/05/2019</a:t>
+              <a:t>07/05/2019</a:t>
             </a:fld>
             <a:endParaRPr lang="en-GB"/>
           </a:p>
@@ -2933,7 +2933,7 @@
           <a:p>
             <a:fld id="{7CBA829E-0E5E-45A4-B6EB-8046F7F33EA6}" type="datetimeFigureOut">
               <a:rPr lang="en-GB" smtClean="0"/>
-              <a:t>06/05/2019</a:t>
+              <a:t>07/05/2019</a:t>
             </a:fld>
             <a:endParaRPr lang="en-GB"/>
           </a:p>
@@ -6194,10 +6194,10 @@
       </p:grpSpPr>
       <p:sp>
         <p:nvSpPr>
-          <p:cNvPr id="106" name="Rechteck: abgerundete Ecken 105">
-            <a:extLst>
-              <a:ext uri="{FF2B5EF4-FFF2-40B4-BE49-F238E27FC236}">
-                <a16:creationId xmlns:a16="http://schemas.microsoft.com/office/drawing/2014/main" id="{DDF288CA-3CB2-4AE6-8636-41B7BF9476F8}"/>
+          <p:cNvPr id="6" name="Rechteck: abgerundete Ecken 5">
+            <a:extLst>
+              <a:ext uri="{FF2B5EF4-FFF2-40B4-BE49-F238E27FC236}">
+                <a16:creationId xmlns:a16="http://schemas.microsoft.com/office/drawing/2014/main" id="{1EFBE1EE-B6B9-4699-B39C-194A2FFA5642}"/>
               </a:ext>
             </a:extLst>
           </p:cNvPr>
@@ -6206,63 +6206,7 @@
         </p:nvSpPr>
         <p:spPr>
           <a:xfrm>
-            <a:off x="567630" y="2187300"/>
-            <a:ext cx="1261688" cy="1146557"/>
-          </a:xfrm>
-          <a:prstGeom prst="roundRect">
-            <a:avLst>
-              <a:gd name="adj" fmla="val 2329"/>
-            </a:avLst>
-          </a:prstGeom>
-          <a:ln>
-            <a:solidFill>
-              <a:schemeClr val="accent1">
-                <a:lumMod val="50000"/>
-              </a:schemeClr>
-            </a:solidFill>
-          </a:ln>
-        </p:spPr>
-        <p:style>
-          <a:lnRef idx="2">
-            <a:schemeClr val="accent6"/>
-          </a:lnRef>
-          <a:fillRef idx="1">
-            <a:schemeClr val="lt1"/>
-          </a:fillRef>
-          <a:effectRef idx="0">
-            <a:schemeClr val="accent6"/>
-          </a:effectRef>
-          <a:fontRef idx="minor">
-            <a:schemeClr val="dk1"/>
-          </a:fontRef>
-        </p:style>
-        <p:txBody>
-          <a:bodyPr rtlCol="0" anchor="t"/>
-          <a:lstStyle/>
-          <a:p>
-            <a:r>
-              <a:rPr lang="de-DE" dirty="0"/>
-              <a:t>Developer</a:t>
-            </a:r>
-            <a:endParaRPr lang="en-GB" dirty="0"/>
-          </a:p>
-        </p:txBody>
-      </p:sp>
-      <p:sp>
-        <p:nvSpPr>
-          <p:cNvPr id="6" name="Rechteck: abgerundete Ecken 5">
-            <a:extLst>
-              <a:ext uri="{FF2B5EF4-FFF2-40B4-BE49-F238E27FC236}">
-                <a16:creationId xmlns:a16="http://schemas.microsoft.com/office/drawing/2014/main" id="{1EFBE1EE-B6B9-4699-B39C-194A2FFA5642}"/>
-              </a:ext>
-            </a:extLst>
-          </p:cNvPr>
-          <p:cNvSpPr/>
-          <p:nvPr/>
-        </p:nvSpPr>
-        <p:spPr>
-          <a:xfrm>
-            <a:off x="2613517" y="908330"/>
+            <a:off x="3035548" y="917122"/>
             <a:ext cx="3781421" cy="3430672"/>
           </a:xfrm>
           <a:prstGeom prst="roundRect">
@@ -6320,7 +6264,7 @@
         </p:nvSpPr>
         <p:spPr>
           <a:xfrm>
-            <a:off x="2613517" y="913207"/>
+            <a:off x="3035548" y="921999"/>
             <a:ext cx="1092200" cy="369332"/>
           </a:xfrm>
           <a:prstGeom prst="rect">
@@ -6356,7 +6300,7 @@
         </p:nvSpPr>
         <p:spPr>
           <a:xfrm>
-            <a:off x="7938375" y="4215499"/>
+            <a:off x="8360406" y="4224291"/>
             <a:ext cx="3500069" cy="774700"/>
           </a:xfrm>
           <a:prstGeom prst="roundRect">
@@ -6413,7 +6357,7 @@
         </p:nvSpPr>
         <p:spPr>
           <a:xfrm>
-            <a:off x="7939301" y="2114782"/>
+            <a:off x="8361332" y="2123574"/>
             <a:ext cx="3500069" cy="1841492"/>
           </a:xfrm>
           <a:prstGeom prst="roundRect">
@@ -6469,7 +6413,7 @@
         </p:nvSpPr>
         <p:spPr>
           <a:xfrm>
-            <a:off x="2934723" y="1554707"/>
+            <a:off x="3558981" y="1563499"/>
             <a:ext cx="1794125" cy="560513"/>
           </a:xfrm>
           <a:prstGeom prst="roundRect">
@@ -6538,7 +6482,7 @@
         </p:nvCxnSpPr>
         <p:spPr>
           <a:xfrm flipH="1">
-            <a:off x="3831785" y="2115220"/>
+            <a:off x="4456043" y="2124012"/>
             <a:ext cx="1" cy="360013"/>
           </a:xfrm>
           <a:prstGeom prst="straightConnector1">
@@ -6580,7 +6524,7 @@
         </p:nvSpPr>
         <p:spPr>
           <a:xfrm>
-            <a:off x="2934722" y="2475233"/>
+            <a:off x="3558980" y="2484025"/>
             <a:ext cx="1794125" cy="560513"/>
           </a:xfrm>
           <a:prstGeom prst="roundRect">
@@ -6616,10 +6560,9 @@
           <a:p>
             <a:pPr algn="ctr"/>
             <a:r>
-              <a:rPr lang="de-DE" dirty="0"/>
+              <a:rPr lang="en-US"/>
               <a:t>Parametrised Program</a:t>
             </a:r>
-            <a:endParaRPr lang="en-GB" dirty="0"/>
           </a:p>
         </p:txBody>
       </p:sp>
@@ -6637,7 +6580,7 @@
         </p:nvSpPr>
         <p:spPr>
           <a:xfrm>
-            <a:off x="5554328" y="1591737"/>
+            <a:off x="5976359" y="1600529"/>
             <a:ext cx="1681219" cy="486452"/>
           </a:xfrm>
           <a:prstGeom prst="roundRect">
@@ -6692,13 +6635,14 @@
           <p:cNvCxnSpPr>
             <a:cxnSpLocks/>
             <a:stCxn id="27" idx="1"/>
+            <a:endCxn id="18" idx="3"/>
           </p:cNvCxnSpPr>
           <p:nvPr/>
         </p:nvCxnSpPr>
         <p:spPr>
           <a:xfrm flipH="1">
-            <a:off x="4728848" y="1834963"/>
-            <a:ext cx="825480" cy="0"/>
+            <a:off x="5353106" y="1843755"/>
+            <a:ext cx="623253" cy="1"/>
           </a:xfrm>
           <a:prstGeom prst="straightConnector1">
             <a:avLst/>
@@ -6739,7 +6683,7 @@
         </p:nvSpPr>
         <p:spPr>
           <a:xfrm>
-            <a:off x="2934723" y="3395760"/>
+            <a:off x="3558981" y="3404552"/>
             <a:ext cx="1794125" cy="560513"/>
           </a:xfrm>
           <a:prstGeom prst="roundRect">
@@ -6800,7 +6744,7 @@
         </p:nvCxnSpPr>
         <p:spPr>
           <a:xfrm>
-            <a:off x="3831785" y="3035746"/>
+            <a:off x="4456043" y="3044538"/>
             <a:ext cx="1" cy="360014"/>
           </a:xfrm>
           <a:prstGeom prst="straightConnector1">
@@ -6842,7 +6786,7 @@
         </p:nvSpPr>
         <p:spPr>
           <a:xfrm>
-            <a:off x="5554328" y="3431453"/>
+            <a:off x="5976359" y="3440245"/>
             <a:ext cx="1681219" cy="486452"/>
           </a:xfrm>
           <a:prstGeom prst="roundRect">
@@ -6903,8 +6847,8 @@
         </p:nvCxnSpPr>
         <p:spPr>
           <a:xfrm flipV="1">
-            <a:off x="4728848" y="3674679"/>
-            <a:ext cx="825480" cy="1338"/>
+            <a:off x="5353106" y="3683471"/>
+            <a:ext cx="623253" cy="1338"/>
           </a:xfrm>
           <a:prstGeom prst="straightConnector1">
             <a:avLst/>
@@ -6945,7 +6889,7 @@
         </p:nvSpPr>
         <p:spPr>
           <a:xfrm>
-            <a:off x="2621084" y="3375496"/>
+            <a:off x="3043115" y="3384288"/>
             <a:ext cx="264102" cy="245166"/>
           </a:xfrm>
           <a:prstGeom prst="rect">
@@ -6997,7 +6941,7 @@
         </p:nvSpPr>
         <p:spPr>
           <a:xfrm>
-            <a:off x="2756310" y="1385801"/>
+            <a:off x="3380568" y="1394593"/>
             <a:ext cx="348008" cy="342604"/>
           </a:xfrm>
           <a:prstGeom prst="ellipse">
@@ -7050,7 +6994,7 @@
         </p:nvSpPr>
         <p:spPr>
           <a:xfrm>
-            <a:off x="2750101" y="2583933"/>
+            <a:off x="3374359" y="2592725"/>
             <a:ext cx="348008" cy="342604"/>
           </a:xfrm>
           <a:prstGeom prst="ellipse">
@@ -7103,7 +7047,7 @@
         </p:nvSpPr>
         <p:spPr>
           <a:xfrm>
-            <a:off x="2755001" y="3780764"/>
+            <a:off x="3379259" y="3789556"/>
             <a:ext cx="348008" cy="342604"/>
           </a:xfrm>
           <a:prstGeom prst="ellipse">
@@ -7156,7 +7100,7 @@
         </p:nvSpPr>
         <p:spPr>
           <a:xfrm>
-            <a:off x="5380324" y="1426828"/>
+            <a:off x="5802355" y="1435620"/>
             <a:ext cx="348008" cy="342604"/>
           </a:xfrm>
           <a:prstGeom prst="ellipse">
@@ -7209,7 +7153,7 @@
         </p:nvSpPr>
         <p:spPr>
           <a:xfrm>
-            <a:off x="5380324" y="3746602"/>
+            <a:off x="5802355" y="3755394"/>
             <a:ext cx="348008" cy="342604"/>
           </a:xfrm>
           <a:prstGeom prst="ellipse">
@@ -7262,7 +7206,7 @@
         </p:nvSpPr>
         <p:spPr>
           <a:xfrm>
-            <a:off x="9834954" y="2806017"/>
+            <a:off x="10256985" y="2814809"/>
             <a:ext cx="1369466" cy="778854"/>
           </a:xfrm>
           <a:prstGeom prst="roundRect">
@@ -7323,7 +7267,7 @@
         </p:nvCxnSpPr>
         <p:spPr>
           <a:xfrm>
-            <a:off x="7235547" y="3674679"/>
+            <a:off x="7657578" y="3683471"/>
             <a:ext cx="702828" cy="928170"/>
           </a:xfrm>
           <a:prstGeom prst="bentConnector3">
@@ -7369,7 +7313,7 @@
         </p:nvCxnSpPr>
         <p:spPr>
           <a:xfrm flipV="1">
-            <a:off x="7235547" y="3192825"/>
+            <a:off x="7657578" y="3201617"/>
             <a:ext cx="994991" cy="481854"/>
           </a:xfrm>
           <a:prstGeom prst="bentConnector3">
@@ -7413,7 +7357,7 @@
         </p:nvGrpSpPr>
         <p:grpSpPr>
           <a:xfrm>
-            <a:off x="8230538" y="2803398"/>
+            <a:off x="8652569" y="2812190"/>
             <a:ext cx="1369466" cy="778854"/>
             <a:chOff x="6310397" y="2595700"/>
             <a:chExt cx="1369466" cy="778854"/>
@@ -7534,7 +7478,7 @@
         </p:nvCxnSpPr>
         <p:spPr>
           <a:xfrm flipH="1" flipV="1">
-            <a:off x="9600004" y="3192825"/>
+            <a:off x="10022035" y="3201617"/>
             <a:ext cx="234950" cy="2619"/>
           </a:xfrm>
           <a:prstGeom prst="straightConnector1">
@@ -7578,7 +7522,7 @@
         </p:nvCxnSpPr>
         <p:spPr>
           <a:xfrm flipH="1" flipV="1">
-            <a:off x="8915271" y="2554654"/>
+            <a:off x="9337302" y="2563446"/>
             <a:ext cx="1" cy="248744"/>
           </a:xfrm>
           <a:prstGeom prst="line">
@@ -7622,7 +7566,7 @@
         </p:nvCxnSpPr>
         <p:spPr>
           <a:xfrm flipV="1">
-            <a:off x="10519687" y="2554654"/>
+            <a:off x="10941718" y="2563446"/>
             <a:ext cx="0" cy="251363"/>
           </a:xfrm>
           <a:prstGeom prst="line">
@@ -7665,7 +7609,7 @@
         </p:nvCxnSpPr>
         <p:spPr>
           <a:xfrm>
-            <a:off x="8915271" y="2554654"/>
+            <a:off x="9337302" y="2563446"/>
             <a:ext cx="1604416" cy="0"/>
           </a:xfrm>
           <a:prstGeom prst="line">
@@ -7709,7 +7653,7 @@
         </p:nvCxnSpPr>
         <p:spPr>
           <a:xfrm rot="10800000">
-            <a:off x="7235547" y="1834963"/>
+            <a:off x="7657578" y="1843755"/>
             <a:ext cx="2452862" cy="719690"/>
           </a:xfrm>
           <a:prstGeom prst="bentConnector3">
@@ -7755,7 +7699,7 @@
         </p:nvCxnSpPr>
         <p:spPr>
           <a:xfrm flipV="1">
-            <a:off x="10530626" y="3583354"/>
+            <a:off x="10952657" y="3592146"/>
             <a:ext cx="694" cy="632145"/>
           </a:xfrm>
           <a:prstGeom prst="straightConnector1">
@@ -7783,12 +7727,171 @@
           </a:fontRef>
         </p:style>
       </p:cxnSp>
+      <p:sp>
+        <p:nvSpPr>
+          <p:cNvPr id="103" name="Ellipse 102">
+            <a:extLst>
+              <a:ext uri="{FF2B5EF4-FFF2-40B4-BE49-F238E27FC236}">
+                <a16:creationId xmlns:a16="http://schemas.microsoft.com/office/drawing/2014/main" id="{5A8CB45E-1774-4DC1-BFE2-AF094B83975E}"/>
+              </a:ext>
+            </a:extLst>
+          </p:cNvPr>
+          <p:cNvSpPr/>
+          <p:nvPr/>
+        </p:nvSpPr>
+        <p:spPr>
+          <a:xfrm>
+            <a:off x="8186402" y="4827689"/>
+            <a:ext cx="348008" cy="342604"/>
+          </a:xfrm>
+          <a:prstGeom prst="ellipse">
+            <a:avLst/>
+          </a:prstGeom>
+          <a:ln>
+            <a:solidFill>
+              <a:schemeClr val="tx1"/>
+            </a:solidFill>
+          </a:ln>
+        </p:spPr>
+        <p:style>
+          <a:lnRef idx="2">
+            <a:schemeClr val="accent6"/>
+          </a:lnRef>
+          <a:fillRef idx="1">
+            <a:schemeClr val="lt1"/>
+          </a:fillRef>
+          <a:effectRef idx="0">
+            <a:schemeClr val="accent6"/>
+          </a:effectRef>
+          <a:fontRef idx="minor">
+            <a:schemeClr val="dk1"/>
+          </a:fontRef>
+        </p:style>
+        <p:txBody>
+          <a:bodyPr rtlCol="0" anchor="ctr"/>
+          <a:lstStyle/>
+          <a:p>
+            <a:pPr algn="ctr"/>
+            <a:r>
+              <a:rPr lang="de-DE" dirty="0"/>
+              <a:t>5</a:t>
+            </a:r>
+            <a:endParaRPr lang="en-GB" dirty="0"/>
+          </a:p>
+        </p:txBody>
+      </p:sp>
+      <p:sp>
+        <p:nvSpPr>
+          <p:cNvPr id="104" name="Ellipse 103">
+            <a:extLst>
+              <a:ext uri="{FF2B5EF4-FFF2-40B4-BE49-F238E27FC236}">
+                <a16:creationId xmlns:a16="http://schemas.microsoft.com/office/drawing/2014/main" id="{3C9AF313-7762-4567-BD44-9365521AB8C4}"/>
+              </a:ext>
+            </a:extLst>
+          </p:cNvPr>
+          <p:cNvSpPr/>
+          <p:nvPr/>
+        </p:nvSpPr>
+        <p:spPr>
+          <a:xfrm>
+            <a:off x="8473165" y="3386437"/>
+            <a:ext cx="348008" cy="342604"/>
+          </a:xfrm>
+          <a:prstGeom prst="ellipse">
+            <a:avLst/>
+          </a:prstGeom>
+          <a:ln>
+            <a:solidFill>
+              <a:schemeClr val="tx1"/>
+            </a:solidFill>
+          </a:ln>
+        </p:spPr>
+        <p:style>
+          <a:lnRef idx="2">
+            <a:schemeClr val="accent6"/>
+          </a:lnRef>
+          <a:fillRef idx="1">
+            <a:schemeClr val="lt1"/>
+          </a:fillRef>
+          <a:effectRef idx="0">
+            <a:schemeClr val="accent6"/>
+          </a:effectRef>
+          <a:fontRef idx="minor">
+            <a:schemeClr val="dk1"/>
+          </a:fontRef>
+        </p:style>
+        <p:txBody>
+          <a:bodyPr rtlCol="0" anchor="ctr"/>
+          <a:lstStyle/>
+          <a:p>
+            <a:pPr algn="ctr"/>
+            <a:r>
+              <a:rPr lang="de-DE" dirty="0"/>
+              <a:t>6</a:t>
+            </a:r>
+            <a:endParaRPr lang="en-GB" dirty="0"/>
+          </a:p>
+        </p:txBody>
+      </p:sp>
+      <p:sp>
+        <p:nvSpPr>
+          <p:cNvPr id="105" name="Ellipse 104">
+            <a:extLst>
+              <a:ext uri="{FF2B5EF4-FFF2-40B4-BE49-F238E27FC236}">
+                <a16:creationId xmlns:a16="http://schemas.microsoft.com/office/drawing/2014/main" id="{CA0AEDEC-FF51-452C-956F-47552669EA96}"/>
+              </a:ext>
+            </a:extLst>
+          </p:cNvPr>
+          <p:cNvSpPr/>
+          <p:nvPr/>
+        </p:nvSpPr>
+        <p:spPr>
+          <a:xfrm>
+            <a:off x="10083167" y="3404552"/>
+            <a:ext cx="348008" cy="342604"/>
+          </a:xfrm>
+          <a:prstGeom prst="ellipse">
+            <a:avLst/>
+          </a:prstGeom>
+          <a:ln>
+            <a:solidFill>
+              <a:schemeClr val="tx1"/>
+            </a:solidFill>
+          </a:ln>
+        </p:spPr>
+        <p:style>
+          <a:lnRef idx="2">
+            <a:schemeClr val="accent6"/>
+          </a:lnRef>
+          <a:fillRef idx="1">
+            <a:schemeClr val="lt1"/>
+          </a:fillRef>
+          <a:effectRef idx="0">
+            <a:schemeClr val="accent6"/>
+          </a:effectRef>
+          <a:fontRef idx="minor">
+            <a:schemeClr val="dk1"/>
+          </a:fontRef>
+        </p:style>
+        <p:txBody>
+          <a:bodyPr rtlCol="0" anchor="ctr"/>
+          <a:lstStyle/>
+          <a:p>
+            <a:pPr algn="ctr"/>
+            <a:r>
+              <a:rPr lang="de-DE" dirty="0"/>
+              <a:t>7</a:t>
+            </a:r>
+            <a:endParaRPr lang="en-GB" dirty="0"/>
+          </a:p>
+        </p:txBody>
+      </p:sp>
       <p:pic>
         <p:nvPicPr>
-          <p:cNvPr id="89" name="Grafik 88" descr="Lachendes Gesicht ohne Füllung">
-            <a:extLst>
-              <a:ext uri="{FF2B5EF4-FFF2-40B4-BE49-F238E27FC236}">
-                <a16:creationId xmlns:a16="http://schemas.microsoft.com/office/drawing/2014/main" id="{138E77A1-719E-4062-B070-F76CCA4B11F7}"/>
+          <p:cNvPr id="93" name="Grafik 92" descr="Bauarbeiter">
+            <a:extLst>
+              <a:ext uri="{FF2B5EF4-FFF2-40B4-BE49-F238E27FC236}">
+                <a16:creationId xmlns:a16="http://schemas.microsoft.com/office/drawing/2014/main" id="{0FBEBEB3-C179-4CA6-85DB-A6386CCD4491}"/>
               </a:ext>
             </a:extLst>
           </p:cNvPr>
@@ -7814,20 +7917,189 @@
         </p:blipFill>
         <p:spPr>
           <a:xfrm>
-            <a:off x="881020" y="2627092"/>
-            <a:ext cx="598890" cy="598890"/>
+            <a:off x="10666514" y="3043879"/>
+            <a:ext cx="585575" cy="585575"/>
           </a:xfrm>
           <a:prstGeom prst="rect">
             <a:avLst/>
           </a:prstGeom>
         </p:spPr>
       </p:pic>
-      <p:sp>
-        <p:nvSpPr>
-          <p:cNvPr id="103" name="Ellipse 102">
-            <a:extLst>
-              <a:ext uri="{FF2B5EF4-FFF2-40B4-BE49-F238E27FC236}">
-                <a16:creationId xmlns:a16="http://schemas.microsoft.com/office/drawing/2014/main" id="{5A8CB45E-1774-4DC1-BFE2-AF094B83975E}"/>
+      <p:grpSp>
+        <p:nvGrpSpPr>
+          <p:cNvPr id="31" name="Gruppieren 30">
+            <a:extLst>
+              <a:ext uri="{FF2B5EF4-FFF2-40B4-BE49-F238E27FC236}">
+                <a16:creationId xmlns:a16="http://schemas.microsoft.com/office/drawing/2014/main" id="{4F6E059B-D126-41A1-BEA8-650E0F8A649C}"/>
+              </a:ext>
+            </a:extLst>
+          </p:cNvPr>
+          <p:cNvGrpSpPr/>
+          <p:nvPr/>
+        </p:nvGrpSpPr>
+        <p:grpSpPr>
+          <a:xfrm>
+            <a:off x="102597" y="2100983"/>
+            <a:ext cx="1359349" cy="1123562"/>
+            <a:chOff x="102597" y="2100983"/>
+            <a:chExt cx="1359349" cy="1123562"/>
+          </a:xfrm>
+        </p:grpSpPr>
+        <p:sp>
+          <p:nvSpPr>
+            <p:cNvPr id="106" name="Rechteck: abgerundete Ecken 105">
+              <a:extLst>
+                <a:ext uri="{FF2B5EF4-FFF2-40B4-BE49-F238E27FC236}">
+                  <a16:creationId xmlns:a16="http://schemas.microsoft.com/office/drawing/2014/main" id="{DDF288CA-3CB2-4AE6-8636-41B7BF9476F8}"/>
+                </a:ext>
+              </a:extLst>
+            </p:cNvPr>
+            <p:cNvSpPr/>
+            <p:nvPr/>
+          </p:nvSpPr>
+          <p:spPr>
+            <a:xfrm>
+              <a:off x="277238" y="2100983"/>
+              <a:ext cx="1184708" cy="969272"/>
+            </a:xfrm>
+            <a:prstGeom prst="roundRect">
+              <a:avLst>
+                <a:gd name="adj" fmla="val 2329"/>
+              </a:avLst>
+            </a:prstGeom>
+            <a:ln>
+              <a:solidFill>
+                <a:schemeClr val="accent1">
+                  <a:lumMod val="50000"/>
+                </a:schemeClr>
+              </a:solidFill>
+            </a:ln>
+          </p:spPr>
+          <p:style>
+            <a:lnRef idx="2">
+              <a:schemeClr val="accent6"/>
+            </a:lnRef>
+            <a:fillRef idx="1">
+              <a:schemeClr val="lt1"/>
+            </a:fillRef>
+            <a:effectRef idx="0">
+              <a:schemeClr val="accent6"/>
+            </a:effectRef>
+            <a:fontRef idx="minor">
+              <a:schemeClr val="dk1"/>
+            </a:fontRef>
+          </p:style>
+          <p:txBody>
+            <a:bodyPr rtlCol="0" anchor="t"/>
+            <a:lstStyle/>
+            <a:p>
+              <a:r>
+                <a:rPr lang="de-DE" dirty="0"/>
+                <a:t>Developer</a:t>
+              </a:r>
+              <a:endParaRPr lang="en-GB" dirty="0"/>
+            </a:p>
+          </p:txBody>
+        </p:sp>
+        <p:pic>
+          <p:nvPicPr>
+            <p:cNvPr id="89" name="Grafik 88" descr="Lachendes Gesicht ohne Füllung">
+              <a:extLst>
+                <a:ext uri="{FF2B5EF4-FFF2-40B4-BE49-F238E27FC236}">
+                  <a16:creationId xmlns:a16="http://schemas.microsoft.com/office/drawing/2014/main" id="{138E77A1-719E-4062-B070-F76CCA4B11F7}"/>
+                </a:ext>
+              </a:extLst>
+            </p:cNvPr>
+            <p:cNvPicPr>
+              <a:picLocks noChangeAspect="1"/>
+            </p:cNvPicPr>
+            <p:nvPr/>
+          </p:nvPicPr>
+          <p:blipFill>
+            <a:blip r:embed="rId6">
+              <a:extLst>
+                <a:ext uri="{28A0092B-C50C-407E-A947-70E740481C1C}">
+                  <a14:useLocalDpi xmlns:a14="http://schemas.microsoft.com/office/drawing/2010/main" val="0"/>
+                </a:ext>
+                <a:ext uri="{96DAC541-7B7A-43D3-8B79-37D633B846F1}">
+                  <asvg:svgBlip xmlns:asvg="http://schemas.microsoft.com/office/drawing/2016/SVG/main" r:embed="rId7"/>
+                </a:ext>
+              </a:extLst>
+            </a:blip>
+            <a:stretch>
+              <a:fillRect/>
+            </a:stretch>
+          </p:blipFill>
+          <p:spPr>
+            <a:xfrm>
+              <a:off x="559207" y="2422205"/>
+              <a:ext cx="598890" cy="598890"/>
+            </a:xfrm>
+            <a:prstGeom prst="rect">
+              <a:avLst/>
+            </a:prstGeom>
+          </p:spPr>
+        </p:pic>
+        <p:sp>
+          <p:nvSpPr>
+            <p:cNvPr id="107" name="Ellipse 106">
+              <a:extLst>
+                <a:ext uri="{FF2B5EF4-FFF2-40B4-BE49-F238E27FC236}">
+                  <a16:creationId xmlns:a16="http://schemas.microsoft.com/office/drawing/2014/main" id="{E483BECB-8517-40A4-8B7B-2B31F132CBB7}"/>
+                </a:ext>
+              </a:extLst>
+            </p:cNvPr>
+            <p:cNvSpPr/>
+            <p:nvPr/>
+          </p:nvSpPr>
+          <p:spPr>
+            <a:xfrm>
+              <a:off x="102597" y="2881941"/>
+              <a:ext cx="348008" cy="342604"/>
+            </a:xfrm>
+            <a:prstGeom prst="ellipse">
+              <a:avLst/>
+            </a:prstGeom>
+            <a:ln>
+              <a:solidFill>
+                <a:schemeClr val="tx1"/>
+              </a:solidFill>
+            </a:ln>
+          </p:spPr>
+          <p:style>
+            <a:lnRef idx="2">
+              <a:schemeClr val="accent6"/>
+            </a:lnRef>
+            <a:fillRef idx="1">
+              <a:schemeClr val="lt1"/>
+            </a:fillRef>
+            <a:effectRef idx="0">
+              <a:schemeClr val="accent6"/>
+            </a:effectRef>
+            <a:fontRef idx="minor">
+              <a:schemeClr val="dk1"/>
+            </a:fontRef>
+          </p:style>
+          <p:txBody>
+            <a:bodyPr rtlCol="0" anchor="ctr"/>
+            <a:lstStyle/>
+            <a:p>
+              <a:pPr algn="ctr"/>
+              <a:r>
+                <a:rPr lang="de-DE" dirty="0"/>
+                <a:t>8</a:t>
+              </a:r>
+              <a:endParaRPr lang="en-GB" dirty="0"/>
+            </a:p>
+          </p:txBody>
+        </p:sp>
+      </p:grpSp>
+      <p:sp>
+        <p:nvSpPr>
+          <p:cNvPr id="43" name="Rechteck: abgerundete Ecken 42">
+            <a:extLst>
+              <a:ext uri="{FF2B5EF4-FFF2-40B4-BE49-F238E27FC236}">
+                <a16:creationId xmlns:a16="http://schemas.microsoft.com/office/drawing/2014/main" id="{D1A6702D-93D8-4105-88A0-D81FCB3DDBDD}"/>
               </a:ext>
             </a:extLst>
           </p:cNvPr>
@@ -7836,15 +8108,19 @@
         </p:nvSpPr>
         <p:spPr>
           <a:xfrm>
-            <a:off x="7764371" y="4818897"/>
-            <a:ext cx="348008" cy="342604"/>
-          </a:xfrm>
-          <a:prstGeom prst="ellipse">
-            <a:avLst/>
+            <a:off x="1881653" y="2592725"/>
+            <a:ext cx="1261688" cy="342604"/>
+          </a:xfrm>
+          <a:prstGeom prst="roundRect">
+            <a:avLst>
+              <a:gd name="adj" fmla="val 2329"/>
+            </a:avLst>
           </a:prstGeom>
           <a:ln>
             <a:solidFill>
-              <a:schemeClr val="tx1"/>
+              <a:schemeClr val="accent1">
+                <a:lumMod val="50000"/>
+              </a:schemeClr>
             </a:solidFill>
           </a:ln>
         </p:spPr>
@@ -7869,113 +8145,7 @@
             <a:pPr algn="ctr"/>
             <a:r>
               <a:rPr lang="de-DE" dirty="0"/>
-              <a:t>5</a:t>
-            </a:r>
-            <a:endParaRPr lang="en-GB" dirty="0"/>
-          </a:p>
-        </p:txBody>
-      </p:sp>
-      <p:sp>
-        <p:nvSpPr>
-          <p:cNvPr id="104" name="Ellipse 103">
-            <a:extLst>
-              <a:ext uri="{FF2B5EF4-FFF2-40B4-BE49-F238E27FC236}">
-                <a16:creationId xmlns:a16="http://schemas.microsoft.com/office/drawing/2014/main" id="{3C9AF313-7762-4567-BD44-9365521AB8C4}"/>
-              </a:ext>
-            </a:extLst>
-          </p:cNvPr>
-          <p:cNvSpPr/>
-          <p:nvPr/>
-        </p:nvSpPr>
-        <p:spPr>
-          <a:xfrm>
-            <a:off x="8051134" y="3377645"/>
-            <a:ext cx="348008" cy="342604"/>
-          </a:xfrm>
-          <a:prstGeom prst="ellipse">
-            <a:avLst/>
-          </a:prstGeom>
-          <a:ln>
-            <a:solidFill>
-              <a:schemeClr val="tx1"/>
-            </a:solidFill>
-          </a:ln>
-        </p:spPr>
-        <p:style>
-          <a:lnRef idx="2">
-            <a:schemeClr val="accent6"/>
-          </a:lnRef>
-          <a:fillRef idx="1">
-            <a:schemeClr val="lt1"/>
-          </a:fillRef>
-          <a:effectRef idx="0">
-            <a:schemeClr val="accent6"/>
-          </a:effectRef>
-          <a:fontRef idx="minor">
-            <a:schemeClr val="dk1"/>
-          </a:fontRef>
-        </p:style>
-        <p:txBody>
-          <a:bodyPr rtlCol="0" anchor="ctr"/>
-          <a:lstStyle/>
-          <a:p>
-            <a:pPr algn="ctr"/>
-            <a:r>
-              <a:rPr lang="de-DE" dirty="0"/>
-              <a:t>6</a:t>
-            </a:r>
-            <a:endParaRPr lang="en-GB" dirty="0"/>
-          </a:p>
-        </p:txBody>
-      </p:sp>
-      <p:sp>
-        <p:nvSpPr>
-          <p:cNvPr id="105" name="Ellipse 104">
-            <a:extLst>
-              <a:ext uri="{FF2B5EF4-FFF2-40B4-BE49-F238E27FC236}">
-                <a16:creationId xmlns:a16="http://schemas.microsoft.com/office/drawing/2014/main" id="{CA0AEDEC-FF51-452C-956F-47552669EA96}"/>
-              </a:ext>
-            </a:extLst>
-          </p:cNvPr>
-          <p:cNvSpPr/>
-          <p:nvPr/>
-        </p:nvSpPr>
-        <p:spPr>
-          <a:xfrm>
-            <a:off x="9661136" y="3395760"/>
-            <a:ext cx="348008" cy="342604"/>
-          </a:xfrm>
-          <a:prstGeom prst="ellipse">
-            <a:avLst/>
-          </a:prstGeom>
-          <a:ln>
-            <a:solidFill>
-              <a:schemeClr val="tx1"/>
-            </a:solidFill>
-          </a:ln>
-        </p:spPr>
-        <p:style>
-          <a:lnRef idx="2">
-            <a:schemeClr val="accent6"/>
-          </a:lnRef>
-          <a:fillRef idx="1">
-            <a:schemeClr val="lt1"/>
-          </a:fillRef>
-          <a:effectRef idx="0">
-            <a:schemeClr val="accent6"/>
-          </a:effectRef>
-          <a:fontRef idx="minor">
-            <a:schemeClr val="dk1"/>
-          </a:fontRef>
-        </p:style>
-        <p:txBody>
-          <a:bodyPr rtlCol="0" anchor="ctr"/>
-          <a:lstStyle/>
-          <a:p>
-            <a:pPr algn="ctr"/>
-            <a:r>
-              <a:rPr lang="de-DE" dirty="0"/>
-              <a:t>7</a:t>
+              <a:t>Validation</a:t>
             </a:r>
             <a:endParaRPr lang="en-GB" dirty="0"/>
           </a:p>
@@ -7983,23 +8153,23 @@
       </p:sp>
       <p:cxnSp>
         <p:nvCxnSpPr>
-          <p:cNvPr id="91" name="Gerade Verbindung mit Pfeil 90">
-            <a:extLst>
-              <a:ext uri="{FF2B5EF4-FFF2-40B4-BE49-F238E27FC236}">
-                <a16:creationId xmlns:a16="http://schemas.microsoft.com/office/drawing/2014/main" id="{2F288839-6C79-4D98-8455-AC74A2489ABB}"/>
+          <p:cNvPr id="47" name="Gerade Verbindung mit Pfeil 46">
+            <a:extLst>
+              <a:ext uri="{FF2B5EF4-FFF2-40B4-BE49-F238E27FC236}">
+                <a16:creationId xmlns:a16="http://schemas.microsoft.com/office/drawing/2014/main" id="{32E44208-6490-4F2A-9F25-8CC20EB718AA}"/>
               </a:ext>
             </a:extLst>
           </p:cNvPr>
           <p:cNvCxnSpPr>
-            <a:stCxn id="106" idx="3"/>
-            <a:endCxn id="101" idx="2"/>
+            <a:cxnSpLocks/>
+            <a:stCxn id="43" idx="3"/>
           </p:cNvCxnSpPr>
           <p:nvPr/>
         </p:nvCxnSpPr>
         <p:spPr>
           <a:xfrm flipV="1">
-            <a:off x="1829318" y="2755235"/>
-            <a:ext cx="920783" cy="5344"/>
+            <a:off x="3143341" y="2763346"/>
+            <a:ext cx="225008" cy="681"/>
           </a:xfrm>
           <a:prstGeom prst="straightConnector1">
             <a:avLst/>
@@ -8026,98 +8196,96 @@
           </a:fontRef>
         </p:style>
       </p:cxnSp>
-      <p:pic>
-        <p:nvPicPr>
-          <p:cNvPr id="93" name="Grafik 92" descr="Bauarbeiter">
-            <a:extLst>
-              <a:ext uri="{FF2B5EF4-FFF2-40B4-BE49-F238E27FC236}">
-                <a16:creationId xmlns:a16="http://schemas.microsoft.com/office/drawing/2014/main" id="{0FBEBEB3-C179-4CA6-85DB-A6386CCD4491}"/>
-              </a:ext>
-            </a:extLst>
-          </p:cNvPr>
-          <p:cNvPicPr>
-            <a:picLocks noChangeAspect="1"/>
-          </p:cNvPicPr>
-          <p:nvPr/>
-        </p:nvPicPr>
-        <p:blipFill>
-          <a:blip r:embed="rId6">
-            <a:extLst>
-              <a:ext uri="{28A0092B-C50C-407E-A947-70E740481C1C}">
-                <a14:useLocalDpi xmlns:a14="http://schemas.microsoft.com/office/drawing/2010/main" val="0"/>
-              </a:ext>
-              <a:ext uri="{96DAC541-7B7A-43D3-8B79-37D633B846F1}">
-                <asvg:svgBlip xmlns:asvg="http://schemas.microsoft.com/office/drawing/2016/SVG/main" r:embed="rId7"/>
-              </a:ext>
-            </a:extLst>
-          </a:blip>
-          <a:stretch>
-            <a:fillRect/>
-          </a:stretch>
-        </p:blipFill>
-        <p:spPr>
-          <a:xfrm>
-            <a:off x="10244483" y="3035087"/>
-            <a:ext cx="585575" cy="585575"/>
-          </a:xfrm>
-          <a:prstGeom prst="rect">
-            <a:avLst/>
-          </a:prstGeom>
-        </p:spPr>
-      </p:pic>
-      <p:sp>
-        <p:nvSpPr>
-          <p:cNvPr id="107" name="Ellipse 106">
-            <a:extLst>
-              <a:ext uri="{FF2B5EF4-FFF2-40B4-BE49-F238E27FC236}">
-                <a16:creationId xmlns:a16="http://schemas.microsoft.com/office/drawing/2014/main" id="{E483BECB-8517-40A4-8B7B-2B31F132CBB7}"/>
-              </a:ext>
-            </a:extLst>
-          </p:cNvPr>
-          <p:cNvSpPr/>
-          <p:nvPr/>
-        </p:nvSpPr>
-        <p:spPr>
-          <a:xfrm>
-            <a:off x="393626" y="3156572"/>
-            <a:ext cx="348008" cy="342604"/>
-          </a:xfrm>
-          <a:prstGeom prst="ellipse">
+      <p:cxnSp>
+        <p:nvCxnSpPr>
+          <p:cNvPr id="50" name="Gerade Verbindung mit Pfeil 49">
+            <a:extLst>
+              <a:ext uri="{FF2B5EF4-FFF2-40B4-BE49-F238E27FC236}">
+                <a16:creationId xmlns:a16="http://schemas.microsoft.com/office/drawing/2014/main" id="{4ED54E40-5262-4E52-9C69-39D4BB344E39}"/>
+              </a:ext>
+            </a:extLst>
+          </p:cNvPr>
+          <p:cNvCxnSpPr>
+            <a:cxnSpLocks/>
+            <a:endCxn id="43" idx="1"/>
+          </p:cNvCxnSpPr>
+          <p:nvPr/>
+        </p:nvCxnSpPr>
+        <p:spPr>
+          <a:xfrm>
+            <a:off x="1467956" y="2764027"/>
+            <a:ext cx="413697" cy="0"/>
+          </a:xfrm>
+          <a:prstGeom prst="straightConnector1">
             <a:avLst/>
           </a:prstGeom>
           <a:ln>
             <a:solidFill>
               <a:schemeClr val="tx1"/>
             </a:solidFill>
+            <a:tailEnd type="triangle"/>
           </a:ln>
         </p:spPr>
         <p:style>
-          <a:lnRef idx="2">
-            <a:schemeClr val="accent6"/>
+          <a:lnRef idx="1">
+            <a:schemeClr val="accent1"/>
           </a:lnRef>
-          <a:fillRef idx="1">
-            <a:schemeClr val="lt1"/>
+          <a:fillRef idx="0">
+            <a:schemeClr val="accent1"/>
           </a:fillRef>
           <a:effectRef idx="0">
-            <a:schemeClr val="accent6"/>
+            <a:schemeClr val="accent1"/>
           </a:effectRef>
           <a:fontRef idx="minor">
-            <a:schemeClr val="dk1"/>
+            <a:schemeClr val="tx1"/>
           </a:fontRef>
         </p:style>
-        <p:txBody>
-          <a:bodyPr rtlCol="0" anchor="ctr"/>
-          <a:lstStyle/>
-          <a:p>
-            <a:pPr algn="ctr"/>
-            <a:r>
-              <a:rPr lang="de-DE" dirty="0"/>
-              <a:t>8</a:t>
-            </a:r>
-            <a:endParaRPr lang="en-GB" dirty="0"/>
-          </a:p>
-        </p:txBody>
-      </p:sp>
+      </p:cxnSp>
+      <p:cxnSp>
+        <p:nvCxnSpPr>
+          <p:cNvPr id="21" name="Verbinder: gewinkelt 20">
+            <a:extLst>
+              <a:ext uri="{FF2B5EF4-FFF2-40B4-BE49-F238E27FC236}">
+                <a16:creationId xmlns:a16="http://schemas.microsoft.com/office/drawing/2014/main" id="{6431D571-4EFD-4813-825B-CB4B2F299890}"/>
+              </a:ext>
+            </a:extLst>
+          </p:cNvPr>
+          <p:cNvCxnSpPr>
+            <a:cxnSpLocks/>
+            <a:stCxn id="43" idx="0"/>
+          </p:cNvCxnSpPr>
+          <p:nvPr/>
+        </p:nvCxnSpPr>
+        <p:spPr>
+          <a:xfrm rot="16200000" flipV="1">
+            <a:off x="1889309" y="1969537"/>
+            <a:ext cx="190149" cy="1056228"/>
+          </a:xfrm>
+          <a:prstGeom prst="bentConnector2">
+            <a:avLst/>
+          </a:prstGeom>
+          <a:ln>
+            <a:solidFill>
+              <a:schemeClr val="tx1"/>
+            </a:solidFill>
+            <a:tailEnd type="triangle"/>
+          </a:ln>
+        </p:spPr>
+        <p:style>
+          <a:lnRef idx="1">
+            <a:schemeClr val="accent1"/>
+          </a:lnRef>
+          <a:fillRef idx="0">
+            <a:schemeClr val="accent1"/>
+          </a:fillRef>
+          <a:effectRef idx="0">
+            <a:schemeClr val="accent1"/>
+          </a:effectRef>
+          <a:fontRef idx="minor">
+            <a:schemeClr val="tx1"/>
+          </a:fontRef>
+        </p:style>
+      </p:cxnSp>
     </p:spTree>
     <p:extLst>
       <p:ext uri="{BB962C8B-B14F-4D97-AF65-F5344CB8AC3E}">

</xml_diff>

<commit_message>
Conclusion, Evaluation and some fixes
</commit_message>
<xml_diff>
--- a/02_Thesis/PARRHI_Thesis/Figures/FigureMaker.pptx
+++ b/02_Thesis/PARRHI_Thesis/Figures/FigureMaker.pptx
@@ -12,6 +12,8 @@
     <p:sldId id="256" r:id="rId6"/>
     <p:sldId id="262" r:id="rId7"/>
     <p:sldId id="263" r:id="rId8"/>
+    <p:sldId id="264" r:id="rId9"/>
+    <p:sldId id="265" r:id="rId10"/>
   </p:sldIdLst>
   <p:sldSz cx="12192000" cy="6858000"/>
   <p:notesSz cx="6858000" cy="9144000"/>
@@ -279,7 +281,7 @@
           <a:p>
             <a:fld id="{7CBA829E-0E5E-45A4-B6EB-8046F7F33EA6}" type="datetimeFigureOut">
               <a:rPr lang="en-GB" smtClean="0"/>
-              <a:t>11/06/2019</a:t>
+              <a:t>27/06/2019</a:t>
             </a:fld>
             <a:endParaRPr lang="en-GB"/>
           </a:p>
@@ -479,7 +481,7 @@
           <a:p>
             <a:fld id="{7CBA829E-0E5E-45A4-B6EB-8046F7F33EA6}" type="datetimeFigureOut">
               <a:rPr lang="en-GB" smtClean="0"/>
-              <a:t>11/06/2019</a:t>
+              <a:t>27/06/2019</a:t>
             </a:fld>
             <a:endParaRPr lang="en-GB"/>
           </a:p>
@@ -689,7 +691,7 @@
           <a:p>
             <a:fld id="{7CBA829E-0E5E-45A4-B6EB-8046F7F33EA6}" type="datetimeFigureOut">
               <a:rPr lang="en-GB" smtClean="0"/>
-              <a:t>11/06/2019</a:t>
+              <a:t>27/06/2019</a:t>
             </a:fld>
             <a:endParaRPr lang="en-GB"/>
           </a:p>
@@ -889,7 +891,7 @@
           <a:p>
             <a:fld id="{7CBA829E-0E5E-45A4-B6EB-8046F7F33EA6}" type="datetimeFigureOut">
               <a:rPr lang="en-GB" smtClean="0"/>
-              <a:t>11/06/2019</a:t>
+              <a:t>27/06/2019</a:t>
             </a:fld>
             <a:endParaRPr lang="en-GB"/>
           </a:p>
@@ -1165,7 +1167,7 @@
           <a:p>
             <a:fld id="{7CBA829E-0E5E-45A4-B6EB-8046F7F33EA6}" type="datetimeFigureOut">
               <a:rPr lang="en-GB" smtClean="0"/>
-              <a:t>11/06/2019</a:t>
+              <a:t>27/06/2019</a:t>
             </a:fld>
             <a:endParaRPr lang="en-GB"/>
           </a:p>
@@ -1433,7 +1435,7 @@
           <a:p>
             <a:fld id="{7CBA829E-0E5E-45A4-B6EB-8046F7F33EA6}" type="datetimeFigureOut">
               <a:rPr lang="en-GB" smtClean="0"/>
-              <a:t>11/06/2019</a:t>
+              <a:t>27/06/2019</a:t>
             </a:fld>
             <a:endParaRPr lang="en-GB"/>
           </a:p>
@@ -1848,7 +1850,7 @@
           <a:p>
             <a:fld id="{7CBA829E-0E5E-45A4-B6EB-8046F7F33EA6}" type="datetimeFigureOut">
               <a:rPr lang="en-GB" smtClean="0"/>
-              <a:t>11/06/2019</a:t>
+              <a:t>27/06/2019</a:t>
             </a:fld>
             <a:endParaRPr lang="en-GB"/>
           </a:p>
@@ -1990,7 +1992,7 @@
           <a:p>
             <a:fld id="{7CBA829E-0E5E-45A4-B6EB-8046F7F33EA6}" type="datetimeFigureOut">
               <a:rPr lang="en-GB" smtClean="0"/>
-              <a:t>11/06/2019</a:t>
+              <a:t>27/06/2019</a:t>
             </a:fld>
             <a:endParaRPr lang="en-GB"/>
           </a:p>
@@ -2103,7 +2105,7 @@
           <a:p>
             <a:fld id="{7CBA829E-0E5E-45A4-B6EB-8046F7F33EA6}" type="datetimeFigureOut">
               <a:rPr lang="en-GB" smtClean="0"/>
-              <a:t>11/06/2019</a:t>
+              <a:t>27/06/2019</a:t>
             </a:fld>
             <a:endParaRPr lang="en-GB"/>
           </a:p>
@@ -2416,7 +2418,7 @@
           <a:p>
             <a:fld id="{7CBA829E-0E5E-45A4-B6EB-8046F7F33EA6}" type="datetimeFigureOut">
               <a:rPr lang="en-GB" smtClean="0"/>
-              <a:t>11/06/2019</a:t>
+              <a:t>27/06/2019</a:t>
             </a:fld>
             <a:endParaRPr lang="en-GB"/>
           </a:p>
@@ -2705,7 +2707,7 @@
           <a:p>
             <a:fld id="{7CBA829E-0E5E-45A4-B6EB-8046F7F33EA6}" type="datetimeFigureOut">
               <a:rPr lang="en-GB" smtClean="0"/>
-              <a:t>11/06/2019</a:t>
+              <a:t>27/06/2019</a:t>
             </a:fld>
             <a:endParaRPr lang="en-GB"/>
           </a:p>
@@ -2948,7 +2950,7 @@
           <a:p>
             <a:fld id="{7CBA829E-0E5E-45A4-B6EB-8046F7F33EA6}" type="datetimeFigureOut">
               <a:rPr lang="en-GB" smtClean="0"/>
-              <a:t>11/06/2019</a:t>
+              <a:t>27/06/2019</a:t>
             </a:fld>
             <a:endParaRPr lang="en-GB"/>
           </a:p>
@@ -14776,6 +14778,3837 @@
 </p:sld>
 </file>
 
+<file path=ppt/slides/slide8.xml><?xml version="1.0" encoding="utf-8"?>
+<p:sld xmlns:a="http://schemas.openxmlformats.org/drawingml/2006/main" xmlns:r="http://schemas.openxmlformats.org/officeDocument/2006/relationships" xmlns:p="http://schemas.openxmlformats.org/presentationml/2006/main">
+  <p:cSld>
+    <p:spTree>
+      <p:nvGrpSpPr>
+        <p:cNvPr id="1" name=""/>
+        <p:cNvGrpSpPr/>
+        <p:nvPr/>
+      </p:nvGrpSpPr>
+      <p:grpSpPr>
+        <a:xfrm>
+          <a:off x="0" y="0"/>
+          <a:ext cx="0" cy="0"/>
+          <a:chOff x="0" y="0"/>
+          <a:chExt cx="0" cy="0"/>
+        </a:xfrm>
+      </p:grpSpPr>
+      <p:cxnSp>
+        <p:nvCxnSpPr>
+          <p:cNvPr id="4" name="Gerade Verbindung mit Pfeil 3">
+            <a:extLst>
+              <a:ext uri="{FF2B5EF4-FFF2-40B4-BE49-F238E27FC236}">
+                <a16:creationId xmlns:a16="http://schemas.microsoft.com/office/drawing/2014/main" id="{1BB80870-5B29-4626-8B08-5078550CDE2C}"/>
+              </a:ext>
+            </a:extLst>
+          </p:cNvPr>
+          <p:cNvCxnSpPr>
+            <a:cxnSpLocks/>
+            <a:stCxn id="10" idx="0"/>
+            <a:endCxn id="6" idx="2"/>
+          </p:cNvCxnSpPr>
+          <p:nvPr/>
+        </p:nvCxnSpPr>
+        <p:spPr>
+          <a:xfrm flipH="1" flipV="1">
+            <a:off x="3212976" y="1475166"/>
+            <a:ext cx="50" cy="437377"/>
+          </a:xfrm>
+          <a:prstGeom prst="straightConnector1">
+            <a:avLst/>
+          </a:prstGeom>
+          <a:ln>
+            <a:headEnd type="triangle"/>
+            <a:tailEnd type="none"/>
+          </a:ln>
+        </p:spPr>
+        <p:style>
+          <a:lnRef idx="1">
+            <a:schemeClr val="dk1"/>
+          </a:lnRef>
+          <a:fillRef idx="0">
+            <a:schemeClr val="dk1"/>
+          </a:fillRef>
+          <a:effectRef idx="0">
+            <a:schemeClr val="dk1"/>
+          </a:effectRef>
+          <a:fontRef idx="minor">
+            <a:schemeClr val="tx1"/>
+          </a:fontRef>
+        </p:style>
+      </p:cxnSp>
+      <p:grpSp>
+        <p:nvGrpSpPr>
+          <p:cNvPr id="5" name="Gruppieren 4">
+            <a:extLst>
+              <a:ext uri="{FF2B5EF4-FFF2-40B4-BE49-F238E27FC236}">
+                <a16:creationId xmlns:a16="http://schemas.microsoft.com/office/drawing/2014/main" id="{1932BF2B-88D1-4D33-8BEE-435B9BF77E1A}"/>
+              </a:ext>
+            </a:extLst>
+          </p:cNvPr>
+          <p:cNvGrpSpPr/>
+          <p:nvPr/>
+        </p:nvGrpSpPr>
+        <p:grpSpPr>
+          <a:xfrm>
+            <a:off x="2599863" y="961707"/>
+            <a:ext cx="1226225" cy="513459"/>
+            <a:chOff x="1656541" y="1949335"/>
+            <a:chExt cx="1226225" cy="513459"/>
+          </a:xfrm>
+        </p:grpSpPr>
+        <p:sp>
+          <p:nvSpPr>
+            <p:cNvPr id="6" name="Rechteck: abgerundete Ecken 5">
+              <a:extLst>
+                <a:ext uri="{FF2B5EF4-FFF2-40B4-BE49-F238E27FC236}">
+                  <a16:creationId xmlns:a16="http://schemas.microsoft.com/office/drawing/2014/main" id="{949B5299-A8AE-455E-8458-D48688713C03}"/>
+                </a:ext>
+              </a:extLst>
+            </p:cNvPr>
+            <p:cNvSpPr/>
+            <p:nvPr/>
+          </p:nvSpPr>
+          <p:spPr>
+            <a:xfrm>
+              <a:off x="1656541" y="1949335"/>
+              <a:ext cx="1226225" cy="513459"/>
+            </a:xfrm>
+            <a:prstGeom prst="roundRect">
+              <a:avLst>
+                <a:gd name="adj" fmla="val 10738"/>
+              </a:avLst>
+            </a:prstGeom>
+            <a:solidFill>
+              <a:schemeClr val="bg1">
+                <a:lumMod val="95000"/>
+              </a:schemeClr>
+            </a:solidFill>
+            <a:ln>
+              <a:solidFill>
+                <a:schemeClr val="accent1">
+                  <a:lumMod val="50000"/>
+                </a:schemeClr>
+              </a:solidFill>
+            </a:ln>
+          </p:spPr>
+          <p:style>
+            <a:lnRef idx="2">
+              <a:schemeClr val="accent6"/>
+            </a:lnRef>
+            <a:fillRef idx="1">
+              <a:schemeClr val="lt1"/>
+            </a:fillRef>
+            <a:effectRef idx="0">
+              <a:schemeClr val="accent6"/>
+            </a:effectRef>
+            <a:fontRef idx="minor">
+              <a:schemeClr val="dk1"/>
+            </a:fontRef>
+          </p:style>
+          <p:txBody>
+            <a:bodyPr rtlCol="0" anchor="t"/>
+            <a:lstStyle/>
+            <a:p>
+              <a:pPr algn="ctr"/>
+              <a:r>
+                <a:rPr lang="en-GB" sz="1200" dirty="0"/>
+                <a:t>Command User to Start Position</a:t>
+              </a:r>
+            </a:p>
+          </p:txBody>
+        </p:sp>
+        <p:sp>
+          <p:nvSpPr>
+            <p:cNvPr id="7" name="Textfeld 6">
+              <a:extLst>
+                <a:ext uri="{FF2B5EF4-FFF2-40B4-BE49-F238E27FC236}">
+                  <a16:creationId xmlns:a16="http://schemas.microsoft.com/office/drawing/2014/main" id="{5CD0F21D-0513-4026-93F0-351AE3783F9A}"/>
+                </a:ext>
+              </a:extLst>
+            </p:cNvPr>
+            <p:cNvSpPr txBox="1"/>
+            <p:nvPr/>
+          </p:nvSpPr>
+          <p:spPr>
+            <a:xfrm>
+              <a:off x="1656541" y="2201184"/>
+              <a:ext cx="1226225" cy="261610"/>
+            </a:xfrm>
+            <a:prstGeom prst="rect">
+              <a:avLst/>
+            </a:prstGeom>
+            <a:noFill/>
+          </p:spPr>
+          <p:txBody>
+            <a:bodyPr wrap="square" rtlCol="0">
+              <a:spAutoFit/>
+            </a:bodyPr>
+            <a:lstStyle/>
+            <a:p>
+              <a:endParaRPr lang="en-US" sz="1100" dirty="0"/>
+            </a:p>
+          </p:txBody>
+        </p:sp>
+      </p:grpSp>
+      <p:sp>
+        <p:nvSpPr>
+          <p:cNvPr id="8" name="Flussdiagramm: Verzweigung 7">
+            <a:extLst>
+              <a:ext uri="{FF2B5EF4-FFF2-40B4-BE49-F238E27FC236}">
+                <a16:creationId xmlns:a16="http://schemas.microsoft.com/office/drawing/2014/main" id="{C26B0AA6-944C-4BA3-A663-F3C24BE2F932}"/>
+              </a:ext>
+            </a:extLst>
+          </p:cNvPr>
+          <p:cNvSpPr/>
+          <p:nvPr/>
+        </p:nvSpPr>
+        <p:spPr>
+          <a:xfrm rot="5400000">
+            <a:off x="3079674" y="2947338"/>
+            <a:ext cx="266700" cy="206375"/>
+          </a:xfrm>
+          <a:prstGeom prst="flowChartDecision">
+            <a:avLst/>
+          </a:prstGeom>
+          <a:solidFill>
+            <a:schemeClr val="bg1">
+              <a:lumMod val="85000"/>
+            </a:schemeClr>
+          </a:solidFill>
+        </p:spPr>
+        <p:style>
+          <a:lnRef idx="2">
+            <a:schemeClr val="dk1">
+              <a:shade val="50000"/>
+            </a:schemeClr>
+          </a:lnRef>
+          <a:fillRef idx="1">
+            <a:schemeClr val="dk1"/>
+          </a:fillRef>
+          <a:effectRef idx="0">
+            <a:schemeClr val="dk1"/>
+          </a:effectRef>
+          <a:fontRef idx="minor">
+            <a:schemeClr val="lt1"/>
+          </a:fontRef>
+        </p:style>
+        <p:txBody>
+          <a:bodyPr rtlCol="0" anchor="ctr"/>
+          <a:lstStyle/>
+          <a:p>
+            <a:pPr algn="ctr"/>
+            <a:endParaRPr lang="en-US"/>
+          </a:p>
+        </p:txBody>
+      </p:sp>
+      <p:sp>
+        <p:nvSpPr>
+          <p:cNvPr id="10" name="Rechteck: abgerundete Ecken 9">
+            <a:extLst>
+              <a:ext uri="{FF2B5EF4-FFF2-40B4-BE49-F238E27FC236}">
+                <a16:creationId xmlns:a16="http://schemas.microsoft.com/office/drawing/2014/main" id="{A6F43E6C-4CC7-48DD-BE1D-F4004F982255}"/>
+              </a:ext>
+            </a:extLst>
+          </p:cNvPr>
+          <p:cNvSpPr/>
+          <p:nvPr/>
+        </p:nvSpPr>
+        <p:spPr>
+          <a:xfrm>
+            <a:off x="2599913" y="1912543"/>
+            <a:ext cx="1226225" cy="652845"/>
+          </a:xfrm>
+          <a:prstGeom prst="roundRect">
+            <a:avLst>
+              <a:gd name="adj" fmla="val 10738"/>
+            </a:avLst>
+          </a:prstGeom>
+          <a:solidFill>
+            <a:schemeClr val="bg1">
+              <a:lumMod val="95000"/>
+            </a:schemeClr>
+          </a:solidFill>
+          <a:ln>
+            <a:solidFill>
+              <a:schemeClr val="accent1">
+                <a:lumMod val="50000"/>
+              </a:schemeClr>
+            </a:solidFill>
+          </a:ln>
+        </p:spPr>
+        <p:style>
+          <a:lnRef idx="2">
+            <a:schemeClr val="accent6"/>
+          </a:lnRef>
+          <a:fillRef idx="1">
+            <a:schemeClr val="lt1"/>
+          </a:fillRef>
+          <a:effectRef idx="0">
+            <a:schemeClr val="accent6"/>
+          </a:effectRef>
+          <a:fontRef idx="minor">
+            <a:schemeClr val="dk1"/>
+          </a:fontRef>
+        </p:style>
+        <p:txBody>
+          <a:bodyPr rtlCol="0" anchor="t"/>
+          <a:lstStyle/>
+          <a:p>
+            <a:pPr algn="ctr"/>
+            <a:r>
+              <a:rPr lang="en-GB" sz="1200" dirty="0"/>
+              <a:t>Command: Robot Tip to Target Point</a:t>
+            </a:r>
+          </a:p>
+        </p:txBody>
+      </p:sp>
+      <p:cxnSp>
+        <p:nvCxnSpPr>
+          <p:cNvPr id="11" name="Gerade Verbindung mit Pfeil 10">
+            <a:extLst>
+              <a:ext uri="{FF2B5EF4-FFF2-40B4-BE49-F238E27FC236}">
+                <a16:creationId xmlns:a16="http://schemas.microsoft.com/office/drawing/2014/main" id="{A7A520C7-4110-4EB5-9A44-90F15988FA79}"/>
+              </a:ext>
+            </a:extLst>
+          </p:cNvPr>
+          <p:cNvCxnSpPr>
+            <a:cxnSpLocks/>
+            <a:stCxn id="8" idx="1"/>
+            <a:endCxn id="10" idx="2"/>
+          </p:cNvCxnSpPr>
+          <p:nvPr/>
+        </p:nvCxnSpPr>
+        <p:spPr>
+          <a:xfrm flipV="1">
+            <a:off x="3213024" y="2565388"/>
+            <a:ext cx="2" cy="351788"/>
+          </a:xfrm>
+          <a:prstGeom prst="straightConnector1">
+            <a:avLst/>
+          </a:prstGeom>
+          <a:ln>
+            <a:headEnd type="triangle"/>
+            <a:tailEnd type="none"/>
+          </a:ln>
+        </p:spPr>
+        <p:style>
+          <a:lnRef idx="1">
+            <a:schemeClr val="dk1"/>
+          </a:lnRef>
+          <a:fillRef idx="0">
+            <a:schemeClr val="dk1"/>
+          </a:fillRef>
+          <a:effectRef idx="0">
+            <a:schemeClr val="dk1"/>
+          </a:effectRef>
+          <a:fontRef idx="minor">
+            <a:schemeClr val="tx1"/>
+          </a:fontRef>
+        </p:style>
+      </p:cxnSp>
+      <p:sp>
+        <p:nvSpPr>
+          <p:cNvPr id="13" name="Kreis: nicht ausgefüllt 12">
+            <a:extLst>
+              <a:ext uri="{FF2B5EF4-FFF2-40B4-BE49-F238E27FC236}">
+                <a16:creationId xmlns:a16="http://schemas.microsoft.com/office/drawing/2014/main" id="{75BF01B9-0322-4733-8DDC-5F6D91C375A2}"/>
+              </a:ext>
+            </a:extLst>
+          </p:cNvPr>
+          <p:cNvSpPr/>
+          <p:nvPr/>
+        </p:nvSpPr>
+        <p:spPr>
+          <a:xfrm>
+            <a:off x="3033026" y="445814"/>
+            <a:ext cx="360000" cy="360000"/>
+          </a:xfrm>
+          <a:prstGeom prst="donut">
+            <a:avLst>
+              <a:gd name="adj" fmla="val 1272"/>
+            </a:avLst>
+          </a:prstGeom>
+        </p:spPr>
+        <p:style>
+          <a:lnRef idx="2">
+            <a:schemeClr val="dk1">
+              <a:shade val="50000"/>
+            </a:schemeClr>
+          </a:lnRef>
+          <a:fillRef idx="1">
+            <a:schemeClr val="dk1"/>
+          </a:fillRef>
+          <a:effectRef idx="0">
+            <a:schemeClr val="dk1"/>
+          </a:effectRef>
+          <a:fontRef idx="minor">
+            <a:schemeClr val="lt1"/>
+          </a:fontRef>
+        </p:style>
+        <p:txBody>
+          <a:bodyPr rtlCol="0" anchor="ctr"/>
+          <a:lstStyle/>
+          <a:p>
+            <a:pPr algn="ctr"/>
+            <a:endParaRPr lang="en-US">
+              <a:solidFill>
+                <a:schemeClr val="tx1"/>
+              </a:solidFill>
+            </a:endParaRPr>
+          </a:p>
+        </p:txBody>
+      </p:sp>
+      <p:sp>
+        <p:nvSpPr>
+          <p:cNvPr id="14" name="Ellipse 13">
+            <a:extLst>
+              <a:ext uri="{FF2B5EF4-FFF2-40B4-BE49-F238E27FC236}">
+                <a16:creationId xmlns:a16="http://schemas.microsoft.com/office/drawing/2014/main" id="{E9866C92-475F-46B9-9A36-D95D99AB8476}"/>
+              </a:ext>
+            </a:extLst>
+          </p:cNvPr>
+          <p:cNvSpPr/>
+          <p:nvPr/>
+        </p:nvSpPr>
+        <p:spPr>
+          <a:xfrm>
+            <a:off x="3077976" y="490814"/>
+            <a:ext cx="270000" cy="270000"/>
+          </a:xfrm>
+          <a:prstGeom prst="ellipse">
+            <a:avLst/>
+          </a:prstGeom>
+        </p:spPr>
+        <p:style>
+          <a:lnRef idx="2">
+            <a:schemeClr val="dk1">
+              <a:shade val="50000"/>
+            </a:schemeClr>
+          </a:lnRef>
+          <a:fillRef idx="1">
+            <a:schemeClr val="dk1"/>
+          </a:fillRef>
+          <a:effectRef idx="0">
+            <a:schemeClr val="dk1"/>
+          </a:effectRef>
+          <a:fontRef idx="minor">
+            <a:schemeClr val="lt1"/>
+          </a:fontRef>
+        </p:style>
+        <p:txBody>
+          <a:bodyPr rtlCol="0" anchor="ctr"/>
+          <a:lstStyle/>
+          <a:p>
+            <a:pPr algn="ctr"/>
+            <a:endParaRPr lang="en-US"/>
+          </a:p>
+        </p:txBody>
+      </p:sp>
+      <p:cxnSp>
+        <p:nvCxnSpPr>
+          <p:cNvPr id="15" name="Gerade Verbindung mit Pfeil 14">
+            <a:extLst>
+              <a:ext uri="{FF2B5EF4-FFF2-40B4-BE49-F238E27FC236}">
+                <a16:creationId xmlns:a16="http://schemas.microsoft.com/office/drawing/2014/main" id="{86750A82-6387-4632-998F-548E1DC42984}"/>
+              </a:ext>
+            </a:extLst>
+          </p:cNvPr>
+          <p:cNvCxnSpPr>
+            <a:cxnSpLocks/>
+            <a:stCxn id="6" idx="0"/>
+            <a:endCxn id="13" idx="4"/>
+          </p:cNvCxnSpPr>
+          <p:nvPr/>
+        </p:nvCxnSpPr>
+        <p:spPr>
+          <a:xfrm flipV="1">
+            <a:off x="3212976" y="805814"/>
+            <a:ext cx="50" cy="155893"/>
+          </a:xfrm>
+          <a:prstGeom prst="straightConnector1">
+            <a:avLst/>
+          </a:prstGeom>
+          <a:ln>
+            <a:headEnd type="triangle"/>
+            <a:tailEnd type="none"/>
+          </a:ln>
+        </p:spPr>
+        <p:style>
+          <a:lnRef idx="1">
+            <a:schemeClr val="dk1"/>
+          </a:lnRef>
+          <a:fillRef idx="0">
+            <a:schemeClr val="dk1"/>
+          </a:fillRef>
+          <a:effectRef idx="0">
+            <a:schemeClr val="dk1"/>
+          </a:effectRef>
+          <a:fontRef idx="minor">
+            <a:schemeClr val="tx1"/>
+          </a:fontRef>
+        </p:style>
+      </p:cxnSp>
+      <p:sp>
+        <p:nvSpPr>
+          <p:cNvPr id="30" name="Rechteck: abgerundete Ecken 29">
+            <a:extLst>
+              <a:ext uri="{FF2B5EF4-FFF2-40B4-BE49-F238E27FC236}">
+                <a16:creationId xmlns:a16="http://schemas.microsoft.com/office/drawing/2014/main" id="{D922BFDE-9A51-4E9C-BD56-6B15471CF271}"/>
+              </a:ext>
+            </a:extLst>
+          </p:cNvPr>
+          <p:cNvSpPr/>
+          <p:nvPr/>
+        </p:nvSpPr>
+        <p:spPr>
+          <a:xfrm>
+            <a:off x="4003597" y="3357490"/>
+            <a:ext cx="1226225" cy="652845"/>
+          </a:xfrm>
+          <a:prstGeom prst="roundRect">
+            <a:avLst>
+              <a:gd name="adj" fmla="val 10738"/>
+            </a:avLst>
+          </a:prstGeom>
+          <a:solidFill>
+            <a:schemeClr val="bg1">
+              <a:lumMod val="95000"/>
+            </a:schemeClr>
+          </a:solidFill>
+          <a:ln>
+            <a:solidFill>
+              <a:schemeClr val="accent1">
+                <a:lumMod val="50000"/>
+              </a:schemeClr>
+            </a:solidFill>
+          </a:ln>
+        </p:spPr>
+        <p:style>
+          <a:lnRef idx="2">
+            <a:schemeClr val="accent6"/>
+          </a:lnRef>
+          <a:fillRef idx="1">
+            <a:schemeClr val="lt1"/>
+          </a:fillRef>
+          <a:effectRef idx="0">
+            <a:schemeClr val="accent6"/>
+          </a:effectRef>
+          <a:fontRef idx="minor">
+            <a:schemeClr val="dk1"/>
+          </a:fontRef>
+        </p:style>
+        <p:txBody>
+          <a:bodyPr rtlCol="0" anchor="t"/>
+          <a:lstStyle/>
+          <a:p>
+            <a:pPr algn="ctr"/>
+            <a:r>
+              <a:rPr lang="en-GB" sz="1200" dirty="0"/>
+              <a:t>Fail Msg, Command User to Finish Pos</a:t>
+            </a:r>
+          </a:p>
+        </p:txBody>
+      </p:sp>
+      <p:sp>
+        <p:nvSpPr>
+          <p:cNvPr id="31" name="Rechteck: abgerundete Ecken 30">
+            <a:extLst>
+              <a:ext uri="{FF2B5EF4-FFF2-40B4-BE49-F238E27FC236}">
+                <a16:creationId xmlns:a16="http://schemas.microsoft.com/office/drawing/2014/main" id="{02EFC5AF-BE39-48B6-A0E1-95BAD76EA5F1}"/>
+              </a:ext>
+            </a:extLst>
+          </p:cNvPr>
+          <p:cNvSpPr/>
+          <p:nvPr/>
+        </p:nvSpPr>
+        <p:spPr>
+          <a:xfrm>
+            <a:off x="1260397" y="3357489"/>
+            <a:ext cx="1226225" cy="652845"/>
+          </a:xfrm>
+          <a:prstGeom prst="roundRect">
+            <a:avLst>
+              <a:gd name="adj" fmla="val 10738"/>
+            </a:avLst>
+          </a:prstGeom>
+          <a:solidFill>
+            <a:schemeClr val="bg1">
+              <a:lumMod val="95000"/>
+            </a:schemeClr>
+          </a:solidFill>
+          <a:ln>
+            <a:solidFill>
+              <a:schemeClr val="accent1">
+                <a:lumMod val="50000"/>
+              </a:schemeClr>
+            </a:solidFill>
+          </a:ln>
+        </p:spPr>
+        <p:style>
+          <a:lnRef idx="2">
+            <a:schemeClr val="accent6"/>
+          </a:lnRef>
+          <a:fillRef idx="1">
+            <a:schemeClr val="lt1"/>
+          </a:fillRef>
+          <a:effectRef idx="0">
+            <a:schemeClr val="accent6"/>
+          </a:effectRef>
+          <a:fontRef idx="minor">
+            <a:schemeClr val="dk1"/>
+          </a:fontRef>
+        </p:style>
+        <p:txBody>
+          <a:bodyPr rtlCol="0" anchor="t"/>
+          <a:lstStyle/>
+          <a:p>
+            <a:pPr algn="ctr"/>
+            <a:r>
+              <a:rPr lang="en-GB" sz="1200" dirty="0"/>
+              <a:t>Success Msg, Command User to Finish Pos</a:t>
+            </a:r>
+          </a:p>
+        </p:txBody>
+      </p:sp>
+      <p:sp>
+        <p:nvSpPr>
+          <p:cNvPr id="32" name="Rechteck: abgerundete Ecken 31">
+            <a:extLst>
+              <a:ext uri="{FF2B5EF4-FFF2-40B4-BE49-F238E27FC236}">
+                <a16:creationId xmlns:a16="http://schemas.microsoft.com/office/drawing/2014/main" id="{5D629923-64F3-4896-83C9-850A7C711CD9}"/>
+              </a:ext>
+            </a:extLst>
+          </p:cNvPr>
+          <p:cNvSpPr/>
+          <p:nvPr/>
+        </p:nvSpPr>
+        <p:spPr>
+          <a:xfrm>
+            <a:off x="2599910" y="4891222"/>
+            <a:ext cx="1226225" cy="522103"/>
+          </a:xfrm>
+          <a:prstGeom prst="roundRect">
+            <a:avLst>
+              <a:gd name="adj" fmla="val 10738"/>
+            </a:avLst>
+          </a:prstGeom>
+          <a:solidFill>
+            <a:schemeClr val="bg1">
+              <a:lumMod val="95000"/>
+            </a:schemeClr>
+          </a:solidFill>
+          <a:ln>
+            <a:solidFill>
+              <a:schemeClr val="accent1">
+                <a:lumMod val="50000"/>
+              </a:schemeClr>
+            </a:solidFill>
+          </a:ln>
+        </p:spPr>
+        <p:style>
+          <a:lnRef idx="2">
+            <a:schemeClr val="accent6"/>
+          </a:lnRef>
+          <a:fillRef idx="1">
+            <a:schemeClr val="lt1"/>
+          </a:fillRef>
+          <a:effectRef idx="0">
+            <a:schemeClr val="accent6"/>
+          </a:effectRef>
+          <a:fontRef idx="minor">
+            <a:schemeClr val="dk1"/>
+          </a:fontRef>
+        </p:style>
+        <p:txBody>
+          <a:bodyPr rtlCol="0" anchor="t"/>
+          <a:lstStyle/>
+          <a:p>
+            <a:pPr algn="ctr"/>
+            <a:r>
+              <a:rPr lang="en-GB" sz="1200" dirty="0"/>
+              <a:t>Success Message</a:t>
+            </a:r>
+          </a:p>
+        </p:txBody>
+      </p:sp>
+      <p:sp>
+        <p:nvSpPr>
+          <p:cNvPr id="33" name="Flussdiagramm: Verzweigung 32">
+            <a:extLst>
+              <a:ext uri="{FF2B5EF4-FFF2-40B4-BE49-F238E27FC236}">
+                <a16:creationId xmlns:a16="http://schemas.microsoft.com/office/drawing/2014/main" id="{6F5762B1-8F08-43FE-8B6F-F0CD2E0E1D25}"/>
+              </a:ext>
+            </a:extLst>
+          </p:cNvPr>
+          <p:cNvSpPr/>
+          <p:nvPr/>
+        </p:nvSpPr>
+        <p:spPr>
+          <a:xfrm rot="5400000">
+            <a:off x="3079673" y="4302897"/>
+            <a:ext cx="266700" cy="206375"/>
+          </a:xfrm>
+          <a:prstGeom prst="flowChartDecision">
+            <a:avLst/>
+          </a:prstGeom>
+          <a:solidFill>
+            <a:schemeClr val="bg1">
+              <a:lumMod val="85000"/>
+            </a:schemeClr>
+          </a:solidFill>
+        </p:spPr>
+        <p:style>
+          <a:lnRef idx="2">
+            <a:schemeClr val="dk1">
+              <a:shade val="50000"/>
+            </a:schemeClr>
+          </a:lnRef>
+          <a:fillRef idx="1">
+            <a:schemeClr val="dk1"/>
+          </a:fillRef>
+          <a:effectRef idx="0">
+            <a:schemeClr val="dk1"/>
+          </a:effectRef>
+          <a:fontRef idx="minor">
+            <a:schemeClr val="lt1"/>
+          </a:fontRef>
+        </p:style>
+        <p:txBody>
+          <a:bodyPr rtlCol="0" anchor="ctr"/>
+          <a:lstStyle/>
+          <a:p>
+            <a:pPr algn="ctr"/>
+            <a:endParaRPr lang="en-US"/>
+          </a:p>
+        </p:txBody>
+      </p:sp>
+      <p:cxnSp>
+        <p:nvCxnSpPr>
+          <p:cNvPr id="34" name="Gerade Verbindung mit Pfeil 33">
+            <a:extLst>
+              <a:ext uri="{FF2B5EF4-FFF2-40B4-BE49-F238E27FC236}">
+                <a16:creationId xmlns:a16="http://schemas.microsoft.com/office/drawing/2014/main" id="{079EF369-BCF9-4792-8D7C-D9AB706F5A92}"/>
+              </a:ext>
+            </a:extLst>
+          </p:cNvPr>
+          <p:cNvCxnSpPr>
+            <a:cxnSpLocks/>
+            <a:stCxn id="32" idx="0"/>
+            <a:endCxn id="33" idx="3"/>
+          </p:cNvCxnSpPr>
+          <p:nvPr/>
+        </p:nvCxnSpPr>
+        <p:spPr>
+          <a:xfrm flipV="1">
+            <a:off x="3213023" y="4539435"/>
+            <a:ext cx="0" cy="351787"/>
+          </a:xfrm>
+          <a:prstGeom prst="straightConnector1">
+            <a:avLst/>
+          </a:prstGeom>
+          <a:ln>
+            <a:headEnd type="triangle"/>
+            <a:tailEnd type="none"/>
+          </a:ln>
+        </p:spPr>
+        <p:style>
+          <a:lnRef idx="1">
+            <a:schemeClr val="dk1"/>
+          </a:lnRef>
+          <a:fillRef idx="0">
+            <a:schemeClr val="dk1"/>
+          </a:fillRef>
+          <a:effectRef idx="0">
+            <a:schemeClr val="dk1"/>
+          </a:effectRef>
+          <a:fontRef idx="minor">
+            <a:schemeClr val="tx1"/>
+          </a:fontRef>
+        </p:style>
+      </p:cxnSp>
+      <p:cxnSp>
+        <p:nvCxnSpPr>
+          <p:cNvPr id="38" name="Verbinder: gewinkelt 37">
+            <a:extLst>
+              <a:ext uri="{FF2B5EF4-FFF2-40B4-BE49-F238E27FC236}">
+                <a16:creationId xmlns:a16="http://schemas.microsoft.com/office/drawing/2014/main" id="{9C76E3A7-82CC-4E29-A8D8-69AA073DF20F}"/>
+              </a:ext>
+            </a:extLst>
+          </p:cNvPr>
+          <p:cNvCxnSpPr>
+            <a:cxnSpLocks/>
+            <a:stCxn id="8" idx="0"/>
+            <a:endCxn id="30" idx="0"/>
+          </p:cNvCxnSpPr>
+          <p:nvPr/>
+        </p:nvCxnSpPr>
+        <p:spPr>
+          <a:xfrm>
+            <a:off x="3316212" y="3050526"/>
+            <a:ext cx="1300498" cy="306964"/>
+          </a:xfrm>
+          <a:prstGeom prst="bentConnector2">
+            <a:avLst/>
+          </a:prstGeom>
+          <a:ln>
+            <a:solidFill>
+              <a:schemeClr val="tx1"/>
+            </a:solidFill>
+            <a:tailEnd type="triangle"/>
+          </a:ln>
+        </p:spPr>
+        <p:style>
+          <a:lnRef idx="1">
+            <a:schemeClr val="accent1"/>
+          </a:lnRef>
+          <a:fillRef idx="0">
+            <a:schemeClr val="accent1"/>
+          </a:fillRef>
+          <a:effectRef idx="0">
+            <a:schemeClr val="accent1"/>
+          </a:effectRef>
+          <a:fontRef idx="minor">
+            <a:schemeClr val="tx1"/>
+          </a:fontRef>
+        </p:style>
+      </p:cxnSp>
+      <p:cxnSp>
+        <p:nvCxnSpPr>
+          <p:cNvPr id="41" name="Verbinder: gewinkelt 40">
+            <a:extLst>
+              <a:ext uri="{FF2B5EF4-FFF2-40B4-BE49-F238E27FC236}">
+                <a16:creationId xmlns:a16="http://schemas.microsoft.com/office/drawing/2014/main" id="{C91A9CF9-5376-4608-968A-D4A216781B44}"/>
+              </a:ext>
+            </a:extLst>
+          </p:cNvPr>
+          <p:cNvCxnSpPr>
+            <a:stCxn id="8" idx="2"/>
+            <a:endCxn id="31" idx="0"/>
+          </p:cNvCxnSpPr>
+          <p:nvPr/>
+        </p:nvCxnSpPr>
+        <p:spPr>
+          <a:xfrm rot="10800000" flipV="1">
+            <a:off x="1873511" y="3050525"/>
+            <a:ext cx="1236327" cy="306963"/>
+          </a:xfrm>
+          <a:prstGeom prst="bentConnector2">
+            <a:avLst/>
+          </a:prstGeom>
+          <a:ln>
+            <a:solidFill>
+              <a:schemeClr val="tx1"/>
+            </a:solidFill>
+            <a:tailEnd type="triangle"/>
+          </a:ln>
+        </p:spPr>
+        <p:style>
+          <a:lnRef idx="1">
+            <a:schemeClr val="accent1"/>
+          </a:lnRef>
+          <a:fillRef idx="0">
+            <a:schemeClr val="accent1"/>
+          </a:fillRef>
+          <a:effectRef idx="0">
+            <a:schemeClr val="accent1"/>
+          </a:effectRef>
+          <a:fontRef idx="minor">
+            <a:schemeClr val="tx1"/>
+          </a:fontRef>
+        </p:style>
+      </p:cxnSp>
+      <p:cxnSp>
+        <p:nvCxnSpPr>
+          <p:cNvPr id="43" name="Verbinder: gewinkelt 42">
+            <a:extLst>
+              <a:ext uri="{FF2B5EF4-FFF2-40B4-BE49-F238E27FC236}">
+                <a16:creationId xmlns:a16="http://schemas.microsoft.com/office/drawing/2014/main" id="{05FC3420-B936-4299-8179-C2CB06736C9F}"/>
+              </a:ext>
+            </a:extLst>
+          </p:cNvPr>
+          <p:cNvCxnSpPr>
+            <a:stCxn id="31" idx="2"/>
+            <a:endCxn id="33" idx="2"/>
+          </p:cNvCxnSpPr>
+          <p:nvPr/>
+        </p:nvCxnSpPr>
+        <p:spPr>
+          <a:xfrm rot="16200000" flipH="1">
+            <a:off x="2293798" y="3590046"/>
+            <a:ext cx="395751" cy="1236326"/>
+          </a:xfrm>
+          <a:prstGeom prst="bentConnector2">
+            <a:avLst/>
+          </a:prstGeom>
+          <a:ln>
+            <a:solidFill>
+              <a:schemeClr val="tx1"/>
+            </a:solidFill>
+            <a:tailEnd type="triangle"/>
+          </a:ln>
+        </p:spPr>
+        <p:style>
+          <a:lnRef idx="1">
+            <a:schemeClr val="accent1"/>
+          </a:lnRef>
+          <a:fillRef idx="0">
+            <a:schemeClr val="accent1"/>
+          </a:fillRef>
+          <a:effectRef idx="0">
+            <a:schemeClr val="accent1"/>
+          </a:effectRef>
+          <a:fontRef idx="minor">
+            <a:schemeClr val="tx1"/>
+          </a:fontRef>
+        </p:style>
+      </p:cxnSp>
+      <p:cxnSp>
+        <p:nvCxnSpPr>
+          <p:cNvPr id="45" name="Verbinder: gewinkelt 44">
+            <a:extLst>
+              <a:ext uri="{FF2B5EF4-FFF2-40B4-BE49-F238E27FC236}">
+                <a16:creationId xmlns:a16="http://schemas.microsoft.com/office/drawing/2014/main" id="{53726422-8F8E-448F-92BA-CEA75B99AC27}"/>
+              </a:ext>
+            </a:extLst>
+          </p:cNvPr>
+          <p:cNvCxnSpPr>
+            <a:stCxn id="30" idx="2"/>
+            <a:endCxn id="33" idx="0"/>
+          </p:cNvCxnSpPr>
+          <p:nvPr/>
+        </p:nvCxnSpPr>
+        <p:spPr>
+          <a:xfrm rot="5400000">
+            <a:off x="3768586" y="3557961"/>
+            <a:ext cx="395750" cy="1300499"/>
+          </a:xfrm>
+          <a:prstGeom prst="bentConnector2">
+            <a:avLst/>
+          </a:prstGeom>
+          <a:ln>
+            <a:solidFill>
+              <a:schemeClr val="tx1"/>
+            </a:solidFill>
+            <a:tailEnd type="triangle"/>
+          </a:ln>
+        </p:spPr>
+        <p:style>
+          <a:lnRef idx="1">
+            <a:schemeClr val="accent1"/>
+          </a:lnRef>
+          <a:fillRef idx="0">
+            <a:schemeClr val="accent1"/>
+          </a:fillRef>
+          <a:effectRef idx="0">
+            <a:schemeClr val="accent1"/>
+          </a:effectRef>
+          <a:fontRef idx="minor">
+            <a:schemeClr val="tx1"/>
+          </a:fontRef>
+        </p:style>
+      </p:cxnSp>
+      <p:sp>
+        <p:nvSpPr>
+          <p:cNvPr id="46" name="Textfeld 45">
+            <a:extLst>
+              <a:ext uri="{FF2B5EF4-FFF2-40B4-BE49-F238E27FC236}">
+                <a16:creationId xmlns:a16="http://schemas.microsoft.com/office/drawing/2014/main" id="{717876B2-5F7B-4E42-B1F2-AFB53D3EF0C4}"/>
+              </a:ext>
+            </a:extLst>
+          </p:cNvPr>
+          <p:cNvSpPr txBox="1"/>
+          <p:nvPr/>
+        </p:nvSpPr>
+        <p:spPr>
+          <a:xfrm>
+            <a:off x="3238804" y="1560286"/>
+            <a:ext cx="1529586" cy="276999"/>
+          </a:xfrm>
+          <a:prstGeom prst="rect">
+            <a:avLst/>
+          </a:prstGeom>
+          <a:noFill/>
+        </p:spPr>
+        <p:txBody>
+          <a:bodyPr wrap="none" rtlCol="0">
+            <a:spAutoFit/>
+          </a:bodyPr>
+          <a:lstStyle/>
+          <a:p>
+            <a:r>
+              <a:rPr lang="en-US" sz="1200" dirty="0"/>
+              <a:t>[UserPos == StartPos]</a:t>
+            </a:r>
+          </a:p>
+        </p:txBody>
+      </p:sp>
+      <p:sp>
+        <p:nvSpPr>
+          <p:cNvPr id="47" name="Textfeld 46">
+            <a:extLst>
+              <a:ext uri="{FF2B5EF4-FFF2-40B4-BE49-F238E27FC236}">
+                <a16:creationId xmlns:a16="http://schemas.microsoft.com/office/drawing/2014/main" id="{F5E7CFD3-C963-4609-8848-9DA7EB057BBC}"/>
+              </a:ext>
+            </a:extLst>
+          </p:cNvPr>
+          <p:cNvSpPr txBox="1"/>
+          <p:nvPr/>
+        </p:nvSpPr>
+        <p:spPr>
+          <a:xfrm>
+            <a:off x="3489930" y="2766098"/>
+            <a:ext cx="1189749" cy="276999"/>
+          </a:xfrm>
+          <a:prstGeom prst="rect">
+            <a:avLst/>
+          </a:prstGeom>
+          <a:noFill/>
+        </p:spPr>
+        <p:txBody>
+          <a:bodyPr wrap="none" rtlCol="0">
+            <a:spAutoFit/>
+          </a:bodyPr>
+          <a:lstStyle/>
+          <a:p>
+            <a:r>
+              <a:rPr lang="en-US" sz="1200" dirty="0"/>
+              <a:t>[60 Sec. passed]</a:t>
+            </a:r>
+          </a:p>
+        </p:txBody>
+      </p:sp>
+      <p:sp>
+        <p:nvSpPr>
+          <p:cNvPr id="48" name="Textfeld 47">
+            <a:extLst>
+              <a:ext uri="{FF2B5EF4-FFF2-40B4-BE49-F238E27FC236}">
+                <a16:creationId xmlns:a16="http://schemas.microsoft.com/office/drawing/2014/main" id="{A95A3427-8327-4F99-84A0-8FB529C394B2}"/>
+              </a:ext>
+            </a:extLst>
+          </p:cNvPr>
+          <p:cNvSpPr txBox="1"/>
+          <p:nvPr/>
+        </p:nvSpPr>
+        <p:spPr>
+          <a:xfrm>
+            <a:off x="1490970" y="2773525"/>
+            <a:ext cx="1448986" cy="276999"/>
+          </a:xfrm>
+          <a:prstGeom prst="rect">
+            <a:avLst/>
+          </a:prstGeom>
+          <a:noFill/>
+        </p:spPr>
+        <p:txBody>
+          <a:bodyPr wrap="none" rtlCol="0">
+            <a:spAutoFit/>
+          </a:bodyPr>
+          <a:lstStyle/>
+          <a:p>
+            <a:r>
+              <a:rPr lang="en-US" sz="1200" dirty="0"/>
+              <a:t>[RobTip == TarPoint]</a:t>
+            </a:r>
+          </a:p>
+        </p:txBody>
+      </p:sp>
+      <p:sp>
+        <p:nvSpPr>
+          <p:cNvPr id="49" name="Textfeld 48">
+            <a:extLst>
+              <a:ext uri="{FF2B5EF4-FFF2-40B4-BE49-F238E27FC236}">
+                <a16:creationId xmlns:a16="http://schemas.microsoft.com/office/drawing/2014/main" id="{E2303DDD-419A-403D-A015-932DFBD0AF61}"/>
+              </a:ext>
+            </a:extLst>
+          </p:cNvPr>
+          <p:cNvSpPr txBox="1"/>
+          <p:nvPr/>
+        </p:nvSpPr>
+        <p:spPr>
+          <a:xfrm>
+            <a:off x="3238804" y="4524680"/>
+            <a:ext cx="1640449" cy="276999"/>
+          </a:xfrm>
+          <a:prstGeom prst="rect">
+            <a:avLst/>
+          </a:prstGeom>
+          <a:noFill/>
+        </p:spPr>
+        <p:txBody>
+          <a:bodyPr wrap="none" rtlCol="0">
+            <a:spAutoFit/>
+          </a:bodyPr>
+          <a:lstStyle/>
+          <a:p>
+            <a:r>
+              <a:rPr lang="en-US" sz="1200" dirty="0"/>
+              <a:t>[UserPos == FinishPos]</a:t>
+            </a:r>
+          </a:p>
+        </p:txBody>
+      </p:sp>
+      <p:cxnSp>
+        <p:nvCxnSpPr>
+          <p:cNvPr id="51" name="Verbinder: gewinkelt 50">
+            <a:extLst>
+              <a:ext uri="{FF2B5EF4-FFF2-40B4-BE49-F238E27FC236}">
+                <a16:creationId xmlns:a16="http://schemas.microsoft.com/office/drawing/2014/main" id="{0764ED7C-0A42-468F-801E-D740EF9FCF7E}"/>
+              </a:ext>
+            </a:extLst>
+          </p:cNvPr>
+          <p:cNvCxnSpPr>
+            <a:cxnSpLocks/>
+          </p:cNvCxnSpPr>
+          <p:nvPr/>
+        </p:nvCxnSpPr>
+        <p:spPr>
+          <a:xfrm rot="10800000">
+            <a:off x="2681207" y="3117888"/>
+            <a:ext cx="1322391" cy="684618"/>
+          </a:xfrm>
+          <a:prstGeom prst="bentConnector3">
+            <a:avLst>
+              <a:gd name="adj1" fmla="val 99914"/>
+            </a:avLst>
+          </a:prstGeom>
+          <a:ln w="9525" cap="flat" cmpd="sng" algn="ctr">
+            <a:solidFill>
+              <a:schemeClr val="dk1"/>
+            </a:solidFill>
+            <a:prstDash val="dash"/>
+            <a:round/>
+            <a:headEnd type="none" w="med" len="med"/>
+            <a:tailEnd type="triangle" w="med" len="med"/>
+          </a:ln>
+        </p:spPr>
+        <p:style>
+          <a:lnRef idx="0">
+            <a:scrgbClr r="0" g="0" b="0"/>
+          </a:lnRef>
+          <a:fillRef idx="0">
+            <a:scrgbClr r="0" g="0" b="0"/>
+          </a:fillRef>
+          <a:effectRef idx="0">
+            <a:scrgbClr r="0" g="0" b="0"/>
+          </a:effectRef>
+          <a:fontRef idx="minor">
+            <a:schemeClr val="tx1"/>
+          </a:fontRef>
+        </p:style>
+      </p:cxnSp>
+      <p:cxnSp>
+        <p:nvCxnSpPr>
+          <p:cNvPr id="56" name="Verbinder: gewinkelt 55">
+            <a:extLst>
+              <a:ext uri="{FF2B5EF4-FFF2-40B4-BE49-F238E27FC236}">
+                <a16:creationId xmlns:a16="http://schemas.microsoft.com/office/drawing/2014/main" id="{649566CE-5277-4162-AFAA-5ADC9887FA3B}"/>
+              </a:ext>
+            </a:extLst>
+          </p:cNvPr>
+          <p:cNvCxnSpPr>
+            <a:cxnSpLocks/>
+            <a:stCxn id="31" idx="3"/>
+          </p:cNvCxnSpPr>
+          <p:nvPr/>
+        </p:nvCxnSpPr>
+        <p:spPr>
+          <a:xfrm flipV="1">
+            <a:off x="2486622" y="3097647"/>
+            <a:ext cx="1236330" cy="586265"/>
+          </a:xfrm>
+          <a:prstGeom prst="bentConnector3">
+            <a:avLst>
+              <a:gd name="adj1" fmla="val 99961"/>
+            </a:avLst>
+          </a:prstGeom>
+          <a:ln w="9525" cap="flat" cmpd="sng" algn="ctr">
+            <a:solidFill>
+              <a:schemeClr val="dk1"/>
+            </a:solidFill>
+            <a:prstDash val="dash"/>
+            <a:round/>
+            <a:headEnd type="none" w="med" len="med"/>
+            <a:tailEnd type="triangle" w="med" len="med"/>
+          </a:ln>
+        </p:spPr>
+        <p:style>
+          <a:lnRef idx="0">
+            <a:scrgbClr r="0" g="0" b="0"/>
+          </a:lnRef>
+          <a:fillRef idx="0">
+            <a:scrgbClr r="0" g="0" b="0"/>
+          </a:fillRef>
+          <a:effectRef idx="0">
+            <a:scrgbClr r="0" g="0" b="0"/>
+          </a:effectRef>
+          <a:fontRef idx="minor">
+            <a:schemeClr val="tx1"/>
+          </a:fontRef>
+        </p:style>
+      </p:cxnSp>
+      <p:sp>
+        <p:nvSpPr>
+          <p:cNvPr id="65" name="Textfeld 64">
+            <a:extLst>
+              <a:ext uri="{FF2B5EF4-FFF2-40B4-BE49-F238E27FC236}">
+                <a16:creationId xmlns:a16="http://schemas.microsoft.com/office/drawing/2014/main" id="{D7878F20-2381-4832-B278-7A9A20E604BF}"/>
+              </a:ext>
+            </a:extLst>
+          </p:cNvPr>
+          <p:cNvSpPr txBox="1"/>
+          <p:nvPr/>
+        </p:nvSpPr>
+        <p:spPr>
+          <a:xfrm>
+            <a:off x="2901307" y="3447665"/>
+            <a:ext cx="588623" cy="261610"/>
+          </a:xfrm>
+          <a:prstGeom prst="rect">
+            <a:avLst/>
+          </a:prstGeom>
+          <a:noFill/>
+        </p:spPr>
+        <p:txBody>
+          <a:bodyPr wrap="none" rtlCol="0">
+            <a:spAutoFit/>
+          </a:bodyPr>
+          <a:lstStyle/>
+          <a:p>
+            <a:r>
+              <a:rPr lang="en-US" sz="1100" dirty="0"/>
+              <a:t>disable</a:t>
+            </a:r>
+          </a:p>
+        </p:txBody>
+      </p:sp>
+      <p:sp>
+        <p:nvSpPr>
+          <p:cNvPr id="66" name="Ellipse 65">
+            <a:extLst>
+              <a:ext uri="{FF2B5EF4-FFF2-40B4-BE49-F238E27FC236}">
+                <a16:creationId xmlns:a16="http://schemas.microsoft.com/office/drawing/2014/main" id="{5DC56D55-CF9D-4CD4-BE0D-C5E9D7F238B5}"/>
+              </a:ext>
+            </a:extLst>
+          </p:cNvPr>
+          <p:cNvSpPr/>
+          <p:nvPr/>
+        </p:nvSpPr>
+        <p:spPr>
+          <a:xfrm>
+            <a:off x="3033786" y="5692186"/>
+            <a:ext cx="360000" cy="360000"/>
+          </a:xfrm>
+          <a:prstGeom prst="ellipse">
+            <a:avLst/>
+          </a:prstGeom>
+        </p:spPr>
+        <p:style>
+          <a:lnRef idx="2">
+            <a:schemeClr val="dk1">
+              <a:shade val="50000"/>
+            </a:schemeClr>
+          </a:lnRef>
+          <a:fillRef idx="1">
+            <a:schemeClr val="dk1"/>
+          </a:fillRef>
+          <a:effectRef idx="0">
+            <a:schemeClr val="dk1"/>
+          </a:effectRef>
+          <a:fontRef idx="minor">
+            <a:schemeClr val="lt1"/>
+          </a:fontRef>
+        </p:style>
+        <p:txBody>
+          <a:bodyPr rtlCol="0" anchor="ctr"/>
+          <a:lstStyle/>
+          <a:p>
+            <a:pPr algn="ctr"/>
+            <a:endParaRPr lang="en-US"/>
+          </a:p>
+        </p:txBody>
+      </p:sp>
+      <p:cxnSp>
+        <p:nvCxnSpPr>
+          <p:cNvPr id="67" name="Gerade Verbindung mit Pfeil 66">
+            <a:extLst>
+              <a:ext uri="{FF2B5EF4-FFF2-40B4-BE49-F238E27FC236}">
+                <a16:creationId xmlns:a16="http://schemas.microsoft.com/office/drawing/2014/main" id="{AF013116-873A-466A-A280-A6533B69C221}"/>
+              </a:ext>
+            </a:extLst>
+          </p:cNvPr>
+          <p:cNvCxnSpPr>
+            <a:cxnSpLocks/>
+            <a:stCxn id="66" idx="0"/>
+            <a:endCxn id="32" idx="2"/>
+          </p:cNvCxnSpPr>
+          <p:nvPr/>
+        </p:nvCxnSpPr>
+        <p:spPr>
+          <a:xfrm flipH="1" flipV="1">
+            <a:off x="3213023" y="5413325"/>
+            <a:ext cx="763" cy="278861"/>
+          </a:xfrm>
+          <a:prstGeom prst="straightConnector1">
+            <a:avLst/>
+          </a:prstGeom>
+          <a:ln>
+            <a:headEnd type="triangle"/>
+            <a:tailEnd type="none"/>
+          </a:ln>
+        </p:spPr>
+        <p:style>
+          <a:lnRef idx="1">
+            <a:schemeClr val="dk1"/>
+          </a:lnRef>
+          <a:fillRef idx="0">
+            <a:schemeClr val="dk1"/>
+          </a:fillRef>
+          <a:effectRef idx="0">
+            <a:schemeClr val="dk1"/>
+          </a:effectRef>
+          <a:fontRef idx="minor">
+            <a:schemeClr val="tx1"/>
+          </a:fontRef>
+        </p:style>
+      </p:cxnSp>
+    </p:spTree>
+    <p:extLst>
+      <p:ext uri="{BB962C8B-B14F-4D97-AF65-F5344CB8AC3E}">
+        <p14:creationId xmlns:p14="http://schemas.microsoft.com/office/powerpoint/2010/main" val="1648473612"/>
+      </p:ext>
+    </p:extLst>
+  </p:cSld>
+  <p:clrMapOvr>
+    <a:masterClrMapping/>
+  </p:clrMapOvr>
+</p:sld>
+</file>
+
+<file path=ppt/slides/slide9.xml><?xml version="1.0" encoding="utf-8"?>
+<p:sld xmlns:a="http://schemas.openxmlformats.org/drawingml/2006/main" xmlns:r="http://schemas.openxmlformats.org/officeDocument/2006/relationships" xmlns:p="http://schemas.openxmlformats.org/presentationml/2006/main">
+  <p:cSld>
+    <p:spTree>
+      <p:nvGrpSpPr>
+        <p:cNvPr id="1" name=""/>
+        <p:cNvGrpSpPr/>
+        <p:nvPr/>
+      </p:nvGrpSpPr>
+      <p:grpSpPr>
+        <a:xfrm>
+          <a:off x="0" y="0"/>
+          <a:ext cx="0" cy="0"/>
+          <a:chOff x="0" y="0"/>
+          <a:chExt cx="0" cy="0"/>
+        </a:xfrm>
+      </p:grpSpPr>
+      <p:sp>
+        <p:nvSpPr>
+          <p:cNvPr id="4" name="Rechteck: abgerundete Ecken 3">
+            <a:extLst>
+              <a:ext uri="{FF2B5EF4-FFF2-40B4-BE49-F238E27FC236}">
+                <a16:creationId xmlns:a16="http://schemas.microsoft.com/office/drawing/2014/main" id="{F6B701D4-1B4D-4741-A69C-E4BF8187B28A}"/>
+              </a:ext>
+            </a:extLst>
+          </p:cNvPr>
+          <p:cNvSpPr/>
+          <p:nvPr/>
+        </p:nvSpPr>
+        <p:spPr>
+          <a:xfrm>
+            <a:off x="3035548" y="917122"/>
+            <a:ext cx="3781421" cy="3430672"/>
+          </a:xfrm>
+          <a:prstGeom prst="roundRect">
+            <a:avLst>
+              <a:gd name="adj" fmla="val 2329"/>
+            </a:avLst>
+          </a:prstGeom>
+          <a:solidFill>
+            <a:schemeClr val="bg1">
+              <a:lumMod val="95000"/>
+            </a:schemeClr>
+          </a:solidFill>
+          <a:ln>
+            <a:solidFill>
+              <a:schemeClr val="accent1">
+                <a:lumMod val="50000"/>
+              </a:schemeClr>
+            </a:solidFill>
+          </a:ln>
+        </p:spPr>
+        <p:style>
+          <a:lnRef idx="2">
+            <a:schemeClr val="accent6"/>
+          </a:lnRef>
+          <a:fillRef idx="1">
+            <a:schemeClr val="lt1"/>
+          </a:fillRef>
+          <a:effectRef idx="0">
+            <a:schemeClr val="accent6"/>
+          </a:effectRef>
+          <a:fontRef idx="minor">
+            <a:schemeClr val="dk1"/>
+          </a:fontRef>
+        </p:style>
+        <p:txBody>
+          <a:bodyPr rtlCol="0" anchor="ctr"/>
+          <a:lstStyle/>
+          <a:p>
+            <a:pPr algn="ctr"/>
+            <a:endParaRPr lang="en-GB" dirty="0"/>
+          </a:p>
+        </p:txBody>
+      </p:sp>
+      <p:sp>
+        <p:nvSpPr>
+          <p:cNvPr id="5" name="Textfeld 4">
+            <a:extLst>
+              <a:ext uri="{FF2B5EF4-FFF2-40B4-BE49-F238E27FC236}">
+                <a16:creationId xmlns:a16="http://schemas.microsoft.com/office/drawing/2014/main" id="{AF49B92A-6D86-4C42-933A-26EFA7D5DEE7}"/>
+              </a:ext>
+            </a:extLst>
+          </p:cNvPr>
+          <p:cNvSpPr txBox="1"/>
+          <p:nvPr/>
+        </p:nvSpPr>
+        <p:spPr>
+          <a:xfrm>
+            <a:off x="3035548" y="921999"/>
+            <a:ext cx="1092200" cy="369332"/>
+          </a:xfrm>
+          <a:prstGeom prst="rect">
+            <a:avLst/>
+          </a:prstGeom>
+          <a:noFill/>
+        </p:spPr>
+        <p:txBody>
+          <a:bodyPr wrap="square" rtlCol="0">
+            <a:spAutoFit/>
+          </a:bodyPr>
+          <a:lstStyle/>
+          <a:p>
+            <a:r>
+              <a:rPr lang="de-DE"/>
+              <a:t>PARRHI</a:t>
+            </a:r>
+            <a:endParaRPr lang="en-GB"/>
+          </a:p>
+        </p:txBody>
+      </p:sp>
+      <p:sp>
+        <p:nvSpPr>
+          <p:cNvPr id="6" name="Rechteck: abgerundete Ecken 5">
+            <a:extLst>
+              <a:ext uri="{FF2B5EF4-FFF2-40B4-BE49-F238E27FC236}">
+                <a16:creationId xmlns:a16="http://schemas.microsoft.com/office/drawing/2014/main" id="{2405DD24-B42F-4063-B12B-534D58AD8C69}"/>
+              </a:ext>
+            </a:extLst>
+          </p:cNvPr>
+          <p:cNvSpPr/>
+          <p:nvPr/>
+        </p:nvSpPr>
+        <p:spPr>
+          <a:xfrm>
+            <a:off x="8361332" y="5258216"/>
+            <a:ext cx="3500069" cy="774700"/>
+          </a:xfrm>
+          <a:prstGeom prst="roundRect">
+            <a:avLst>
+              <a:gd name="adj" fmla="val 2329"/>
+            </a:avLst>
+          </a:prstGeom>
+          <a:ln>
+            <a:solidFill>
+              <a:schemeClr val="accent1">
+                <a:lumMod val="50000"/>
+              </a:schemeClr>
+            </a:solidFill>
+          </a:ln>
+        </p:spPr>
+        <p:style>
+          <a:lnRef idx="2">
+            <a:schemeClr val="accent6"/>
+          </a:lnRef>
+          <a:fillRef idx="1">
+            <a:schemeClr val="lt1"/>
+          </a:fillRef>
+          <a:effectRef idx="0">
+            <a:schemeClr val="accent6"/>
+          </a:effectRef>
+          <a:fontRef idx="minor">
+            <a:schemeClr val="dk1"/>
+          </a:fontRef>
+        </p:style>
+        <p:txBody>
+          <a:bodyPr rtlCol="0" anchor="ctr"/>
+          <a:lstStyle/>
+          <a:p>
+            <a:pPr algn="ctr"/>
+            <a:r>
+              <a:rPr lang="de-DE" dirty="0"/>
+              <a:t>AR - World</a:t>
+            </a:r>
+            <a:endParaRPr lang="en-GB" dirty="0"/>
+          </a:p>
+        </p:txBody>
+      </p:sp>
+      <p:sp>
+        <p:nvSpPr>
+          <p:cNvPr id="7" name="Rechteck: abgerundete Ecken 6">
+            <a:extLst>
+              <a:ext uri="{FF2B5EF4-FFF2-40B4-BE49-F238E27FC236}">
+                <a16:creationId xmlns:a16="http://schemas.microsoft.com/office/drawing/2014/main" id="{EFCF12A0-88B6-46D0-B514-B636FE6F0E18}"/>
+              </a:ext>
+            </a:extLst>
+          </p:cNvPr>
+          <p:cNvSpPr/>
+          <p:nvPr/>
+        </p:nvSpPr>
+        <p:spPr>
+          <a:xfrm>
+            <a:off x="8361332" y="2123574"/>
+            <a:ext cx="3500069" cy="2769458"/>
+          </a:xfrm>
+          <a:prstGeom prst="roundRect">
+            <a:avLst>
+              <a:gd name="adj" fmla="val 2329"/>
+            </a:avLst>
+          </a:prstGeom>
+          <a:ln>
+            <a:solidFill>
+              <a:schemeClr val="accent1">
+                <a:lumMod val="50000"/>
+              </a:schemeClr>
+            </a:solidFill>
+          </a:ln>
+        </p:spPr>
+        <p:style>
+          <a:lnRef idx="2">
+            <a:schemeClr val="accent6"/>
+          </a:lnRef>
+          <a:fillRef idx="1">
+            <a:schemeClr val="lt1"/>
+          </a:fillRef>
+          <a:effectRef idx="0">
+            <a:schemeClr val="accent6"/>
+          </a:effectRef>
+          <a:fontRef idx="minor">
+            <a:schemeClr val="dk1"/>
+          </a:fontRef>
+        </p:style>
+        <p:txBody>
+          <a:bodyPr rtlCol="0" anchor="t"/>
+          <a:lstStyle/>
+          <a:p>
+            <a:r>
+              <a:rPr lang="de-DE" dirty="0"/>
+              <a:t>Real World</a:t>
+            </a:r>
+            <a:endParaRPr lang="en-GB" dirty="0"/>
+          </a:p>
+        </p:txBody>
+      </p:sp>
+      <p:sp>
+        <p:nvSpPr>
+          <p:cNvPr id="8" name="Rechteck: abgerundete Ecken 7">
+            <a:extLst>
+              <a:ext uri="{FF2B5EF4-FFF2-40B4-BE49-F238E27FC236}">
+                <a16:creationId xmlns:a16="http://schemas.microsoft.com/office/drawing/2014/main" id="{0BAB4AEA-F67F-4DC7-A436-5BA0663E95BD}"/>
+              </a:ext>
+            </a:extLst>
+          </p:cNvPr>
+          <p:cNvSpPr/>
+          <p:nvPr/>
+        </p:nvSpPr>
+        <p:spPr>
+          <a:xfrm>
+            <a:off x="3558981" y="1563499"/>
+            <a:ext cx="1794125" cy="560513"/>
+          </a:xfrm>
+          <a:prstGeom prst="roundRect">
+            <a:avLst>
+              <a:gd name="adj" fmla="val 2329"/>
+            </a:avLst>
+          </a:prstGeom>
+          <a:ln>
+            <a:solidFill>
+              <a:schemeClr val="accent1">
+                <a:lumMod val="50000"/>
+              </a:schemeClr>
+            </a:solidFill>
+          </a:ln>
+        </p:spPr>
+        <p:style>
+          <a:lnRef idx="2">
+            <a:schemeClr val="accent6"/>
+          </a:lnRef>
+          <a:fillRef idx="1">
+            <a:schemeClr val="lt1"/>
+          </a:fillRef>
+          <a:effectRef idx="0">
+            <a:schemeClr val="accent6"/>
+          </a:effectRef>
+          <a:fontRef idx="minor">
+            <a:schemeClr val="dk1"/>
+          </a:fontRef>
+        </p:style>
+        <p:txBody>
+          <a:bodyPr rtlCol="0" anchor="ctr"/>
+          <a:lstStyle/>
+          <a:p>
+            <a:pPr algn="ctr"/>
+            <a:r>
+              <a:rPr lang="de-DE" dirty="0"/>
+              <a:t>Real </a:t>
+            </a:r>
+            <a:r>
+              <a:rPr lang="en-GB" dirty="0"/>
+              <a:t>World</a:t>
+            </a:r>
+            <a:r>
+              <a:rPr lang="de-DE" dirty="0"/>
+              <a:t> Model</a:t>
+            </a:r>
+            <a:endParaRPr lang="en-GB" dirty="0"/>
+          </a:p>
+        </p:txBody>
+      </p:sp>
+      <p:cxnSp>
+        <p:nvCxnSpPr>
+          <p:cNvPr id="9" name="Gerade Verbindung mit Pfeil 8">
+            <a:extLst>
+              <a:ext uri="{FF2B5EF4-FFF2-40B4-BE49-F238E27FC236}">
+                <a16:creationId xmlns:a16="http://schemas.microsoft.com/office/drawing/2014/main" id="{B1E54AF9-691A-4437-81EF-369064905B41}"/>
+              </a:ext>
+            </a:extLst>
+          </p:cNvPr>
+          <p:cNvCxnSpPr>
+            <a:cxnSpLocks/>
+            <a:stCxn id="8" idx="2"/>
+            <a:endCxn id="10" idx="0"/>
+          </p:cNvCxnSpPr>
+          <p:nvPr/>
+        </p:nvCxnSpPr>
+        <p:spPr>
+          <a:xfrm flipH="1">
+            <a:off x="4456043" y="2124012"/>
+            <a:ext cx="1" cy="360013"/>
+          </a:xfrm>
+          <a:prstGeom prst="straightConnector1">
+            <a:avLst/>
+          </a:prstGeom>
+          <a:ln>
+            <a:solidFill>
+              <a:schemeClr val="tx1"/>
+            </a:solidFill>
+            <a:tailEnd type="triangle"/>
+          </a:ln>
+        </p:spPr>
+        <p:style>
+          <a:lnRef idx="1">
+            <a:schemeClr val="accent1"/>
+          </a:lnRef>
+          <a:fillRef idx="0">
+            <a:schemeClr val="accent1"/>
+          </a:fillRef>
+          <a:effectRef idx="0">
+            <a:schemeClr val="accent1"/>
+          </a:effectRef>
+          <a:fontRef idx="minor">
+            <a:schemeClr val="tx1"/>
+          </a:fontRef>
+        </p:style>
+      </p:cxnSp>
+      <p:sp>
+        <p:nvSpPr>
+          <p:cNvPr id="10" name="Rechteck: abgerundete Ecken 9">
+            <a:extLst>
+              <a:ext uri="{FF2B5EF4-FFF2-40B4-BE49-F238E27FC236}">
+                <a16:creationId xmlns:a16="http://schemas.microsoft.com/office/drawing/2014/main" id="{BD272389-BC2D-4B67-87A1-53A20EE78E32}"/>
+              </a:ext>
+            </a:extLst>
+          </p:cNvPr>
+          <p:cNvSpPr/>
+          <p:nvPr/>
+        </p:nvSpPr>
+        <p:spPr>
+          <a:xfrm>
+            <a:off x="3558980" y="2484025"/>
+            <a:ext cx="1794125" cy="560513"/>
+          </a:xfrm>
+          <a:prstGeom prst="roundRect">
+            <a:avLst>
+              <a:gd name="adj" fmla="val 2329"/>
+            </a:avLst>
+          </a:prstGeom>
+          <a:ln>
+            <a:solidFill>
+              <a:schemeClr val="accent1">
+                <a:lumMod val="50000"/>
+              </a:schemeClr>
+            </a:solidFill>
+          </a:ln>
+        </p:spPr>
+        <p:style>
+          <a:lnRef idx="2">
+            <a:schemeClr val="accent6"/>
+          </a:lnRef>
+          <a:fillRef idx="1">
+            <a:schemeClr val="lt1"/>
+          </a:fillRef>
+          <a:effectRef idx="0">
+            <a:schemeClr val="accent6"/>
+          </a:effectRef>
+          <a:fontRef idx="minor">
+            <a:schemeClr val="dk1"/>
+          </a:fontRef>
+        </p:style>
+        <p:txBody>
+          <a:bodyPr rtlCol="0" anchor="ctr"/>
+          <a:lstStyle/>
+          <a:p>
+            <a:pPr algn="ctr"/>
+            <a:r>
+              <a:rPr lang="en-US" dirty="0"/>
+              <a:t>Parametrised Program</a:t>
+            </a:r>
+          </a:p>
+        </p:txBody>
+      </p:sp>
+      <p:sp>
+        <p:nvSpPr>
+          <p:cNvPr id="11" name="Rechteck: abgerundete Ecken 10">
+            <a:extLst>
+              <a:ext uri="{FF2B5EF4-FFF2-40B4-BE49-F238E27FC236}">
+                <a16:creationId xmlns:a16="http://schemas.microsoft.com/office/drawing/2014/main" id="{3DCD6E7A-B5D2-405F-BA83-825CBE5DB981}"/>
+              </a:ext>
+            </a:extLst>
+          </p:cNvPr>
+          <p:cNvSpPr/>
+          <p:nvPr/>
+        </p:nvSpPr>
+        <p:spPr>
+          <a:xfrm>
+            <a:off x="5976359" y="1600529"/>
+            <a:ext cx="1681219" cy="486452"/>
+          </a:xfrm>
+          <a:prstGeom prst="roundRect">
+            <a:avLst>
+              <a:gd name="adj" fmla="val 2329"/>
+            </a:avLst>
+          </a:prstGeom>
+          <a:ln>
+            <a:solidFill>
+              <a:schemeClr val="accent1">
+                <a:lumMod val="50000"/>
+              </a:schemeClr>
+            </a:solidFill>
+          </a:ln>
+        </p:spPr>
+        <p:style>
+          <a:lnRef idx="2">
+            <a:schemeClr val="accent6"/>
+          </a:lnRef>
+          <a:fillRef idx="1">
+            <a:schemeClr val="lt1"/>
+          </a:fillRef>
+          <a:effectRef idx="0">
+            <a:schemeClr val="accent6"/>
+          </a:effectRef>
+          <a:fontRef idx="minor">
+            <a:schemeClr val="dk1"/>
+          </a:fontRef>
+        </p:style>
+        <p:txBody>
+          <a:bodyPr rtlCol="0" anchor="ctr"/>
+          <a:lstStyle/>
+          <a:p>
+            <a:pPr algn="ctr"/>
+            <a:r>
+              <a:rPr lang="de-DE" dirty="0"/>
+              <a:t>Input Module</a:t>
+            </a:r>
+            <a:endParaRPr lang="en-GB" dirty="0"/>
+          </a:p>
+        </p:txBody>
+      </p:sp>
+      <p:cxnSp>
+        <p:nvCxnSpPr>
+          <p:cNvPr id="12" name="Gerade Verbindung mit Pfeil 11">
+            <a:extLst>
+              <a:ext uri="{FF2B5EF4-FFF2-40B4-BE49-F238E27FC236}">
+                <a16:creationId xmlns:a16="http://schemas.microsoft.com/office/drawing/2014/main" id="{180C3BA1-AE18-4450-8033-8153091CE421}"/>
+              </a:ext>
+            </a:extLst>
+          </p:cNvPr>
+          <p:cNvCxnSpPr>
+            <a:cxnSpLocks/>
+            <a:stCxn id="11" idx="1"/>
+            <a:endCxn id="8" idx="3"/>
+          </p:cNvCxnSpPr>
+          <p:nvPr/>
+        </p:nvCxnSpPr>
+        <p:spPr>
+          <a:xfrm flipH="1">
+            <a:off x="5353106" y="1843755"/>
+            <a:ext cx="623253" cy="1"/>
+          </a:xfrm>
+          <a:prstGeom prst="straightConnector1">
+            <a:avLst/>
+          </a:prstGeom>
+          <a:ln>
+            <a:solidFill>
+              <a:schemeClr val="tx1"/>
+            </a:solidFill>
+            <a:tailEnd type="triangle"/>
+          </a:ln>
+        </p:spPr>
+        <p:style>
+          <a:lnRef idx="1">
+            <a:schemeClr val="accent1"/>
+          </a:lnRef>
+          <a:fillRef idx="0">
+            <a:schemeClr val="accent1"/>
+          </a:fillRef>
+          <a:effectRef idx="0">
+            <a:schemeClr val="accent1"/>
+          </a:effectRef>
+          <a:fontRef idx="minor">
+            <a:schemeClr val="tx1"/>
+          </a:fontRef>
+        </p:style>
+      </p:cxnSp>
+      <p:sp>
+        <p:nvSpPr>
+          <p:cNvPr id="13" name="Rechteck: abgerundete Ecken 12">
+            <a:extLst>
+              <a:ext uri="{FF2B5EF4-FFF2-40B4-BE49-F238E27FC236}">
+                <a16:creationId xmlns:a16="http://schemas.microsoft.com/office/drawing/2014/main" id="{604D0802-A719-4290-9CC4-EF0CDE629D11}"/>
+              </a:ext>
+            </a:extLst>
+          </p:cNvPr>
+          <p:cNvSpPr/>
+          <p:nvPr/>
+        </p:nvSpPr>
+        <p:spPr>
+          <a:xfrm>
+            <a:off x="3558981" y="3404552"/>
+            <a:ext cx="1794125" cy="560513"/>
+          </a:xfrm>
+          <a:prstGeom prst="roundRect">
+            <a:avLst>
+              <a:gd name="adj" fmla="val 2329"/>
+            </a:avLst>
+          </a:prstGeom>
+          <a:ln>
+            <a:solidFill>
+              <a:schemeClr val="accent1">
+                <a:lumMod val="50000"/>
+              </a:schemeClr>
+            </a:solidFill>
+          </a:ln>
+        </p:spPr>
+        <p:style>
+          <a:lnRef idx="2">
+            <a:schemeClr val="accent6"/>
+          </a:lnRef>
+          <a:fillRef idx="1">
+            <a:schemeClr val="lt1"/>
+          </a:fillRef>
+          <a:effectRef idx="0">
+            <a:schemeClr val="accent6"/>
+          </a:effectRef>
+          <a:fontRef idx="minor">
+            <a:schemeClr val="dk1"/>
+          </a:fontRef>
+        </p:style>
+        <p:txBody>
+          <a:bodyPr rtlCol="0" anchor="ctr"/>
+          <a:lstStyle/>
+          <a:p>
+            <a:pPr algn="ctr"/>
+            <a:r>
+              <a:rPr lang="de-DE" dirty="0"/>
+              <a:t>Core Routine</a:t>
+            </a:r>
+            <a:endParaRPr lang="en-GB" dirty="0"/>
+          </a:p>
+        </p:txBody>
+      </p:sp>
+      <p:cxnSp>
+        <p:nvCxnSpPr>
+          <p:cNvPr id="14" name="Gerade Verbindung mit Pfeil 13">
+            <a:extLst>
+              <a:ext uri="{FF2B5EF4-FFF2-40B4-BE49-F238E27FC236}">
+                <a16:creationId xmlns:a16="http://schemas.microsoft.com/office/drawing/2014/main" id="{BF9404FC-93B0-4157-968C-171E28631BC0}"/>
+              </a:ext>
+            </a:extLst>
+          </p:cNvPr>
+          <p:cNvCxnSpPr>
+            <a:cxnSpLocks/>
+            <a:stCxn id="10" idx="2"/>
+            <a:endCxn id="13" idx="0"/>
+          </p:cNvCxnSpPr>
+          <p:nvPr/>
+        </p:nvCxnSpPr>
+        <p:spPr>
+          <a:xfrm>
+            <a:off x="4456043" y="3044538"/>
+            <a:ext cx="1" cy="360014"/>
+          </a:xfrm>
+          <a:prstGeom prst="straightConnector1">
+            <a:avLst/>
+          </a:prstGeom>
+          <a:ln>
+            <a:solidFill>
+              <a:schemeClr val="tx1"/>
+            </a:solidFill>
+            <a:tailEnd type="triangle"/>
+          </a:ln>
+        </p:spPr>
+        <p:style>
+          <a:lnRef idx="1">
+            <a:schemeClr val="accent1"/>
+          </a:lnRef>
+          <a:fillRef idx="0">
+            <a:schemeClr val="accent1"/>
+          </a:fillRef>
+          <a:effectRef idx="0">
+            <a:schemeClr val="accent1"/>
+          </a:effectRef>
+          <a:fontRef idx="minor">
+            <a:schemeClr val="tx1"/>
+          </a:fontRef>
+        </p:style>
+      </p:cxnSp>
+      <p:sp>
+        <p:nvSpPr>
+          <p:cNvPr id="15" name="Rechteck: abgerundete Ecken 14">
+            <a:extLst>
+              <a:ext uri="{FF2B5EF4-FFF2-40B4-BE49-F238E27FC236}">
+                <a16:creationId xmlns:a16="http://schemas.microsoft.com/office/drawing/2014/main" id="{A17B9F83-BF3E-42F5-A2D0-B94295ED8B57}"/>
+              </a:ext>
+            </a:extLst>
+          </p:cNvPr>
+          <p:cNvSpPr/>
+          <p:nvPr/>
+        </p:nvSpPr>
+        <p:spPr>
+          <a:xfrm>
+            <a:off x="5976359" y="3440245"/>
+            <a:ext cx="1681219" cy="486452"/>
+          </a:xfrm>
+          <a:prstGeom prst="roundRect">
+            <a:avLst>
+              <a:gd name="adj" fmla="val 2329"/>
+            </a:avLst>
+          </a:prstGeom>
+          <a:ln>
+            <a:solidFill>
+              <a:schemeClr val="accent1">
+                <a:lumMod val="50000"/>
+              </a:schemeClr>
+            </a:solidFill>
+          </a:ln>
+        </p:spPr>
+        <p:style>
+          <a:lnRef idx="2">
+            <a:schemeClr val="accent6"/>
+          </a:lnRef>
+          <a:fillRef idx="1">
+            <a:schemeClr val="lt1"/>
+          </a:fillRef>
+          <a:effectRef idx="0">
+            <a:schemeClr val="accent6"/>
+          </a:effectRef>
+          <a:fontRef idx="minor">
+            <a:schemeClr val="dk1"/>
+          </a:fontRef>
+        </p:style>
+        <p:txBody>
+          <a:bodyPr rtlCol="0" anchor="ctr"/>
+          <a:lstStyle/>
+          <a:p>
+            <a:pPr algn="ctr"/>
+            <a:r>
+              <a:rPr lang="de-DE" dirty="0"/>
+              <a:t>Output Module</a:t>
+            </a:r>
+            <a:endParaRPr lang="en-GB" dirty="0"/>
+          </a:p>
+        </p:txBody>
+      </p:sp>
+      <p:cxnSp>
+        <p:nvCxnSpPr>
+          <p:cNvPr id="16" name="Gerade Verbindung mit Pfeil 15">
+            <a:extLst>
+              <a:ext uri="{FF2B5EF4-FFF2-40B4-BE49-F238E27FC236}">
+                <a16:creationId xmlns:a16="http://schemas.microsoft.com/office/drawing/2014/main" id="{554559C4-CA67-4CAE-8FD9-7A8FE01BA4D7}"/>
+              </a:ext>
+            </a:extLst>
+          </p:cNvPr>
+          <p:cNvCxnSpPr>
+            <a:cxnSpLocks/>
+            <a:stCxn id="13" idx="3"/>
+            <a:endCxn id="15" idx="1"/>
+          </p:cNvCxnSpPr>
+          <p:nvPr/>
+        </p:nvCxnSpPr>
+        <p:spPr>
+          <a:xfrm flipV="1">
+            <a:off x="5353106" y="3683471"/>
+            <a:ext cx="623253" cy="1338"/>
+          </a:xfrm>
+          <a:prstGeom prst="straightConnector1">
+            <a:avLst/>
+          </a:prstGeom>
+          <a:ln>
+            <a:solidFill>
+              <a:schemeClr val="tx1"/>
+            </a:solidFill>
+            <a:tailEnd type="triangle"/>
+          </a:ln>
+        </p:spPr>
+        <p:style>
+          <a:lnRef idx="1">
+            <a:schemeClr val="accent1"/>
+          </a:lnRef>
+          <a:fillRef idx="0">
+            <a:schemeClr val="accent1"/>
+          </a:fillRef>
+          <a:effectRef idx="0">
+            <a:schemeClr val="accent1"/>
+          </a:effectRef>
+          <a:fontRef idx="minor">
+            <a:schemeClr val="tx1"/>
+          </a:fontRef>
+        </p:style>
+      </p:cxnSp>
+      <p:sp>
+        <p:nvSpPr>
+          <p:cNvPr id="17" name="Rechteck 16">
+            <a:extLst>
+              <a:ext uri="{FF2B5EF4-FFF2-40B4-BE49-F238E27FC236}">
+                <a16:creationId xmlns:a16="http://schemas.microsoft.com/office/drawing/2014/main" id="{886C3453-4AE4-4C37-BCB1-783BD3302BD0}"/>
+              </a:ext>
+            </a:extLst>
+          </p:cNvPr>
+          <p:cNvSpPr/>
+          <p:nvPr/>
+        </p:nvSpPr>
+        <p:spPr>
+          <a:xfrm>
+            <a:off x="3043115" y="3384288"/>
+            <a:ext cx="264102" cy="245166"/>
+          </a:xfrm>
+          <a:prstGeom prst="rect">
+            <a:avLst/>
+          </a:prstGeom>
+          <a:solidFill>
+            <a:schemeClr val="bg1">
+              <a:lumMod val="95000"/>
+            </a:schemeClr>
+          </a:solidFill>
+          <a:ln>
+            <a:noFill/>
+          </a:ln>
+        </p:spPr>
+        <p:style>
+          <a:lnRef idx="2">
+            <a:schemeClr val="accent6"/>
+          </a:lnRef>
+          <a:fillRef idx="1">
+            <a:schemeClr val="lt1"/>
+          </a:fillRef>
+          <a:effectRef idx="0">
+            <a:schemeClr val="accent6"/>
+          </a:effectRef>
+          <a:fontRef idx="minor">
+            <a:schemeClr val="dk1"/>
+          </a:fontRef>
+        </p:style>
+        <p:txBody>
+          <a:bodyPr rtlCol="0" anchor="ctr"/>
+          <a:lstStyle/>
+          <a:p>
+            <a:pPr algn="ctr"/>
+            <a:endParaRPr lang="en-GB"/>
+          </a:p>
+        </p:txBody>
+      </p:sp>
+      <p:sp>
+        <p:nvSpPr>
+          <p:cNvPr id="18" name="Ellipse 17">
+            <a:extLst>
+              <a:ext uri="{FF2B5EF4-FFF2-40B4-BE49-F238E27FC236}">
+                <a16:creationId xmlns:a16="http://schemas.microsoft.com/office/drawing/2014/main" id="{91715291-16BB-4DFB-BCB7-9A418E542C4F}"/>
+              </a:ext>
+            </a:extLst>
+          </p:cNvPr>
+          <p:cNvSpPr/>
+          <p:nvPr/>
+        </p:nvSpPr>
+        <p:spPr>
+          <a:xfrm>
+            <a:off x="3380568" y="1394593"/>
+            <a:ext cx="348008" cy="342604"/>
+          </a:xfrm>
+          <a:prstGeom prst="ellipse">
+            <a:avLst/>
+          </a:prstGeom>
+          <a:ln>
+            <a:solidFill>
+              <a:schemeClr val="tx1"/>
+            </a:solidFill>
+          </a:ln>
+        </p:spPr>
+        <p:style>
+          <a:lnRef idx="2">
+            <a:schemeClr val="accent6"/>
+          </a:lnRef>
+          <a:fillRef idx="1">
+            <a:schemeClr val="lt1"/>
+          </a:fillRef>
+          <a:effectRef idx="0">
+            <a:schemeClr val="accent6"/>
+          </a:effectRef>
+          <a:fontRef idx="minor">
+            <a:schemeClr val="dk1"/>
+          </a:fontRef>
+        </p:style>
+        <p:txBody>
+          <a:bodyPr rtlCol="0" anchor="ctr"/>
+          <a:lstStyle/>
+          <a:p>
+            <a:pPr algn="ctr"/>
+            <a:r>
+              <a:rPr lang="de-DE" dirty="0"/>
+              <a:t>1</a:t>
+            </a:r>
+            <a:endParaRPr lang="en-GB" dirty="0"/>
+          </a:p>
+        </p:txBody>
+      </p:sp>
+      <p:sp>
+        <p:nvSpPr>
+          <p:cNvPr id="19" name="Ellipse 18">
+            <a:extLst>
+              <a:ext uri="{FF2B5EF4-FFF2-40B4-BE49-F238E27FC236}">
+                <a16:creationId xmlns:a16="http://schemas.microsoft.com/office/drawing/2014/main" id="{93AF96F6-3D9C-484E-BA9C-D58AAFA04264}"/>
+              </a:ext>
+            </a:extLst>
+          </p:cNvPr>
+          <p:cNvSpPr/>
+          <p:nvPr/>
+        </p:nvSpPr>
+        <p:spPr>
+          <a:xfrm>
+            <a:off x="3374359" y="2592725"/>
+            <a:ext cx="348008" cy="342604"/>
+          </a:xfrm>
+          <a:prstGeom prst="ellipse">
+            <a:avLst/>
+          </a:prstGeom>
+          <a:ln>
+            <a:solidFill>
+              <a:schemeClr val="tx1"/>
+            </a:solidFill>
+          </a:ln>
+        </p:spPr>
+        <p:style>
+          <a:lnRef idx="2">
+            <a:schemeClr val="accent6"/>
+          </a:lnRef>
+          <a:fillRef idx="1">
+            <a:schemeClr val="lt1"/>
+          </a:fillRef>
+          <a:effectRef idx="0">
+            <a:schemeClr val="accent6"/>
+          </a:effectRef>
+          <a:fontRef idx="minor">
+            <a:schemeClr val="dk1"/>
+          </a:fontRef>
+        </p:style>
+        <p:txBody>
+          <a:bodyPr rtlCol="0" anchor="ctr"/>
+          <a:lstStyle/>
+          <a:p>
+            <a:pPr algn="ctr"/>
+            <a:r>
+              <a:rPr lang="de-DE" dirty="0"/>
+              <a:t>2</a:t>
+            </a:r>
+            <a:endParaRPr lang="en-GB" dirty="0"/>
+          </a:p>
+        </p:txBody>
+      </p:sp>
+      <p:sp>
+        <p:nvSpPr>
+          <p:cNvPr id="20" name="Ellipse 19">
+            <a:extLst>
+              <a:ext uri="{FF2B5EF4-FFF2-40B4-BE49-F238E27FC236}">
+                <a16:creationId xmlns:a16="http://schemas.microsoft.com/office/drawing/2014/main" id="{4FF71B1C-3DE3-4F65-93BB-DB216CF69B7E}"/>
+              </a:ext>
+            </a:extLst>
+          </p:cNvPr>
+          <p:cNvSpPr/>
+          <p:nvPr/>
+        </p:nvSpPr>
+        <p:spPr>
+          <a:xfrm>
+            <a:off x="3379259" y="3789556"/>
+            <a:ext cx="348008" cy="342604"/>
+          </a:xfrm>
+          <a:prstGeom prst="ellipse">
+            <a:avLst/>
+          </a:prstGeom>
+          <a:ln>
+            <a:solidFill>
+              <a:schemeClr val="tx1"/>
+            </a:solidFill>
+          </a:ln>
+        </p:spPr>
+        <p:style>
+          <a:lnRef idx="2">
+            <a:schemeClr val="accent6"/>
+          </a:lnRef>
+          <a:fillRef idx="1">
+            <a:schemeClr val="lt1"/>
+          </a:fillRef>
+          <a:effectRef idx="0">
+            <a:schemeClr val="accent6"/>
+          </a:effectRef>
+          <a:fontRef idx="minor">
+            <a:schemeClr val="dk1"/>
+          </a:fontRef>
+        </p:style>
+        <p:txBody>
+          <a:bodyPr rtlCol="0" anchor="ctr"/>
+          <a:lstStyle/>
+          <a:p>
+            <a:pPr algn="ctr"/>
+            <a:r>
+              <a:rPr lang="de-DE" dirty="0"/>
+              <a:t>3</a:t>
+            </a:r>
+            <a:endParaRPr lang="en-GB" dirty="0"/>
+          </a:p>
+        </p:txBody>
+      </p:sp>
+      <p:sp>
+        <p:nvSpPr>
+          <p:cNvPr id="21" name="Ellipse 20">
+            <a:extLst>
+              <a:ext uri="{FF2B5EF4-FFF2-40B4-BE49-F238E27FC236}">
+                <a16:creationId xmlns:a16="http://schemas.microsoft.com/office/drawing/2014/main" id="{5F26707D-E47F-4037-845E-34E25205654A}"/>
+              </a:ext>
+            </a:extLst>
+          </p:cNvPr>
+          <p:cNvSpPr/>
+          <p:nvPr/>
+        </p:nvSpPr>
+        <p:spPr>
+          <a:xfrm>
+            <a:off x="5802355" y="1435620"/>
+            <a:ext cx="348008" cy="342604"/>
+          </a:xfrm>
+          <a:prstGeom prst="ellipse">
+            <a:avLst/>
+          </a:prstGeom>
+          <a:ln>
+            <a:solidFill>
+              <a:schemeClr val="tx1"/>
+            </a:solidFill>
+          </a:ln>
+        </p:spPr>
+        <p:style>
+          <a:lnRef idx="2">
+            <a:schemeClr val="accent6"/>
+          </a:lnRef>
+          <a:fillRef idx="1">
+            <a:schemeClr val="lt1"/>
+          </a:fillRef>
+          <a:effectRef idx="0">
+            <a:schemeClr val="accent6"/>
+          </a:effectRef>
+          <a:fontRef idx="minor">
+            <a:schemeClr val="dk1"/>
+          </a:fontRef>
+        </p:style>
+        <p:txBody>
+          <a:bodyPr rtlCol="0" anchor="ctr"/>
+          <a:lstStyle/>
+          <a:p>
+            <a:pPr algn="ctr"/>
+            <a:r>
+              <a:rPr lang="de-DE" dirty="0"/>
+              <a:t>0</a:t>
+            </a:r>
+            <a:endParaRPr lang="en-GB" dirty="0"/>
+          </a:p>
+        </p:txBody>
+      </p:sp>
+      <p:sp>
+        <p:nvSpPr>
+          <p:cNvPr id="22" name="Ellipse 21">
+            <a:extLst>
+              <a:ext uri="{FF2B5EF4-FFF2-40B4-BE49-F238E27FC236}">
+                <a16:creationId xmlns:a16="http://schemas.microsoft.com/office/drawing/2014/main" id="{7CE596EA-EBB9-4043-B885-774438920A54}"/>
+              </a:ext>
+            </a:extLst>
+          </p:cNvPr>
+          <p:cNvSpPr/>
+          <p:nvPr/>
+        </p:nvSpPr>
+        <p:spPr>
+          <a:xfrm>
+            <a:off x="5802355" y="3755394"/>
+            <a:ext cx="348008" cy="342604"/>
+          </a:xfrm>
+          <a:prstGeom prst="ellipse">
+            <a:avLst/>
+          </a:prstGeom>
+          <a:ln>
+            <a:solidFill>
+              <a:schemeClr val="tx1"/>
+            </a:solidFill>
+          </a:ln>
+        </p:spPr>
+        <p:style>
+          <a:lnRef idx="2">
+            <a:schemeClr val="accent6"/>
+          </a:lnRef>
+          <a:fillRef idx="1">
+            <a:schemeClr val="lt1"/>
+          </a:fillRef>
+          <a:effectRef idx="0">
+            <a:schemeClr val="accent6"/>
+          </a:effectRef>
+          <a:fontRef idx="minor">
+            <a:schemeClr val="dk1"/>
+          </a:fontRef>
+        </p:style>
+        <p:txBody>
+          <a:bodyPr rtlCol="0" anchor="ctr"/>
+          <a:lstStyle/>
+          <a:p>
+            <a:pPr algn="ctr"/>
+            <a:r>
+              <a:rPr lang="de-DE" dirty="0"/>
+              <a:t>4</a:t>
+            </a:r>
+            <a:endParaRPr lang="en-GB" dirty="0"/>
+          </a:p>
+        </p:txBody>
+      </p:sp>
+      <p:cxnSp>
+        <p:nvCxnSpPr>
+          <p:cNvPr id="24" name="Verbinder: gewinkelt 23">
+            <a:extLst>
+              <a:ext uri="{FF2B5EF4-FFF2-40B4-BE49-F238E27FC236}">
+                <a16:creationId xmlns:a16="http://schemas.microsoft.com/office/drawing/2014/main" id="{F71C2BF3-7086-45AF-9678-7EFB49235463}"/>
+              </a:ext>
+            </a:extLst>
+          </p:cNvPr>
+          <p:cNvCxnSpPr>
+            <a:cxnSpLocks/>
+            <a:stCxn id="15" idx="3"/>
+            <a:endCxn id="6" idx="1"/>
+          </p:cNvCxnSpPr>
+          <p:nvPr/>
+        </p:nvCxnSpPr>
+        <p:spPr>
+          <a:xfrm>
+            <a:off x="7657578" y="3683471"/>
+            <a:ext cx="703754" cy="1962095"/>
+          </a:xfrm>
+          <a:prstGeom prst="bentConnector3">
+            <a:avLst/>
+          </a:prstGeom>
+          <a:ln>
+            <a:solidFill>
+              <a:schemeClr val="tx1"/>
+            </a:solidFill>
+            <a:tailEnd type="triangle"/>
+          </a:ln>
+        </p:spPr>
+        <p:style>
+          <a:lnRef idx="1">
+            <a:schemeClr val="accent1"/>
+          </a:lnRef>
+          <a:fillRef idx="0">
+            <a:schemeClr val="accent1"/>
+          </a:fillRef>
+          <a:effectRef idx="0">
+            <a:schemeClr val="accent1"/>
+          </a:effectRef>
+          <a:fontRef idx="minor">
+            <a:schemeClr val="tx1"/>
+          </a:fontRef>
+        </p:style>
+      </p:cxnSp>
+      <p:cxnSp>
+        <p:nvCxnSpPr>
+          <p:cNvPr id="25" name="Verbinder: gewinkelt 24">
+            <a:extLst>
+              <a:ext uri="{FF2B5EF4-FFF2-40B4-BE49-F238E27FC236}">
+                <a16:creationId xmlns:a16="http://schemas.microsoft.com/office/drawing/2014/main" id="{FF2DE44A-4B60-48B6-BE56-8CAF420EC4CA}"/>
+              </a:ext>
+            </a:extLst>
+          </p:cNvPr>
+          <p:cNvCxnSpPr>
+            <a:cxnSpLocks/>
+            <a:stCxn id="15" idx="3"/>
+            <a:endCxn id="65" idx="0"/>
+          </p:cNvCxnSpPr>
+          <p:nvPr/>
+        </p:nvCxnSpPr>
+        <p:spPr>
+          <a:xfrm>
+            <a:off x="7657578" y="3683471"/>
+            <a:ext cx="3285252" cy="237371"/>
+          </a:xfrm>
+          <a:prstGeom prst="bentConnector2">
+            <a:avLst/>
+          </a:prstGeom>
+          <a:ln>
+            <a:solidFill>
+              <a:schemeClr val="tx1"/>
+            </a:solidFill>
+            <a:tailEnd type="triangle"/>
+          </a:ln>
+        </p:spPr>
+        <p:style>
+          <a:lnRef idx="1">
+            <a:schemeClr val="accent1"/>
+          </a:lnRef>
+          <a:fillRef idx="0">
+            <a:schemeClr val="accent1"/>
+          </a:fillRef>
+          <a:effectRef idx="0">
+            <a:schemeClr val="accent1"/>
+          </a:effectRef>
+          <a:fontRef idx="minor">
+            <a:schemeClr val="tx1"/>
+          </a:fontRef>
+        </p:style>
+      </p:cxnSp>
+      <p:grpSp>
+        <p:nvGrpSpPr>
+          <p:cNvPr id="26" name="Gruppieren 25">
+            <a:extLst>
+              <a:ext uri="{FF2B5EF4-FFF2-40B4-BE49-F238E27FC236}">
+                <a16:creationId xmlns:a16="http://schemas.microsoft.com/office/drawing/2014/main" id="{B6116DFA-0AB7-4109-B200-C9704CC0FAE6}"/>
+              </a:ext>
+            </a:extLst>
+          </p:cNvPr>
+          <p:cNvGrpSpPr/>
+          <p:nvPr/>
+        </p:nvGrpSpPr>
+        <p:grpSpPr>
+          <a:xfrm>
+            <a:off x="8641927" y="2680391"/>
+            <a:ext cx="878781" cy="778854"/>
+            <a:chOff x="6310397" y="2595700"/>
+            <a:chExt cx="1369466" cy="778854"/>
+          </a:xfrm>
+        </p:grpSpPr>
+        <p:sp>
+          <p:nvSpPr>
+            <p:cNvPr id="27" name="Rechteck: abgerundete Ecken 26">
+              <a:extLst>
+                <a:ext uri="{FF2B5EF4-FFF2-40B4-BE49-F238E27FC236}">
+                  <a16:creationId xmlns:a16="http://schemas.microsoft.com/office/drawing/2014/main" id="{4774B4B0-E77F-4F01-830E-0BC42201A6C5}"/>
+                </a:ext>
+              </a:extLst>
+            </p:cNvPr>
+            <p:cNvSpPr/>
+            <p:nvPr/>
+          </p:nvSpPr>
+          <p:spPr>
+            <a:xfrm>
+              <a:off x="6310397" y="2595700"/>
+              <a:ext cx="1369466" cy="778854"/>
+            </a:xfrm>
+            <a:prstGeom prst="roundRect">
+              <a:avLst>
+                <a:gd name="adj" fmla="val 2329"/>
+              </a:avLst>
+            </a:prstGeom>
+            <a:ln>
+              <a:solidFill>
+                <a:schemeClr val="accent1">
+                  <a:lumMod val="50000"/>
+                </a:schemeClr>
+              </a:solidFill>
+            </a:ln>
+          </p:spPr>
+          <p:style>
+            <a:lnRef idx="2">
+              <a:schemeClr val="accent6"/>
+            </a:lnRef>
+            <a:fillRef idx="1">
+              <a:schemeClr val="lt1"/>
+            </a:fillRef>
+            <a:effectRef idx="0">
+              <a:schemeClr val="accent6"/>
+            </a:effectRef>
+            <a:fontRef idx="minor">
+              <a:schemeClr val="dk1"/>
+            </a:fontRef>
+          </p:style>
+          <p:txBody>
+            <a:bodyPr rtlCol="0" anchor="t"/>
+            <a:lstStyle/>
+            <a:p>
+              <a:pPr algn="ctr"/>
+              <a:r>
+                <a:rPr lang="de-DE" sz="1400" dirty="0"/>
+                <a:t>Target 1</a:t>
+              </a:r>
+              <a:endParaRPr lang="en-GB" dirty="0"/>
+            </a:p>
+          </p:txBody>
+        </p:sp>
+        <p:pic>
+          <p:nvPicPr>
+            <p:cNvPr id="28" name="Grafik 27" descr="Roboter">
+              <a:extLst>
+                <a:ext uri="{FF2B5EF4-FFF2-40B4-BE49-F238E27FC236}">
+                  <a16:creationId xmlns:a16="http://schemas.microsoft.com/office/drawing/2014/main" id="{8F3F0612-3BA6-4875-B183-AF4FD8F1FC0D}"/>
+                </a:ext>
+              </a:extLst>
+            </p:cNvPr>
+            <p:cNvPicPr>
+              <a:picLocks noChangeAspect="1"/>
+            </p:cNvPicPr>
+            <p:nvPr/>
+          </p:nvPicPr>
+          <p:blipFill>
+            <a:blip r:embed="rId2">
+              <a:extLst>
+                <a:ext uri="{28A0092B-C50C-407E-A947-70E740481C1C}">
+                  <a14:useLocalDpi xmlns:a14="http://schemas.microsoft.com/office/drawing/2010/main" val="0"/>
+                </a:ext>
+                <a:ext uri="{96DAC541-7B7A-43D3-8B79-37D633B846F1}">
+                  <asvg:svgBlip xmlns:asvg="http://schemas.microsoft.com/office/drawing/2016/SVG/main" r:embed="rId3"/>
+                </a:ext>
+              </a:extLst>
+            </a:blip>
+            <a:stretch>
+              <a:fillRect/>
+            </a:stretch>
+          </p:blipFill>
+          <p:spPr>
+            <a:xfrm>
+              <a:off x="6641579" y="2856752"/>
+              <a:ext cx="707101" cy="481080"/>
+            </a:xfrm>
+            <a:prstGeom prst="rect">
+              <a:avLst/>
+            </a:prstGeom>
+          </p:spPr>
+        </p:pic>
+      </p:grpSp>
+      <p:cxnSp>
+        <p:nvCxnSpPr>
+          <p:cNvPr id="30" name="Gerader Verbinder 29">
+            <a:extLst>
+              <a:ext uri="{FF2B5EF4-FFF2-40B4-BE49-F238E27FC236}">
+                <a16:creationId xmlns:a16="http://schemas.microsoft.com/office/drawing/2014/main" id="{CEA3615C-C820-40A1-B685-839565F34216}"/>
+              </a:ext>
+            </a:extLst>
+          </p:cNvPr>
+          <p:cNvCxnSpPr>
+            <a:cxnSpLocks/>
+          </p:cNvCxnSpPr>
+          <p:nvPr/>
+        </p:nvCxnSpPr>
+        <p:spPr>
+          <a:xfrm flipH="1" flipV="1">
+            <a:off x="9081317" y="2509089"/>
+            <a:ext cx="1" cy="161860"/>
+          </a:xfrm>
+          <a:prstGeom prst="line">
+            <a:avLst/>
+          </a:prstGeom>
+          <a:ln>
+            <a:solidFill>
+              <a:schemeClr val="tx1"/>
+            </a:solidFill>
+          </a:ln>
+        </p:spPr>
+        <p:style>
+          <a:lnRef idx="1">
+            <a:schemeClr val="accent1"/>
+          </a:lnRef>
+          <a:fillRef idx="0">
+            <a:schemeClr val="accent1"/>
+          </a:fillRef>
+          <a:effectRef idx="0">
+            <a:schemeClr val="accent1"/>
+          </a:effectRef>
+          <a:fontRef idx="minor">
+            <a:schemeClr val="tx1"/>
+          </a:fontRef>
+        </p:style>
+      </p:cxnSp>
+      <p:sp>
+        <p:nvSpPr>
+          <p:cNvPr id="35" name="Ellipse 34">
+            <a:extLst>
+              <a:ext uri="{FF2B5EF4-FFF2-40B4-BE49-F238E27FC236}">
+                <a16:creationId xmlns:a16="http://schemas.microsoft.com/office/drawing/2014/main" id="{56D09617-2833-4ADC-9060-71691BBE2A33}"/>
+              </a:ext>
+            </a:extLst>
+          </p:cNvPr>
+          <p:cNvSpPr/>
+          <p:nvPr/>
+        </p:nvSpPr>
+        <p:spPr>
+          <a:xfrm>
+            <a:off x="8187328" y="5861614"/>
+            <a:ext cx="348008" cy="342604"/>
+          </a:xfrm>
+          <a:prstGeom prst="ellipse">
+            <a:avLst/>
+          </a:prstGeom>
+          <a:ln>
+            <a:solidFill>
+              <a:schemeClr val="tx1"/>
+            </a:solidFill>
+          </a:ln>
+        </p:spPr>
+        <p:style>
+          <a:lnRef idx="2">
+            <a:schemeClr val="accent6"/>
+          </a:lnRef>
+          <a:fillRef idx="1">
+            <a:schemeClr val="lt1"/>
+          </a:fillRef>
+          <a:effectRef idx="0">
+            <a:schemeClr val="accent6"/>
+          </a:effectRef>
+          <a:fontRef idx="minor">
+            <a:schemeClr val="dk1"/>
+          </a:fontRef>
+        </p:style>
+        <p:txBody>
+          <a:bodyPr rtlCol="0" anchor="ctr"/>
+          <a:lstStyle/>
+          <a:p>
+            <a:pPr algn="ctr"/>
+            <a:r>
+              <a:rPr lang="de-DE" dirty="0"/>
+              <a:t>5</a:t>
+            </a:r>
+            <a:endParaRPr lang="en-GB" dirty="0"/>
+          </a:p>
+        </p:txBody>
+      </p:sp>
+      <p:grpSp>
+        <p:nvGrpSpPr>
+          <p:cNvPr id="39" name="Gruppieren 38">
+            <a:extLst>
+              <a:ext uri="{FF2B5EF4-FFF2-40B4-BE49-F238E27FC236}">
+                <a16:creationId xmlns:a16="http://schemas.microsoft.com/office/drawing/2014/main" id="{486EDBA2-B194-4C6A-8B6A-09758D822888}"/>
+              </a:ext>
+            </a:extLst>
+          </p:cNvPr>
+          <p:cNvGrpSpPr/>
+          <p:nvPr/>
+        </p:nvGrpSpPr>
+        <p:grpSpPr>
+          <a:xfrm>
+            <a:off x="102597" y="2100983"/>
+            <a:ext cx="1359349" cy="1123562"/>
+            <a:chOff x="102597" y="2100983"/>
+            <a:chExt cx="1359349" cy="1123562"/>
+          </a:xfrm>
+        </p:grpSpPr>
+        <p:sp>
+          <p:nvSpPr>
+            <p:cNvPr id="40" name="Rechteck: abgerundete Ecken 39">
+              <a:extLst>
+                <a:ext uri="{FF2B5EF4-FFF2-40B4-BE49-F238E27FC236}">
+                  <a16:creationId xmlns:a16="http://schemas.microsoft.com/office/drawing/2014/main" id="{A9553E5D-3541-4722-8089-20BABD3EC2A4}"/>
+                </a:ext>
+              </a:extLst>
+            </p:cNvPr>
+            <p:cNvSpPr/>
+            <p:nvPr/>
+          </p:nvSpPr>
+          <p:spPr>
+            <a:xfrm>
+              <a:off x="277238" y="2100983"/>
+              <a:ext cx="1184708" cy="969272"/>
+            </a:xfrm>
+            <a:prstGeom prst="roundRect">
+              <a:avLst>
+                <a:gd name="adj" fmla="val 2329"/>
+              </a:avLst>
+            </a:prstGeom>
+            <a:ln>
+              <a:solidFill>
+                <a:schemeClr val="accent1">
+                  <a:lumMod val="50000"/>
+                </a:schemeClr>
+              </a:solidFill>
+            </a:ln>
+          </p:spPr>
+          <p:style>
+            <a:lnRef idx="2">
+              <a:schemeClr val="accent6"/>
+            </a:lnRef>
+            <a:fillRef idx="1">
+              <a:schemeClr val="lt1"/>
+            </a:fillRef>
+            <a:effectRef idx="0">
+              <a:schemeClr val="accent6"/>
+            </a:effectRef>
+            <a:fontRef idx="minor">
+              <a:schemeClr val="dk1"/>
+            </a:fontRef>
+          </p:style>
+          <p:txBody>
+            <a:bodyPr rtlCol="0" anchor="t"/>
+            <a:lstStyle/>
+            <a:p>
+              <a:r>
+                <a:rPr lang="de-DE" dirty="0"/>
+                <a:t>Developer</a:t>
+              </a:r>
+              <a:endParaRPr lang="en-GB" dirty="0"/>
+            </a:p>
+          </p:txBody>
+        </p:sp>
+        <p:pic>
+          <p:nvPicPr>
+            <p:cNvPr id="41" name="Grafik 40" descr="Lachendes Gesicht ohne Füllung">
+              <a:extLst>
+                <a:ext uri="{FF2B5EF4-FFF2-40B4-BE49-F238E27FC236}">
+                  <a16:creationId xmlns:a16="http://schemas.microsoft.com/office/drawing/2014/main" id="{69AA2013-03AE-48C6-B6D6-B31D978951C6}"/>
+                </a:ext>
+              </a:extLst>
+            </p:cNvPr>
+            <p:cNvPicPr>
+              <a:picLocks noChangeAspect="1"/>
+            </p:cNvPicPr>
+            <p:nvPr/>
+          </p:nvPicPr>
+          <p:blipFill>
+            <a:blip r:embed="rId4">
+              <a:extLst>
+                <a:ext uri="{28A0092B-C50C-407E-A947-70E740481C1C}">
+                  <a14:useLocalDpi xmlns:a14="http://schemas.microsoft.com/office/drawing/2010/main" val="0"/>
+                </a:ext>
+                <a:ext uri="{96DAC541-7B7A-43D3-8B79-37D633B846F1}">
+                  <asvg:svgBlip xmlns:asvg="http://schemas.microsoft.com/office/drawing/2016/SVG/main" r:embed="rId5"/>
+                </a:ext>
+              </a:extLst>
+            </a:blip>
+            <a:stretch>
+              <a:fillRect/>
+            </a:stretch>
+          </p:blipFill>
+          <p:spPr>
+            <a:xfrm>
+              <a:off x="559207" y="2422205"/>
+              <a:ext cx="598890" cy="598890"/>
+            </a:xfrm>
+            <a:prstGeom prst="rect">
+              <a:avLst/>
+            </a:prstGeom>
+          </p:spPr>
+        </p:pic>
+        <p:sp>
+          <p:nvSpPr>
+            <p:cNvPr id="42" name="Ellipse 41">
+              <a:extLst>
+                <a:ext uri="{FF2B5EF4-FFF2-40B4-BE49-F238E27FC236}">
+                  <a16:creationId xmlns:a16="http://schemas.microsoft.com/office/drawing/2014/main" id="{4DBEE308-E5C6-411B-9C2C-71C66B70544A}"/>
+                </a:ext>
+              </a:extLst>
+            </p:cNvPr>
+            <p:cNvSpPr/>
+            <p:nvPr/>
+          </p:nvSpPr>
+          <p:spPr>
+            <a:xfrm>
+              <a:off x="102597" y="2881941"/>
+              <a:ext cx="348008" cy="342604"/>
+            </a:xfrm>
+            <a:prstGeom prst="ellipse">
+              <a:avLst/>
+            </a:prstGeom>
+            <a:ln>
+              <a:solidFill>
+                <a:schemeClr val="tx1"/>
+              </a:solidFill>
+            </a:ln>
+          </p:spPr>
+          <p:style>
+            <a:lnRef idx="2">
+              <a:schemeClr val="accent6"/>
+            </a:lnRef>
+            <a:fillRef idx="1">
+              <a:schemeClr val="lt1"/>
+            </a:fillRef>
+            <a:effectRef idx="0">
+              <a:schemeClr val="accent6"/>
+            </a:effectRef>
+            <a:fontRef idx="minor">
+              <a:schemeClr val="dk1"/>
+            </a:fontRef>
+          </p:style>
+          <p:txBody>
+            <a:bodyPr rtlCol="0" anchor="ctr"/>
+            <a:lstStyle/>
+            <a:p>
+              <a:pPr algn="ctr"/>
+              <a:r>
+                <a:rPr lang="de-DE" dirty="0"/>
+                <a:t>8</a:t>
+              </a:r>
+              <a:endParaRPr lang="en-GB" dirty="0"/>
+            </a:p>
+          </p:txBody>
+        </p:sp>
+      </p:grpSp>
+      <p:sp>
+        <p:nvSpPr>
+          <p:cNvPr id="43" name="Rechteck: abgerundete Ecken 42">
+            <a:extLst>
+              <a:ext uri="{FF2B5EF4-FFF2-40B4-BE49-F238E27FC236}">
+                <a16:creationId xmlns:a16="http://schemas.microsoft.com/office/drawing/2014/main" id="{04927E64-B13C-4E70-83BA-4112D6BCE82C}"/>
+              </a:ext>
+            </a:extLst>
+          </p:cNvPr>
+          <p:cNvSpPr/>
+          <p:nvPr/>
+        </p:nvSpPr>
+        <p:spPr>
+          <a:xfrm>
+            <a:off x="1881653" y="2592725"/>
+            <a:ext cx="1261688" cy="342604"/>
+          </a:xfrm>
+          <a:prstGeom prst="roundRect">
+            <a:avLst>
+              <a:gd name="adj" fmla="val 2329"/>
+            </a:avLst>
+          </a:prstGeom>
+          <a:ln>
+            <a:solidFill>
+              <a:schemeClr val="accent1">
+                <a:lumMod val="50000"/>
+              </a:schemeClr>
+            </a:solidFill>
+          </a:ln>
+        </p:spPr>
+        <p:style>
+          <a:lnRef idx="2">
+            <a:schemeClr val="accent6"/>
+          </a:lnRef>
+          <a:fillRef idx="1">
+            <a:schemeClr val="lt1"/>
+          </a:fillRef>
+          <a:effectRef idx="0">
+            <a:schemeClr val="accent6"/>
+          </a:effectRef>
+          <a:fontRef idx="minor">
+            <a:schemeClr val="dk1"/>
+          </a:fontRef>
+        </p:style>
+        <p:txBody>
+          <a:bodyPr rtlCol="0" anchor="ctr"/>
+          <a:lstStyle/>
+          <a:p>
+            <a:pPr algn="ctr"/>
+            <a:r>
+              <a:rPr lang="de-DE" dirty="0"/>
+              <a:t>Validation</a:t>
+            </a:r>
+            <a:endParaRPr lang="en-GB" dirty="0"/>
+          </a:p>
+        </p:txBody>
+      </p:sp>
+      <p:cxnSp>
+        <p:nvCxnSpPr>
+          <p:cNvPr id="44" name="Gerade Verbindung mit Pfeil 43">
+            <a:extLst>
+              <a:ext uri="{FF2B5EF4-FFF2-40B4-BE49-F238E27FC236}">
+                <a16:creationId xmlns:a16="http://schemas.microsoft.com/office/drawing/2014/main" id="{0D0A60A5-C373-4762-899E-282B8C5D6BE1}"/>
+              </a:ext>
+            </a:extLst>
+          </p:cNvPr>
+          <p:cNvCxnSpPr>
+            <a:cxnSpLocks/>
+            <a:stCxn id="43" idx="3"/>
+          </p:cNvCxnSpPr>
+          <p:nvPr/>
+        </p:nvCxnSpPr>
+        <p:spPr>
+          <a:xfrm flipV="1">
+            <a:off x="3143341" y="2763346"/>
+            <a:ext cx="225008" cy="681"/>
+          </a:xfrm>
+          <a:prstGeom prst="straightConnector1">
+            <a:avLst/>
+          </a:prstGeom>
+          <a:ln>
+            <a:solidFill>
+              <a:schemeClr val="tx1"/>
+            </a:solidFill>
+            <a:tailEnd type="triangle"/>
+          </a:ln>
+        </p:spPr>
+        <p:style>
+          <a:lnRef idx="1">
+            <a:schemeClr val="accent1"/>
+          </a:lnRef>
+          <a:fillRef idx="0">
+            <a:schemeClr val="accent1"/>
+          </a:fillRef>
+          <a:effectRef idx="0">
+            <a:schemeClr val="accent1"/>
+          </a:effectRef>
+          <a:fontRef idx="minor">
+            <a:schemeClr val="tx1"/>
+          </a:fontRef>
+        </p:style>
+      </p:cxnSp>
+      <p:cxnSp>
+        <p:nvCxnSpPr>
+          <p:cNvPr id="45" name="Gerade Verbindung mit Pfeil 44">
+            <a:extLst>
+              <a:ext uri="{FF2B5EF4-FFF2-40B4-BE49-F238E27FC236}">
+                <a16:creationId xmlns:a16="http://schemas.microsoft.com/office/drawing/2014/main" id="{7F2E3561-F0B7-4E42-921E-BF418979B985}"/>
+              </a:ext>
+            </a:extLst>
+          </p:cNvPr>
+          <p:cNvCxnSpPr>
+            <a:cxnSpLocks/>
+            <a:endCxn id="43" idx="1"/>
+          </p:cNvCxnSpPr>
+          <p:nvPr/>
+        </p:nvCxnSpPr>
+        <p:spPr>
+          <a:xfrm>
+            <a:off x="1467956" y="2764027"/>
+            <a:ext cx="413697" cy="0"/>
+          </a:xfrm>
+          <a:prstGeom prst="straightConnector1">
+            <a:avLst/>
+          </a:prstGeom>
+          <a:ln>
+            <a:solidFill>
+              <a:schemeClr val="tx1"/>
+            </a:solidFill>
+            <a:tailEnd type="triangle"/>
+          </a:ln>
+        </p:spPr>
+        <p:style>
+          <a:lnRef idx="1">
+            <a:schemeClr val="accent1"/>
+          </a:lnRef>
+          <a:fillRef idx="0">
+            <a:schemeClr val="accent1"/>
+          </a:fillRef>
+          <a:effectRef idx="0">
+            <a:schemeClr val="accent1"/>
+          </a:effectRef>
+          <a:fontRef idx="minor">
+            <a:schemeClr val="tx1"/>
+          </a:fontRef>
+        </p:style>
+      </p:cxnSp>
+      <p:cxnSp>
+        <p:nvCxnSpPr>
+          <p:cNvPr id="46" name="Verbinder: gewinkelt 45">
+            <a:extLst>
+              <a:ext uri="{FF2B5EF4-FFF2-40B4-BE49-F238E27FC236}">
+                <a16:creationId xmlns:a16="http://schemas.microsoft.com/office/drawing/2014/main" id="{9E515C4C-6038-498B-9E33-90B12A7C517C}"/>
+              </a:ext>
+            </a:extLst>
+          </p:cNvPr>
+          <p:cNvCxnSpPr>
+            <a:cxnSpLocks/>
+            <a:stCxn id="43" idx="0"/>
+          </p:cNvCxnSpPr>
+          <p:nvPr/>
+        </p:nvCxnSpPr>
+        <p:spPr>
+          <a:xfrm rot="16200000" flipV="1">
+            <a:off x="1889309" y="1969537"/>
+            <a:ext cx="190149" cy="1056228"/>
+          </a:xfrm>
+          <a:prstGeom prst="bentConnector2">
+            <a:avLst/>
+          </a:prstGeom>
+          <a:ln>
+            <a:solidFill>
+              <a:schemeClr val="tx1"/>
+            </a:solidFill>
+            <a:tailEnd type="triangle"/>
+          </a:ln>
+        </p:spPr>
+        <p:style>
+          <a:lnRef idx="1">
+            <a:schemeClr val="accent1"/>
+          </a:lnRef>
+          <a:fillRef idx="0">
+            <a:schemeClr val="accent1"/>
+          </a:fillRef>
+          <a:effectRef idx="0">
+            <a:schemeClr val="accent1"/>
+          </a:effectRef>
+          <a:fontRef idx="minor">
+            <a:schemeClr val="tx1"/>
+          </a:fontRef>
+        </p:style>
+      </p:cxnSp>
+      <p:sp>
+        <p:nvSpPr>
+          <p:cNvPr id="51" name="Rechteck: abgerundete Ecken 50">
+            <a:extLst>
+              <a:ext uri="{FF2B5EF4-FFF2-40B4-BE49-F238E27FC236}">
+                <a16:creationId xmlns:a16="http://schemas.microsoft.com/office/drawing/2014/main" id="{676A6066-5685-49E5-B9EF-2B8A5E38A29A}"/>
+              </a:ext>
+            </a:extLst>
+          </p:cNvPr>
+          <p:cNvSpPr/>
+          <p:nvPr/>
+        </p:nvSpPr>
+        <p:spPr>
+          <a:xfrm>
+            <a:off x="9572003" y="2680391"/>
+            <a:ext cx="878781" cy="778854"/>
+          </a:xfrm>
+          <a:prstGeom prst="roundRect">
+            <a:avLst>
+              <a:gd name="adj" fmla="val 2329"/>
+            </a:avLst>
+          </a:prstGeom>
+          <a:ln>
+            <a:solidFill>
+              <a:schemeClr val="accent1">
+                <a:lumMod val="50000"/>
+              </a:schemeClr>
+            </a:solidFill>
+          </a:ln>
+        </p:spPr>
+        <p:style>
+          <a:lnRef idx="2">
+            <a:schemeClr val="accent6"/>
+          </a:lnRef>
+          <a:fillRef idx="1">
+            <a:schemeClr val="lt1"/>
+          </a:fillRef>
+          <a:effectRef idx="0">
+            <a:schemeClr val="accent6"/>
+          </a:effectRef>
+          <a:fontRef idx="minor">
+            <a:schemeClr val="dk1"/>
+          </a:fontRef>
+        </p:style>
+        <p:txBody>
+          <a:bodyPr rtlCol="0" anchor="t"/>
+          <a:lstStyle/>
+          <a:p>
+            <a:pPr algn="ctr"/>
+            <a:r>
+              <a:rPr lang="de-DE" sz="1400" dirty="0"/>
+              <a:t>Target 2</a:t>
+            </a:r>
+            <a:endParaRPr lang="en-GB" dirty="0"/>
+          </a:p>
+        </p:txBody>
+      </p:sp>
+      <p:pic>
+        <p:nvPicPr>
+          <p:cNvPr id="56" name="Grafik 55" descr="Soziales Netzwerk">
+            <a:extLst>
+              <a:ext uri="{FF2B5EF4-FFF2-40B4-BE49-F238E27FC236}">
+                <a16:creationId xmlns:a16="http://schemas.microsoft.com/office/drawing/2014/main" id="{63BC8AAC-6639-4B95-9EF7-D181FEA5899F}"/>
+              </a:ext>
+            </a:extLst>
+          </p:cNvPr>
+          <p:cNvPicPr>
+            <a:picLocks noChangeAspect="1"/>
+          </p:cNvPicPr>
+          <p:nvPr/>
+        </p:nvPicPr>
+        <p:blipFill>
+          <a:blip r:embed="rId6">
+            <a:extLst>
+              <a:ext uri="{28A0092B-C50C-407E-A947-70E740481C1C}">
+                <a14:useLocalDpi xmlns:a14="http://schemas.microsoft.com/office/drawing/2010/main" val="0"/>
+              </a:ext>
+              <a:ext uri="{96DAC541-7B7A-43D3-8B79-37D633B846F1}">
+                <asvg:svgBlip xmlns:asvg="http://schemas.microsoft.com/office/drawing/2016/SVG/main" r:embed="rId7"/>
+              </a:ext>
+            </a:extLst>
+          </a:blip>
+          <a:stretch>
+            <a:fillRect/>
+          </a:stretch>
+        </p:blipFill>
+        <p:spPr>
+          <a:xfrm>
+            <a:off x="9757309" y="2912521"/>
+            <a:ext cx="501735" cy="501735"/>
+          </a:xfrm>
+          <a:prstGeom prst="rect">
+            <a:avLst/>
+          </a:prstGeom>
+        </p:spPr>
+      </p:pic>
+      <p:sp>
+        <p:nvSpPr>
+          <p:cNvPr id="62" name="Rechteck: abgerundete Ecken 61">
+            <a:extLst>
+              <a:ext uri="{FF2B5EF4-FFF2-40B4-BE49-F238E27FC236}">
+                <a16:creationId xmlns:a16="http://schemas.microsoft.com/office/drawing/2014/main" id="{851F65A9-1192-485B-8898-44DB2794B818}"/>
+              </a:ext>
+            </a:extLst>
+          </p:cNvPr>
+          <p:cNvSpPr/>
+          <p:nvPr/>
+        </p:nvSpPr>
+        <p:spPr>
+          <a:xfrm>
+            <a:off x="10503439" y="2680391"/>
+            <a:ext cx="878781" cy="778854"/>
+          </a:xfrm>
+          <a:prstGeom prst="roundRect">
+            <a:avLst>
+              <a:gd name="adj" fmla="val 2329"/>
+            </a:avLst>
+          </a:prstGeom>
+          <a:ln>
+            <a:solidFill>
+              <a:schemeClr val="accent1">
+                <a:lumMod val="50000"/>
+              </a:schemeClr>
+            </a:solidFill>
+          </a:ln>
+        </p:spPr>
+        <p:style>
+          <a:lnRef idx="2">
+            <a:schemeClr val="accent6"/>
+          </a:lnRef>
+          <a:fillRef idx="1">
+            <a:schemeClr val="lt1"/>
+          </a:fillRef>
+          <a:effectRef idx="0">
+            <a:schemeClr val="accent6"/>
+          </a:effectRef>
+          <a:fontRef idx="minor">
+            <a:schemeClr val="dk1"/>
+          </a:fontRef>
+        </p:style>
+        <p:txBody>
+          <a:bodyPr rtlCol="0" anchor="t"/>
+          <a:lstStyle/>
+          <a:p>
+            <a:pPr algn="ctr"/>
+            <a:r>
+              <a:rPr lang="de-DE" sz="1400" dirty="0"/>
+              <a:t>Target 3</a:t>
+            </a:r>
+            <a:endParaRPr lang="en-GB" dirty="0"/>
+          </a:p>
+        </p:txBody>
+      </p:sp>
+      <p:pic>
+        <p:nvPicPr>
+          <p:cNvPr id="54" name="Grafik 53" descr="Zahnräder">
+            <a:extLst>
+              <a:ext uri="{FF2B5EF4-FFF2-40B4-BE49-F238E27FC236}">
+                <a16:creationId xmlns:a16="http://schemas.microsoft.com/office/drawing/2014/main" id="{07C2B25F-5AE4-478E-940B-D1967F7E3592}"/>
+              </a:ext>
+            </a:extLst>
+          </p:cNvPr>
+          <p:cNvPicPr>
+            <a:picLocks noChangeAspect="1"/>
+          </p:cNvPicPr>
+          <p:nvPr/>
+        </p:nvPicPr>
+        <p:blipFill>
+          <a:blip r:embed="rId8">
+            <a:extLst>
+              <a:ext uri="{28A0092B-C50C-407E-A947-70E740481C1C}">
+                <a14:useLocalDpi xmlns:a14="http://schemas.microsoft.com/office/drawing/2010/main" val="0"/>
+              </a:ext>
+              <a:ext uri="{96DAC541-7B7A-43D3-8B79-37D633B846F1}">
+                <asvg:svgBlip xmlns:asvg="http://schemas.microsoft.com/office/drawing/2016/SVG/main" r:embed="rId9"/>
+              </a:ext>
+            </a:extLst>
+          </a:blip>
+          <a:stretch>
+            <a:fillRect/>
+          </a:stretch>
+        </p:blipFill>
+        <p:spPr>
+          <a:xfrm>
+            <a:off x="10673643" y="2933361"/>
+            <a:ext cx="480895" cy="480895"/>
+          </a:xfrm>
+          <a:prstGeom prst="rect">
+            <a:avLst/>
+          </a:prstGeom>
+        </p:spPr>
+      </p:pic>
+      <p:sp>
+        <p:nvSpPr>
+          <p:cNvPr id="65" name="Rechteck: abgerundete Ecken 64">
+            <a:extLst>
+              <a:ext uri="{FF2B5EF4-FFF2-40B4-BE49-F238E27FC236}">
+                <a16:creationId xmlns:a16="http://schemas.microsoft.com/office/drawing/2014/main" id="{82A09F1D-374A-4DD9-96C5-46D5B03C1E85}"/>
+              </a:ext>
+            </a:extLst>
+          </p:cNvPr>
+          <p:cNvSpPr/>
+          <p:nvPr/>
+        </p:nvSpPr>
+        <p:spPr>
+          <a:xfrm>
+            <a:off x="10503439" y="3920842"/>
+            <a:ext cx="878781" cy="778854"/>
+          </a:xfrm>
+          <a:prstGeom prst="roundRect">
+            <a:avLst>
+              <a:gd name="adj" fmla="val 2329"/>
+            </a:avLst>
+          </a:prstGeom>
+          <a:ln>
+            <a:solidFill>
+              <a:schemeClr val="accent1">
+                <a:lumMod val="50000"/>
+              </a:schemeClr>
+            </a:solidFill>
+          </a:ln>
+        </p:spPr>
+        <p:style>
+          <a:lnRef idx="2">
+            <a:schemeClr val="accent6"/>
+          </a:lnRef>
+          <a:fillRef idx="1">
+            <a:schemeClr val="lt1"/>
+          </a:fillRef>
+          <a:effectRef idx="0">
+            <a:schemeClr val="accent6"/>
+          </a:effectRef>
+          <a:fontRef idx="minor">
+            <a:schemeClr val="dk1"/>
+          </a:fontRef>
+        </p:style>
+        <p:txBody>
+          <a:bodyPr rtlCol="0" anchor="t"/>
+          <a:lstStyle/>
+          <a:p>
+            <a:pPr algn="ctr"/>
+            <a:r>
+              <a:rPr lang="de-DE" sz="1400" dirty="0"/>
+              <a:t>Target n</a:t>
+            </a:r>
+            <a:endParaRPr lang="en-GB" dirty="0"/>
+          </a:p>
+        </p:txBody>
+      </p:sp>
+      <p:pic>
+        <p:nvPicPr>
+          <p:cNvPr id="66" name="Grafik 65" descr="Zahnräder">
+            <a:extLst>
+              <a:ext uri="{FF2B5EF4-FFF2-40B4-BE49-F238E27FC236}">
+                <a16:creationId xmlns:a16="http://schemas.microsoft.com/office/drawing/2014/main" id="{461BD4DD-D55C-4026-9135-D5559D9B8076}"/>
+              </a:ext>
+            </a:extLst>
+          </p:cNvPr>
+          <p:cNvPicPr>
+            <a:picLocks noChangeAspect="1"/>
+          </p:cNvPicPr>
+          <p:nvPr/>
+        </p:nvPicPr>
+        <p:blipFill>
+          <a:blip r:embed="rId8">
+            <a:extLst>
+              <a:ext uri="{28A0092B-C50C-407E-A947-70E740481C1C}">
+                <a14:useLocalDpi xmlns:a14="http://schemas.microsoft.com/office/drawing/2010/main" val="0"/>
+              </a:ext>
+              <a:ext uri="{96DAC541-7B7A-43D3-8B79-37D633B846F1}">
+                <asvg:svgBlip xmlns:asvg="http://schemas.microsoft.com/office/drawing/2016/SVG/main" r:embed="rId9"/>
+              </a:ext>
+            </a:extLst>
+          </a:blip>
+          <a:stretch>
+            <a:fillRect/>
+          </a:stretch>
+        </p:blipFill>
+        <p:spPr>
+          <a:xfrm>
+            <a:off x="10690713" y="4143219"/>
+            <a:ext cx="480895" cy="480895"/>
+          </a:xfrm>
+          <a:prstGeom prst="rect">
+            <a:avLst/>
+          </a:prstGeom>
+        </p:spPr>
+      </p:pic>
+      <p:sp>
+        <p:nvSpPr>
+          <p:cNvPr id="67" name="Ellipse 66">
+            <a:extLst>
+              <a:ext uri="{FF2B5EF4-FFF2-40B4-BE49-F238E27FC236}">
+                <a16:creationId xmlns:a16="http://schemas.microsoft.com/office/drawing/2014/main" id="{922CEFAC-0EAF-4350-9DA3-0BE3481824DF}"/>
+              </a:ext>
+            </a:extLst>
+          </p:cNvPr>
+          <p:cNvSpPr/>
+          <p:nvPr/>
+        </p:nvSpPr>
+        <p:spPr>
+          <a:xfrm>
+            <a:off x="9166714" y="4250126"/>
+            <a:ext cx="93989" cy="90442"/>
+          </a:xfrm>
+          <a:prstGeom prst="ellipse">
+            <a:avLst/>
+          </a:prstGeom>
+        </p:spPr>
+        <p:style>
+          <a:lnRef idx="2">
+            <a:schemeClr val="dk1">
+              <a:shade val="50000"/>
+            </a:schemeClr>
+          </a:lnRef>
+          <a:fillRef idx="1">
+            <a:schemeClr val="dk1"/>
+          </a:fillRef>
+          <a:effectRef idx="0">
+            <a:schemeClr val="dk1"/>
+          </a:effectRef>
+          <a:fontRef idx="minor">
+            <a:schemeClr val="lt1"/>
+          </a:fontRef>
+        </p:style>
+        <p:txBody>
+          <a:bodyPr rtlCol="0" anchor="ctr"/>
+          <a:lstStyle/>
+          <a:p>
+            <a:pPr algn="ctr"/>
+            <a:endParaRPr lang="en-US"/>
+          </a:p>
+        </p:txBody>
+      </p:sp>
+      <p:sp>
+        <p:nvSpPr>
+          <p:cNvPr id="68" name="Ellipse 67">
+            <a:extLst>
+              <a:ext uri="{FF2B5EF4-FFF2-40B4-BE49-F238E27FC236}">
+                <a16:creationId xmlns:a16="http://schemas.microsoft.com/office/drawing/2014/main" id="{9340A1B2-6EA1-41F9-AE57-2B3F12007131}"/>
+              </a:ext>
+            </a:extLst>
+          </p:cNvPr>
+          <p:cNvSpPr/>
+          <p:nvPr/>
+        </p:nvSpPr>
+        <p:spPr>
+          <a:xfrm>
+            <a:off x="9394554" y="4257352"/>
+            <a:ext cx="93989" cy="90442"/>
+          </a:xfrm>
+          <a:prstGeom prst="ellipse">
+            <a:avLst/>
+          </a:prstGeom>
+        </p:spPr>
+        <p:style>
+          <a:lnRef idx="2">
+            <a:schemeClr val="dk1">
+              <a:shade val="50000"/>
+            </a:schemeClr>
+          </a:lnRef>
+          <a:fillRef idx="1">
+            <a:schemeClr val="dk1"/>
+          </a:fillRef>
+          <a:effectRef idx="0">
+            <a:schemeClr val="dk1"/>
+          </a:effectRef>
+          <a:fontRef idx="minor">
+            <a:schemeClr val="lt1"/>
+          </a:fontRef>
+        </p:style>
+        <p:txBody>
+          <a:bodyPr rtlCol="0" anchor="ctr"/>
+          <a:lstStyle/>
+          <a:p>
+            <a:pPr algn="ctr"/>
+            <a:endParaRPr lang="en-US"/>
+          </a:p>
+        </p:txBody>
+      </p:sp>
+      <p:sp>
+        <p:nvSpPr>
+          <p:cNvPr id="69" name="Ellipse 68">
+            <a:extLst>
+              <a:ext uri="{FF2B5EF4-FFF2-40B4-BE49-F238E27FC236}">
+                <a16:creationId xmlns:a16="http://schemas.microsoft.com/office/drawing/2014/main" id="{E2C454C0-5D85-4D51-A908-E7E91FBD4C5E}"/>
+              </a:ext>
+            </a:extLst>
+          </p:cNvPr>
+          <p:cNvSpPr/>
+          <p:nvPr/>
+        </p:nvSpPr>
+        <p:spPr>
+          <a:xfrm>
+            <a:off x="9626085" y="4250126"/>
+            <a:ext cx="93989" cy="90442"/>
+          </a:xfrm>
+          <a:prstGeom prst="ellipse">
+            <a:avLst/>
+          </a:prstGeom>
+        </p:spPr>
+        <p:style>
+          <a:lnRef idx="2">
+            <a:schemeClr val="dk1">
+              <a:shade val="50000"/>
+            </a:schemeClr>
+          </a:lnRef>
+          <a:fillRef idx="1">
+            <a:schemeClr val="dk1"/>
+          </a:fillRef>
+          <a:effectRef idx="0">
+            <a:schemeClr val="dk1"/>
+          </a:effectRef>
+          <a:fontRef idx="minor">
+            <a:schemeClr val="lt1"/>
+          </a:fontRef>
+        </p:style>
+        <p:txBody>
+          <a:bodyPr rtlCol="0" anchor="ctr"/>
+          <a:lstStyle/>
+          <a:p>
+            <a:pPr algn="ctr"/>
+            <a:endParaRPr lang="en-US"/>
+          </a:p>
+        </p:txBody>
+      </p:sp>
+      <p:sp>
+        <p:nvSpPr>
+          <p:cNvPr id="70" name="Ellipse 69">
+            <a:extLst>
+              <a:ext uri="{FF2B5EF4-FFF2-40B4-BE49-F238E27FC236}">
+                <a16:creationId xmlns:a16="http://schemas.microsoft.com/office/drawing/2014/main" id="{9F0AC10B-2871-4B2E-AF40-19D3AD3CEBA7}"/>
+              </a:ext>
+            </a:extLst>
+          </p:cNvPr>
+          <p:cNvSpPr/>
+          <p:nvPr/>
+        </p:nvSpPr>
+        <p:spPr>
+          <a:xfrm>
+            <a:off x="9854487" y="4257352"/>
+            <a:ext cx="93989" cy="90442"/>
+          </a:xfrm>
+          <a:prstGeom prst="ellipse">
+            <a:avLst/>
+          </a:prstGeom>
+        </p:spPr>
+        <p:style>
+          <a:lnRef idx="2">
+            <a:schemeClr val="dk1">
+              <a:shade val="50000"/>
+            </a:schemeClr>
+          </a:lnRef>
+          <a:fillRef idx="1">
+            <a:schemeClr val="dk1"/>
+          </a:fillRef>
+          <a:effectRef idx="0">
+            <a:schemeClr val="dk1"/>
+          </a:effectRef>
+          <a:fontRef idx="minor">
+            <a:schemeClr val="lt1"/>
+          </a:fontRef>
+        </p:style>
+        <p:txBody>
+          <a:bodyPr rtlCol="0" anchor="ctr"/>
+          <a:lstStyle/>
+          <a:p>
+            <a:pPr algn="ctr"/>
+            <a:endParaRPr lang="en-US"/>
+          </a:p>
+        </p:txBody>
+      </p:sp>
+      <p:cxnSp>
+        <p:nvCxnSpPr>
+          <p:cNvPr id="74" name="Gerader Verbinder 73">
+            <a:extLst>
+              <a:ext uri="{FF2B5EF4-FFF2-40B4-BE49-F238E27FC236}">
+                <a16:creationId xmlns:a16="http://schemas.microsoft.com/office/drawing/2014/main" id="{471BC57F-B7E6-454D-A5B0-5F8AD54851CC}"/>
+              </a:ext>
+            </a:extLst>
+          </p:cNvPr>
+          <p:cNvCxnSpPr>
+            <a:cxnSpLocks/>
+            <a:stCxn id="51" idx="0"/>
+          </p:cNvCxnSpPr>
+          <p:nvPr/>
+        </p:nvCxnSpPr>
+        <p:spPr>
+          <a:xfrm flipH="1" flipV="1">
+            <a:off x="10008946" y="2504361"/>
+            <a:ext cx="2448" cy="176030"/>
+          </a:xfrm>
+          <a:prstGeom prst="line">
+            <a:avLst/>
+          </a:prstGeom>
+          <a:ln>
+            <a:solidFill>
+              <a:schemeClr val="tx1"/>
+            </a:solidFill>
+          </a:ln>
+        </p:spPr>
+        <p:style>
+          <a:lnRef idx="1">
+            <a:schemeClr val="accent1"/>
+          </a:lnRef>
+          <a:fillRef idx="0">
+            <a:schemeClr val="accent1"/>
+          </a:fillRef>
+          <a:effectRef idx="0">
+            <a:schemeClr val="accent1"/>
+          </a:effectRef>
+          <a:fontRef idx="minor">
+            <a:schemeClr val="tx1"/>
+          </a:fontRef>
+        </p:style>
+      </p:cxnSp>
+      <p:cxnSp>
+        <p:nvCxnSpPr>
+          <p:cNvPr id="75" name="Gerader Verbinder 74">
+            <a:extLst>
+              <a:ext uri="{FF2B5EF4-FFF2-40B4-BE49-F238E27FC236}">
+                <a16:creationId xmlns:a16="http://schemas.microsoft.com/office/drawing/2014/main" id="{40A74069-7143-4EE1-BAE5-695400524B15}"/>
+              </a:ext>
+            </a:extLst>
+          </p:cNvPr>
+          <p:cNvCxnSpPr>
+            <a:cxnSpLocks/>
+            <a:stCxn id="62" idx="0"/>
+          </p:cNvCxnSpPr>
+          <p:nvPr/>
+        </p:nvCxnSpPr>
+        <p:spPr>
+          <a:xfrm flipV="1">
+            <a:off x="10942830" y="2509089"/>
+            <a:ext cx="0" cy="171302"/>
+          </a:xfrm>
+          <a:prstGeom prst="line">
+            <a:avLst/>
+          </a:prstGeom>
+          <a:ln>
+            <a:solidFill>
+              <a:schemeClr val="tx1"/>
+            </a:solidFill>
+          </a:ln>
+        </p:spPr>
+        <p:style>
+          <a:lnRef idx="1">
+            <a:schemeClr val="accent1"/>
+          </a:lnRef>
+          <a:fillRef idx="0">
+            <a:schemeClr val="accent1"/>
+          </a:fillRef>
+          <a:effectRef idx="0">
+            <a:schemeClr val="accent1"/>
+          </a:effectRef>
+          <a:fontRef idx="minor">
+            <a:schemeClr val="tx1"/>
+          </a:fontRef>
+        </p:style>
+      </p:cxnSp>
+      <p:cxnSp>
+        <p:nvCxnSpPr>
+          <p:cNvPr id="76" name="Gerader Verbinder 75">
+            <a:extLst>
+              <a:ext uri="{FF2B5EF4-FFF2-40B4-BE49-F238E27FC236}">
+                <a16:creationId xmlns:a16="http://schemas.microsoft.com/office/drawing/2014/main" id="{6656423B-222F-4FEB-B082-560D4ADBE8AB}"/>
+              </a:ext>
+            </a:extLst>
+          </p:cNvPr>
+          <p:cNvCxnSpPr>
+            <a:cxnSpLocks/>
+          </p:cNvCxnSpPr>
+          <p:nvPr/>
+        </p:nvCxnSpPr>
+        <p:spPr>
+          <a:xfrm flipH="1">
+            <a:off x="9077512" y="2509089"/>
+            <a:ext cx="1865317" cy="0"/>
+          </a:xfrm>
+          <a:prstGeom prst="line">
+            <a:avLst/>
+          </a:prstGeom>
+          <a:ln>
+            <a:solidFill>
+              <a:schemeClr val="tx1"/>
+            </a:solidFill>
+          </a:ln>
+        </p:spPr>
+        <p:style>
+          <a:lnRef idx="1">
+            <a:schemeClr val="accent1"/>
+          </a:lnRef>
+          <a:fillRef idx="0">
+            <a:schemeClr val="accent1"/>
+          </a:fillRef>
+          <a:effectRef idx="0">
+            <a:schemeClr val="accent1"/>
+          </a:effectRef>
+          <a:fontRef idx="minor">
+            <a:schemeClr val="tx1"/>
+          </a:fontRef>
+        </p:style>
+      </p:cxnSp>
+      <p:cxnSp>
+        <p:nvCxnSpPr>
+          <p:cNvPr id="79" name="Gerader Verbinder 78">
+            <a:extLst>
+              <a:ext uri="{FF2B5EF4-FFF2-40B4-BE49-F238E27FC236}">
+                <a16:creationId xmlns:a16="http://schemas.microsoft.com/office/drawing/2014/main" id="{23C9FA06-3311-43A3-91F1-B7C9FAFAE99D}"/>
+              </a:ext>
+            </a:extLst>
+          </p:cNvPr>
+          <p:cNvCxnSpPr>
+            <a:cxnSpLocks/>
+          </p:cNvCxnSpPr>
+          <p:nvPr/>
+        </p:nvCxnSpPr>
+        <p:spPr>
+          <a:xfrm>
+            <a:off x="10004545" y="1837898"/>
+            <a:ext cx="3632" cy="675920"/>
+          </a:xfrm>
+          <a:prstGeom prst="line">
+            <a:avLst/>
+          </a:prstGeom>
+          <a:ln>
+            <a:solidFill>
+              <a:schemeClr val="tx1"/>
+            </a:solidFill>
+          </a:ln>
+        </p:spPr>
+        <p:style>
+          <a:lnRef idx="1">
+            <a:schemeClr val="accent1"/>
+          </a:lnRef>
+          <a:fillRef idx="0">
+            <a:schemeClr val="accent1"/>
+          </a:fillRef>
+          <a:effectRef idx="0">
+            <a:schemeClr val="accent1"/>
+          </a:effectRef>
+          <a:fontRef idx="minor">
+            <a:schemeClr val="tx1"/>
+          </a:fontRef>
+        </p:style>
+      </p:cxnSp>
+      <p:cxnSp>
+        <p:nvCxnSpPr>
+          <p:cNvPr id="94" name="Verbinder: gewinkelt 93">
+            <a:extLst>
+              <a:ext uri="{FF2B5EF4-FFF2-40B4-BE49-F238E27FC236}">
+                <a16:creationId xmlns:a16="http://schemas.microsoft.com/office/drawing/2014/main" id="{09081ED7-F8C8-4266-B35F-8059B2158E20}"/>
+              </a:ext>
+            </a:extLst>
+          </p:cNvPr>
+          <p:cNvCxnSpPr>
+            <a:cxnSpLocks/>
+            <a:endCxn id="11" idx="3"/>
+          </p:cNvCxnSpPr>
+          <p:nvPr/>
+        </p:nvCxnSpPr>
+        <p:spPr>
+          <a:xfrm rot="10800000" flipV="1">
+            <a:off x="7657579" y="1843753"/>
+            <a:ext cx="2347047" cy="1"/>
+          </a:xfrm>
+          <a:prstGeom prst="bentConnector3">
+            <a:avLst>
+              <a:gd name="adj1" fmla="val 50000"/>
+            </a:avLst>
+          </a:prstGeom>
+          <a:ln>
+            <a:solidFill>
+              <a:schemeClr val="tx1"/>
+            </a:solidFill>
+            <a:tailEnd type="triangle"/>
+          </a:ln>
+        </p:spPr>
+        <p:style>
+          <a:lnRef idx="1">
+            <a:schemeClr val="accent1"/>
+          </a:lnRef>
+          <a:fillRef idx="0">
+            <a:schemeClr val="accent1"/>
+          </a:fillRef>
+          <a:effectRef idx="0">
+            <a:schemeClr val="accent1"/>
+          </a:effectRef>
+          <a:fontRef idx="minor">
+            <a:schemeClr val="tx1"/>
+          </a:fontRef>
+        </p:style>
+      </p:cxnSp>
+      <p:cxnSp>
+        <p:nvCxnSpPr>
+          <p:cNvPr id="102" name="Gerade Verbindung mit Pfeil 101">
+            <a:extLst>
+              <a:ext uri="{FF2B5EF4-FFF2-40B4-BE49-F238E27FC236}">
+                <a16:creationId xmlns:a16="http://schemas.microsoft.com/office/drawing/2014/main" id="{5CF1BDCF-A81F-474C-AE3A-BF44AA21859E}"/>
+              </a:ext>
+            </a:extLst>
+          </p:cNvPr>
+          <p:cNvCxnSpPr>
+            <a:cxnSpLocks/>
+            <a:endCxn id="27" idx="2"/>
+          </p:cNvCxnSpPr>
+          <p:nvPr/>
+        </p:nvCxnSpPr>
+        <p:spPr>
+          <a:xfrm flipV="1">
+            <a:off x="9081318" y="3459245"/>
+            <a:ext cx="0" cy="224226"/>
+          </a:xfrm>
+          <a:prstGeom prst="straightConnector1">
+            <a:avLst/>
+          </a:prstGeom>
+          <a:ln>
+            <a:solidFill>
+              <a:schemeClr val="tx1"/>
+            </a:solidFill>
+            <a:tailEnd type="triangle"/>
+          </a:ln>
+        </p:spPr>
+        <p:style>
+          <a:lnRef idx="1">
+            <a:schemeClr val="accent1"/>
+          </a:lnRef>
+          <a:fillRef idx="0">
+            <a:schemeClr val="accent1"/>
+          </a:fillRef>
+          <a:effectRef idx="0">
+            <a:schemeClr val="accent1"/>
+          </a:effectRef>
+          <a:fontRef idx="minor">
+            <a:schemeClr val="tx1"/>
+          </a:fontRef>
+        </p:style>
+      </p:cxnSp>
+      <p:cxnSp>
+        <p:nvCxnSpPr>
+          <p:cNvPr id="108" name="Gerade Verbindung mit Pfeil 107">
+            <a:extLst>
+              <a:ext uri="{FF2B5EF4-FFF2-40B4-BE49-F238E27FC236}">
+                <a16:creationId xmlns:a16="http://schemas.microsoft.com/office/drawing/2014/main" id="{13B1EF21-C3B0-44EF-82EF-C91332B042EF}"/>
+              </a:ext>
+            </a:extLst>
+          </p:cNvPr>
+          <p:cNvCxnSpPr>
+            <a:cxnSpLocks/>
+          </p:cNvCxnSpPr>
+          <p:nvPr/>
+        </p:nvCxnSpPr>
+        <p:spPr>
+          <a:xfrm flipV="1">
+            <a:off x="10004545" y="3459245"/>
+            <a:ext cx="0" cy="224226"/>
+          </a:xfrm>
+          <a:prstGeom prst="straightConnector1">
+            <a:avLst/>
+          </a:prstGeom>
+          <a:ln>
+            <a:solidFill>
+              <a:schemeClr val="tx1"/>
+            </a:solidFill>
+            <a:tailEnd type="triangle"/>
+          </a:ln>
+        </p:spPr>
+        <p:style>
+          <a:lnRef idx="1">
+            <a:schemeClr val="accent1"/>
+          </a:lnRef>
+          <a:fillRef idx="0">
+            <a:schemeClr val="accent1"/>
+          </a:fillRef>
+          <a:effectRef idx="0">
+            <a:schemeClr val="accent1"/>
+          </a:effectRef>
+          <a:fontRef idx="minor">
+            <a:schemeClr val="tx1"/>
+          </a:fontRef>
+        </p:style>
+      </p:cxnSp>
+      <p:cxnSp>
+        <p:nvCxnSpPr>
+          <p:cNvPr id="109" name="Gerade Verbindung mit Pfeil 108">
+            <a:extLst>
+              <a:ext uri="{FF2B5EF4-FFF2-40B4-BE49-F238E27FC236}">
+                <a16:creationId xmlns:a16="http://schemas.microsoft.com/office/drawing/2014/main" id="{7A54F91E-1EE6-40F8-9088-4A50CB2496D8}"/>
+              </a:ext>
+            </a:extLst>
+          </p:cNvPr>
+          <p:cNvCxnSpPr>
+            <a:cxnSpLocks/>
+          </p:cNvCxnSpPr>
+          <p:nvPr/>
+        </p:nvCxnSpPr>
+        <p:spPr>
+          <a:xfrm flipV="1">
+            <a:off x="10943884" y="3459245"/>
+            <a:ext cx="0" cy="224226"/>
+          </a:xfrm>
+          <a:prstGeom prst="straightConnector1">
+            <a:avLst/>
+          </a:prstGeom>
+          <a:ln>
+            <a:solidFill>
+              <a:schemeClr val="tx1"/>
+            </a:solidFill>
+            <a:tailEnd type="triangle"/>
+          </a:ln>
+        </p:spPr>
+        <p:style>
+          <a:lnRef idx="1">
+            <a:schemeClr val="accent1"/>
+          </a:lnRef>
+          <a:fillRef idx="0">
+            <a:schemeClr val="accent1"/>
+          </a:fillRef>
+          <a:effectRef idx="0">
+            <a:schemeClr val="accent1"/>
+          </a:effectRef>
+          <a:fontRef idx="minor">
+            <a:schemeClr val="tx1"/>
+          </a:fontRef>
+        </p:style>
+      </p:cxnSp>
+    </p:spTree>
+    <p:extLst>
+      <p:ext uri="{BB962C8B-B14F-4D97-AF65-F5344CB8AC3E}">
+        <p14:creationId xmlns:p14="http://schemas.microsoft.com/office/powerpoint/2010/main" val="2922873529"/>
+      </p:ext>
+    </p:extLst>
+  </p:cSld>
+  <p:clrMapOvr>
+    <a:masterClrMapping/>
+  </p:clrMapOvr>
+</p:sld>
+</file>
+
 <file path=ppt/theme/theme1.xml><?xml version="1.0" encoding="utf-8"?>
 <a:theme xmlns:a="http://schemas.openxmlformats.org/drawingml/2006/main" name="Office">
   <a:themeElements>

</xml_diff>